<commit_message>
add attributes to azure meta-model in pptx
</commit_message>
<xml_diff>
--- a/Figures.pptx
+++ b/Figures.pptx
@@ -263,7 +263,7 @@
           <a:p>
             <a:fld id="{221DF790-08EF-4309-8C7D-573F11C98FD5}" type="datetimeFigureOut">
               <a:rPr lang="de-AT" smtClean="0"/>
-              <a:t>27.01.2022</a:t>
+              <a:t>04.02.2022</a:t>
             </a:fld>
             <a:endParaRPr lang="de-AT"/>
           </a:p>
@@ -463,7 +463,7 @@
           <a:p>
             <a:fld id="{221DF790-08EF-4309-8C7D-573F11C98FD5}" type="datetimeFigureOut">
               <a:rPr lang="de-AT" smtClean="0"/>
-              <a:t>27.01.2022</a:t>
+              <a:t>04.02.2022</a:t>
             </a:fld>
             <a:endParaRPr lang="de-AT"/>
           </a:p>
@@ -673,7 +673,7 @@
           <a:p>
             <a:fld id="{221DF790-08EF-4309-8C7D-573F11C98FD5}" type="datetimeFigureOut">
               <a:rPr lang="de-AT" smtClean="0"/>
-              <a:t>27.01.2022</a:t>
+              <a:t>04.02.2022</a:t>
             </a:fld>
             <a:endParaRPr lang="de-AT"/>
           </a:p>
@@ -873,7 +873,7 @@
           <a:p>
             <a:fld id="{221DF790-08EF-4309-8C7D-573F11C98FD5}" type="datetimeFigureOut">
               <a:rPr lang="de-AT" smtClean="0"/>
-              <a:t>27.01.2022</a:t>
+              <a:t>04.02.2022</a:t>
             </a:fld>
             <a:endParaRPr lang="de-AT"/>
           </a:p>
@@ -1149,7 +1149,7 @@
           <a:p>
             <a:fld id="{221DF790-08EF-4309-8C7D-573F11C98FD5}" type="datetimeFigureOut">
               <a:rPr lang="de-AT" smtClean="0"/>
-              <a:t>27.01.2022</a:t>
+              <a:t>04.02.2022</a:t>
             </a:fld>
             <a:endParaRPr lang="de-AT"/>
           </a:p>
@@ -1417,7 +1417,7 @@
           <a:p>
             <a:fld id="{221DF790-08EF-4309-8C7D-573F11C98FD5}" type="datetimeFigureOut">
               <a:rPr lang="de-AT" smtClean="0"/>
-              <a:t>27.01.2022</a:t>
+              <a:t>04.02.2022</a:t>
             </a:fld>
             <a:endParaRPr lang="de-AT"/>
           </a:p>
@@ -1832,7 +1832,7 @@
           <a:p>
             <a:fld id="{221DF790-08EF-4309-8C7D-573F11C98FD5}" type="datetimeFigureOut">
               <a:rPr lang="de-AT" smtClean="0"/>
-              <a:t>27.01.2022</a:t>
+              <a:t>04.02.2022</a:t>
             </a:fld>
             <a:endParaRPr lang="de-AT"/>
           </a:p>
@@ -1974,7 +1974,7 @@
           <a:p>
             <a:fld id="{221DF790-08EF-4309-8C7D-573F11C98FD5}" type="datetimeFigureOut">
               <a:rPr lang="de-AT" smtClean="0"/>
-              <a:t>27.01.2022</a:t>
+              <a:t>04.02.2022</a:t>
             </a:fld>
             <a:endParaRPr lang="de-AT"/>
           </a:p>
@@ -2087,7 +2087,7 @@
           <a:p>
             <a:fld id="{221DF790-08EF-4309-8C7D-573F11C98FD5}" type="datetimeFigureOut">
               <a:rPr lang="de-AT" smtClean="0"/>
-              <a:t>27.01.2022</a:t>
+              <a:t>04.02.2022</a:t>
             </a:fld>
             <a:endParaRPr lang="de-AT"/>
           </a:p>
@@ -2400,7 +2400,7 @@
           <a:p>
             <a:fld id="{221DF790-08EF-4309-8C7D-573F11C98FD5}" type="datetimeFigureOut">
               <a:rPr lang="de-AT" smtClean="0"/>
-              <a:t>27.01.2022</a:t>
+              <a:t>04.02.2022</a:t>
             </a:fld>
             <a:endParaRPr lang="de-AT"/>
           </a:p>
@@ -2689,7 +2689,7 @@
           <a:p>
             <a:fld id="{221DF790-08EF-4309-8C7D-573F11C98FD5}" type="datetimeFigureOut">
               <a:rPr lang="de-AT" smtClean="0"/>
-              <a:t>27.01.2022</a:t>
+              <a:t>04.02.2022</a:t>
             </a:fld>
             <a:endParaRPr lang="de-AT"/>
           </a:p>
@@ -2932,7 +2932,7 @@
           <a:p>
             <a:fld id="{221DF790-08EF-4309-8C7D-573F11C98FD5}" type="datetimeFigureOut">
               <a:rPr lang="de-AT" smtClean="0"/>
-              <a:t>27.01.2022</a:t>
+              <a:t>04.02.2022</a:t>
             </a:fld>
             <a:endParaRPr lang="de-AT"/>
           </a:p>
@@ -3363,7 +3363,7 @@
         </p:nvGrpSpPr>
         <p:grpSpPr>
           <a:xfrm>
-            <a:off x="4831078" y="2285504"/>
+            <a:off x="4782741" y="1369017"/>
             <a:ext cx="1264922" cy="820424"/>
             <a:chOff x="3484880" y="609600"/>
             <a:chExt cx="2529840" cy="857572"/>
@@ -3501,10 +3501,10 @@
         </p:nvGrpSpPr>
         <p:grpSpPr>
           <a:xfrm>
-            <a:off x="6095999" y="5207617"/>
-            <a:ext cx="2056755" cy="1409668"/>
+            <a:off x="4959935" y="4963632"/>
+            <a:ext cx="2056755" cy="1710204"/>
             <a:chOff x="3484880" y="609600"/>
-            <a:chExt cx="2879997" cy="1143434"/>
+            <a:chExt cx="2879997" cy="1387210"/>
           </a:xfrm>
         </p:grpSpPr>
         <p:sp>
@@ -3582,7 +3582,7 @@
           <p:spPr>
             <a:xfrm>
               <a:off x="3484880" y="1038386"/>
-              <a:ext cx="2879997" cy="714648"/>
+              <a:ext cx="2879997" cy="958424"/>
             </a:xfrm>
             <a:prstGeom prst="rect">
               <a:avLst/>
@@ -3662,6 +3662,24 @@
                 <a:cs typeface="Arial" panose="020B0604020202020204" pitchFamily="34" charset="0"/>
               </a:endParaRPr>
             </a:p>
+            <a:p>
+              <a:r>
+                <a:rPr lang="de-AT" dirty="0">
+                  <a:latin typeface="Arial" panose="020B0604020202020204" pitchFamily="34" charset="0"/>
+                  <a:cs typeface="Arial" panose="020B0604020202020204" pitchFamily="34" charset="0"/>
+                </a:rPr>
+                <a:t>Unit: String</a:t>
+              </a:r>
+            </a:p>
+            <a:p>
+              <a:r>
+                <a:rPr lang="de-AT" dirty="0">
+                  <a:latin typeface="Arial" panose="020B0604020202020204" pitchFamily="34" charset="0"/>
+                  <a:cs typeface="Arial" panose="020B0604020202020204" pitchFamily="34" charset="0"/>
+                </a:rPr>
+                <a:t>Schema: String</a:t>
+              </a:r>
+            </a:p>
           </p:txBody>
         </p:sp>
       </p:grpSp>
@@ -3679,7 +3697,7 @@
         </p:nvGrpSpPr>
         <p:grpSpPr>
           <a:xfrm>
-            <a:off x="7327690" y="2181626"/>
+            <a:off x="8164268" y="4993508"/>
             <a:ext cx="1746802" cy="1376641"/>
             <a:chOff x="3484881" y="609600"/>
             <a:chExt cx="2529840" cy="938785"/>
@@ -3881,165 +3899,6 @@
           </p:txBody>
         </p:sp>
       </p:grpSp>
-      <p:grpSp>
-        <p:nvGrpSpPr>
-          <p:cNvPr id="35" name="Gruppieren 34">
-            <a:extLst>
-              <a:ext uri="{FF2B5EF4-FFF2-40B4-BE49-F238E27FC236}">
-                <a16:creationId xmlns:a16="http://schemas.microsoft.com/office/drawing/2014/main" id="{BF045A28-BBE9-421A-A378-92247B43A94F}"/>
-              </a:ext>
-            </a:extLst>
-          </p:cNvPr>
-          <p:cNvGrpSpPr/>
-          <p:nvPr/>
-        </p:nvGrpSpPr>
-        <p:grpSpPr>
-          <a:xfrm rot="16200000">
-            <a:off x="6622718" y="1893170"/>
-            <a:ext cx="178254" cy="1231690"/>
-            <a:chOff x="10458516" y="2839000"/>
-            <a:chExt cx="201478" cy="2135007"/>
-          </a:xfrm>
-        </p:grpSpPr>
-        <p:cxnSp>
-          <p:nvCxnSpPr>
-            <p:cNvPr id="36" name="Gerade Verbindung mit Pfeil 35">
-              <a:extLst>
-                <a:ext uri="{FF2B5EF4-FFF2-40B4-BE49-F238E27FC236}">
-                  <a16:creationId xmlns:a16="http://schemas.microsoft.com/office/drawing/2014/main" id="{011F3D7D-35DD-44DA-9B38-618989DEBC4F}"/>
-                </a:ext>
-              </a:extLst>
-            </p:cNvPr>
-            <p:cNvCxnSpPr>
-              <a:cxnSpLocks/>
-            </p:cNvCxnSpPr>
-            <p:nvPr/>
-          </p:nvCxnSpPr>
-          <p:spPr>
-            <a:xfrm rot="5400000" flipV="1">
-              <a:off x="9636763" y="4056320"/>
-              <a:ext cx="1835374" cy="0"/>
-            </a:xfrm>
-            <a:prstGeom prst="straightConnector1">
-              <a:avLst/>
-            </a:prstGeom>
-            <a:ln>
-              <a:headEnd type="none" w="med" len="med"/>
-              <a:tailEnd type="arrow" w="med" len="med"/>
-            </a:ln>
-          </p:spPr>
-          <p:style>
-            <a:lnRef idx="1">
-              <a:schemeClr val="dk1"/>
-            </a:lnRef>
-            <a:fillRef idx="0">
-              <a:schemeClr val="dk1"/>
-            </a:fillRef>
-            <a:effectRef idx="0">
-              <a:schemeClr val="dk1"/>
-            </a:effectRef>
-            <a:fontRef idx="minor">
-              <a:schemeClr val="tx1"/>
-            </a:fontRef>
-          </p:style>
-        </p:cxnSp>
-        <p:sp>
-          <p:nvSpPr>
-            <p:cNvPr id="37" name="Raute 36">
-              <a:extLst>
-                <a:ext uri="{FF2B5EF4-FFF2-40B4-BE49-F238E27FC236}">
-                  <a16:creationId xmlns:a16="http://schemas.microsoft.com/office/drawing/2014/main" id="{6F1C7853-2C5A-48CE-B485-E1D8006275E1}"/>
-                </a:ext>
-              </a:extLst>
-            </p:cNvPr>
-            <p:cNvSpPr/>
-            <p:nvPr/>
-          </p:nvSpPr>
-          <p:spPr>
-            <a:xfrm>
-              <a:off x="10458516" y="2839000"/>
-              <a:ext cx="201478" cy="299633"/>
-            </a:xfrm>
-            <a:prstGeom prst="diamond">
-              <a:avLst/>
-            </a:prstGeom>
-            <a:ln>
-              <a:headEnd type="none" w="med" len="med"/>
-              <a:tailEnd type="arrow" w="med" len="med"/>
-            </a:ln>
-          </p:spPr>
-          <p:style>
-            <a:lnRef idx="2">
-              <a:schemeClr val="dk1">
-                <a:shade val="50000"/>
-              </a:schemeClr>
-            </a:lnRef>
-            <a:fillRef idx="1">
-              <a:schemeClr val="dk1"/>
-            </a:fillRef>
-            <a:effectRef idx="0">
-              <a:schemeClr val="dk1"/>
-            </a:effectRef>
-            <a:fontRef idx="minor">
-              <a:schemeClr val="lt1"/>
-            </a:fontRef>
-          </p:style>
-          <p:txBody>
-            <a:bodyPr rtlCol="0" anchor="ctr"/>
-            <a:lstStyle/>
-            <a:p>
-              <a:pPr algn="ctr"/>
-              <a:endParaRPr lang="de-AT">
-                <a:latin typeface="Arial" panose="020B0604020202020204" pitchFamily="34" charset="0"/>
-                <a:cs typeface="Arial" panose="020B0604020202020204" pitchFamily="34" charset="0"/>
-              </a:endParaRPr>
-            </a:p>
-          </p:txBody>
-        </p:sp>
-      </p:grpSp>
-      <p:cxnSp>
-        <p:nvCxnSpPr>
-          <p:cNvPr id="41" name="Gerade Verbindung mit Pfeil 40">
-            <a:extLst>
-              <a:ext uri="{FF2B5EF4-FFF2-40B4-BE49-F238E27FC236}">
-                <a16:creationId xmlns:a16="http://schemas.microsoft.com/office/drawing/2014/main" id="{DB8B178F-633B-4B00-96EC-90CC1F18BCE1}"/>
-              </a:ext>
-            </a:extLst>
-          </p:cNvPr>
-          <p:cNvCxnSpPr>
-            <a:cxnSpLocks/>
-            <a:endCxn id="10" idx="3"/>
-          </p:cNvCxnSpPr>
-          <p:nvPr/>
-        </p:nvCxnSpPr>
-        <p:spPr>
-          <a:xfrm flipH="1" flipV="1">
-            <a:off x="6096000" y="2900822"/>
-            <a:ext cx="1231690" cy="0"/>
-          </a:xfrm>
-          <a:prstGeom prst="straightConnector1">
-            <a:avLst/>
-          </a:prstGeom>
-          <a:ln>
-            <a:headEnd type="none" w="med" len="med"/>
-            <a:tailEnd type="arrow" w="med" len="med"/>
-          </a:ln>
-        </p:spPr>
-        <p:style>
-          <a:lnRef idx="1">
-            <a:schemeClr val="dk1"/>
-          </a:lnRef>
-          <a:fillRef idx="0">
-            <a:schemeClr val="dk1"/>
-          </a:fillRef>
-          <a:effectRef idx="0">
-            <a:schemeClr val="dk1"/>
-          </a:effectRef>
-          <a:fontRef idx="minor">
-            <a:schemeClr val="tx1"/>
-          </a:fontRef>
-        </p:style>
-      </p:cxnSp>
       <p:sp>
         <p:nvSpPr>
           <p:cNvPr id="43" name="Textfeld 42">
@@ -4054,7 +3913,7 @@
         </p:nvSpPr>
         <p:spPr>
           <a:xfrm>
-            <a:off x="6132406" y="2931602"/>
+            <a:off x="6047662" y="1663130"/>
             <a:ext cx="1363851" cy="369332"/>
           </a:xfrm>
           <a:prstGeom prst="rect">
@@ -4091,10 +3950,10 @@
       </p:sp>
       <p:grpSp>
         <p:nvGrpSpPr>
-          <p:cNvPr id="53" name="Gruppieren 52">
-            <a:extLst>
-              <a:ext uri="{FF2B5EF4-FFF2-40B4-BE49-F238E27FC236}">
-                <a16:creationId xmlns:a16="http://schemas.microsoft.com/office/drawing/2014/main" id="{ED9A3FDE-F8B0-4E42-986F-3C86DB96FD8C}"/>
+          <p:cNvPr id="72" name="Gruppieren 71">
+            <a:extLst>
+              <a:ext uri="{FF2B5EF4-FFF2-40B4-BE49-F238E27FC236}">
+                <a16:creationId xmlns:a16="http://schemas.microsoft.com/office/drawing/2014/main" id="{6717CD83-F024-476F-8704-1A573B89CB07}"/>
               </a:ext>
             </a:extLst>
           </p:cNvPr>
@@ -4103,185 +3962,10 @@
         </p:nvGrpSpPr>
         <p:grpSpPr>
           <a:xfrm>
-            <a:off x="4551010" y="2490618"/>
-            <a:ext cx="280067" cy="410205"/>
-            <a:chOff x="4365436" y="-2169861"/>
-            <a:chExt cx="280067" cy="327811"/>
-          </a:xfrm>
-        </p:grpSpPr>
-        <p:sp>
-          <p:nvSpPr>
-            <p:cNvPr id="54" name="Raute 53">
-              <a:extLst>
-                <a:ext uri="{FF2B5EF4-FFF2-40B4-BE49-F238E27FC236}">
-                  <a16:creationId xmlns:a16="http://schemas.microsoft.com/office/drawing/2014/main" id="{D67BDD4E-0B8F-498F-AA50-B3461494891F}"/>
-                </a:ext>
-              </a:extLst>
-            </p:cNvPr>
-            <p:cNvSpPr/>
-            <p:nvPr/>
-          </p:nvSpPr>
-          <p:spPr>
-            <a:xfrm rot="5400000" flipH="1">
-              <a:off x="4382223" y="-2186647"/>
-              <a:ext cx="201478" cy="235049"/>
-            </a:xfrm>
-            <a:prstGeom prst="diamond">
-              <a:avLst/>
-            </a:prstGeom>
-            <a:ln>
-              <a:headEnd type="none" w="med" len="med"/>
-              <a:tailEnd type="arrow" w="med" len="med"/>
-            </a:ln>
-          </p:spPr>
-          <p:style>
-            <a:lnRef idx="2">
-              <a:schemeClr val="dk1">
-                <a:shade val="50000"/>
-              </a:schemeClr>
-            </a:lnRef>
-            <a:fillRef idx="1">
-              <a:schemeClr val="dk1"/>
-            </a:fillRef>
-            <a:effectRef idx="0">
-              <a:schemeClr val="dk1"/>
-            </a:effectRef>
-            <a:fontRef idx="minor">
-              <a:schemeClr val="lt1"/>
-            </a:fontRef>
-          </p:style>
-          <p:txBody>
-            <a:bodyPr rtlCol="0" anchor="ctr"/>
-            <a:lstStyle/>
-            <a:p>
-              <a:pPr algn="ctr"/>
-              <a:endParaRPr lang="de-AT">
-                <a:latin typeface="Arial" panose="020B0604020202020204" pitchFamily="34" charset="0"/>
-                <a:cs typeface="Arial" panose="020B0604020202020204" pitchFamily="34" charset="0"/>
-              </a:endParaRPr>
-            </a:p>
-          </p:txBody>
-        </p:sp>
-        <p:cxnSp>
-          <p:nvCxnSpPr>
-            <p:cNvPr id="55" name="Verbinder: gewinkelt 171">
-              <a:extLst>
-                <a:ext uri="{FF2B5EF4-FFF2-40B4-BE49-F238E27FC236}">
-                  <a16:creationId xmlns:a16="http://schemas.microsoft.com/office/drawing/2014/main" id="{4A11AE90-AE26-4F49-87B9-9EF2E71DA9FA}"/>
-                </a:ext>
-              </a:extLst>
-            </p:cNvPr>
-            <p:cNvCxnSpPr>
-              <a:cxnSpLocks/>
-              <a:stCxn id="54" idx="2"/>
-              <a:endCxn id="10" idx="1"/>
-            </p:cNvCxnSpPr>
-            <p:nvPr/>
-          </p:nvCxnSpPr>
-          <p:spPr>
-            <a:xfrm rot="10800000" flipH="1" flipV="1">
-              <a:off x="4365436" y="-2069124"/>
-              <a:ext cx="280067" cy="227074"/>
-            </a:xfrm>
-            <a:prstGeom prst="bentConnector3">
-              <a:avLst>
-                <a:gd name="adj1" fmla="val -84671"/>
-              </a:avLst>
-            </a:prstGeom>
-            <a:ln>
-              <a:headEnd type="none" w="med" len="med"/>
-              <a:tailEnd type="arrow" w="med" len="med"/>
-            </a:ln>
-          </p:spPr>
-          <p:style>
-            <a:lnRef idx="1">
-              <a:schemeClr val="dk1"/>
-            </a:lnRef>
-            <a:fillRef idx="0">
-              <a:schemeClr val="dk1"/>
-            </a:fillRef>
-            <a:effectRef idx="0">
-              <a:schemeClr val="dk1"/>
-            </a:effectRef>
-            <a:fontRef idx="minor">
-              <a:schemeClr val="tx1"/>
-            </a:fontRef>
-          </p:style>
-        </p:cxnSp>
-      </p:grpSp>
-      <p:sp>
-        <p:nvSpPr>
-          <p:cNvPr id="56" name="Textfeld 55">
-            <a:extLst>
-              <a:ext uri="{FF2B5EF4-FFF2-40B4-BE49-F238E27FC236}">
-                <a16:creationId xmlns:a16="http://schemas.microsoft.com/office/drawing/2014/main" id="{0392D6BE-8FD0-43FC-834F-7C3146C46D63}"/>
-              </a:ext>
-            </a:extLst>
-          </p:cNvPr>
-          <p:cNvSpPr txBox="1"/>
-          <p:nvPr/>
-        </p:nvSpPr>
-        <p:spPr>
-          <a:xfrm>
-            <a:off x="3021731" y="2357510"/>
-            <a:ext cx="1457395" cy="615553"/>
-          </a:xfrm>
-          <a:prstGeom prst="rect">
-            <a:avLst/>
-          </a:prstGeom>
-          <a:noFill/>
-        </p:spPr>
-        <p:txBody>
-          <a:bodyPr wrap="square" rtlCol="0">
-            <a:spAutoFit/>
-          </a:bodyPr>
-          <a:lstStyle/>
-          <a:p>
-            <a:r>
-              <a:rPr lang="de-AT" sz="1600" dirty="0">
-                <a:latin typeface="Arial" panose="020B0604020202020204" pitchFamily="34" charset="0"/>
-                <a:cs typeface="Arial" panose="020B0604020202020204" pitchFamily="34" charset="0"/>
-              </a:rPr>
-              <a:t>[0..*]</a:t>
-            </a:r>
-            <a:br>
-              <a:rPr lang="de-AT" dirty="0">
-                <a:latin typeface="Arial" panose="020B0604020202020204" pitchFamily="34" charset="0"/>
-                <a:cs typeface="Arial" panose="020B0604020202020204" pitchFamily="34" charset="0"/>
-              </a:rPr>
-            </a:br>
-            <a:r>
-              <a:rPr lang="de-AT" dirty="0" err="1">
-                <a:latin typeface="Arial" panose="020B0604020202020204" pitchFamily="34" charset="0"/>
-                <a:cs typeface="Arial" panose="020B0604020202020204" pitchFamily="34" charset="0"/>
-              </a:rPr>
-              <a:t>component</a:t>
-            </a:r>
-            <a:endParaRPr lang="de-AT" dirty="0">
-              <a:latin typeface="Arial" panose="020B0604020202020204" pitchFamily="34" charset="0"/>
-              <a:cs typeface="Arial" panose="020B0604020202020204" pitchFamily="34" charset="0"/>
-            </a:endParaRPr>
-          </a:p>
-        </p:txBody>
-      </p:sp>
-      <p:grpSp>
-        <p:nvGrpSpPr>
-          <p:cNvPr id="72" name="Gruppieren 71">
-            <a:extLst>
-              <a:ext uri="{FF2B5EF4-FFF2-40B4-BE49-F238E27FC236}">
-                <a16:creationId xmlns:a16="http://schemas.microsoft.com/office/drawing/2014/main" id="{6717CD83-F024-476F-8704-1A573B89CB07}"/>
-              </a:ext>
-            </a:extLst>
-          </p:cNvPr>
-          <p:cNvGrpSpPr/>
-          <p:nvPr/>
-        </p:nvGrpSpPr>
-        <p:grpSpPr>
-          <a:xfrm>
-            <a:off x="3403614" y="5092027"/>
-            <a:ext cx="1264922" cy="820424"/>
+            <a:off x="2990348" y="5087137"/>
+            <a:ext cx="1656482" cy="1640922"/>
             <a:chOff x="3484880" y="609600"/>
-            <a:chExt cx="2529840" cy="857572"/>
+            <a:chExt cx="2529840" cy="1715221"/>
           </a:xfrm>
         </p:grpSpPr>
         <p:sp>
@@ -4363,7 +4047,7 @@
           <p:spPr>
             <a:xfrm>
               <a:off x="3484880" y="1038386"/>
-              <a:ext cx="2529840" cy="428786"/>
+              <a:ext cx="2529840" cy="1286435"/>
             </a:xfrm>
             <a:prstGeom prst="rect">
               <a:avLst/>
@@ -4398,10 +4082,50 @@
             <a:lstStyle/>
             <a:p>
               <a:pPr algn="ctr"/>
-              <a:endParaRPr lang="de-AT" dirty="0">
-                <a:latin typeface="Arial" panose="020B0604020202020204" pitchFamily="34" charset="0"/>
-                <a:cs typeface="Arial" panose="020B0604020202020204" pitchFamily="34" charset="0"/>
-              </a:endParaRPr>
+              <a:r>
+                <a:rPr lang="de-AT" dirty="0" err="1">
+                  <a:latin typeface="Arial" panose="020B0604020202020204" pitchFamily="34" charset="0"/>
+                  <a:cs typeface="Arial" panose="020B0604020202020204" pitchFamily="34" charset="0"/>
+                </a:rPr>
+                <a:t>name</a:t>
+              </a:r>
+              <a:r>
+                <a:rPr lang="de-AT" dirty="0">
+                  <a:latin typeface="Arial" panose="020B0604020202020204" pitchFamily="34" charset="0"/>
+                  <a:cs typeface="Arial" panose="020B0604020202020204" pitchFamily="34" charset="0"/>
+                </a:rPr>
+                <a:t>: String</a:t>
+              </a:r>
+            </a:p>
+            <a:p>
+              <a:pPr algn="ctr"/>
+              <a:r>
+                <a:rPr lang="de-AT" dirty="0">
+                  <a:latin typeface="Arial" panose="020B0604020202020204" pitchFamily="34" charset="0"/>
+                  <a:cs typeface="Arial" panose="020B0604020202020204" pitchFamily="34" charset="0"/>
+                </a:rPr>
+                <a:t>Type: String</a:t>
+              </a:r>
+            </a:p>
+            <a:p>
+              <a:pPr algn="ctr"/>
+              <a:r>
+                <a:rPr lang="de-AT" dirty="0">
+                  <a:latin typeface="Arial" panose="020B0604020202020204" pitchFamily="34" charset="0"/>
+                  <a:cs typeface="Arial" panose="020B0604020202020204" pitchFamily="34" charset="0"/>
+                </a:rPr>
+                <a:t>Unit: String</a:t>
+              </a:r>
+            </a:p>
+            <a:p>
+              <a:pPr algn="ctr"/>
+              <a:r>
+                <a:rPr lang="de-AT" dirty="0">
+                  <a:latin typeface="Arial" panose="020B0604020202020204" pitchFamily="34" charset="0"/>
+                  <a:cs typeface="Arial" panose="020B0604020202020204" pitchFamily="34" charset="0"/>
+                </a:rPr>
+                <a:t>Schema: String</a:t>
+              </a:r>
             </a:p>
           </p:txBody>
         </p:sp>
@@ -4420,7 +4144,7 @@
         </p:nvGrpSpPr>
         <p:grpSpPr>
           <a:xfrm>
-            <a:off x="780002" y="5061716"/>
+            <a:off x="771110" y="5061716"/>
             <a:ext cx="1457395" cy="820424"/>
             <a:chOff x="3484880" y="609600"/>
             <a:chExt cx="2529840" cy="857572"/>
@@ -4536,10 +4260,13 @@
             <a:lstStyle/>
             <a:p>
               <a:pPr algn="ctr"/>
-              <a:endParaRPr lang="de-AT" dirty="0">
-                <a:latin typeface="Arial" panose="020B0604020202020204" pitchFamily="34" charset="0"/>
-                <a:cs typeface="Arial" panose="020B0604020202020204" pitchFamily="34" charset="0"/>
-              </a:endParaRPr>
+              <a:r>
+                <a:rPr lang="de-AT" dirty="0">
+                  <a:latin typeface="Arial" panose="020B0604020202020204" pitchFamily="34" charset="0"/>
+                  <a:cs typeface="Arial" panose="020B0604020202020204" pitchFamily="34" charset="0"/>
+                </a:rPr>
+                <a:t>Name: String</a:t>
+              </a:r>
             </a:p>
           </p:txBody>
         </p:sp>
@@ -4558,10 +4285,10 @@
         </p:nvGrpSpPr>
         <p:grpSpPr>
           <a:xfrm>
-            <a:off x="459406" y="2295352"/>
-            <a:ext cx="2235382" cy="820424"/>
-            <a:chOff x="3484880" y="609600"/>
-            <a:chExt cx="2529840" cy="857572"/>
+            <a:off x="471431" y="2239240"/>
+            <a:ext cx="2265734" cy="2159984"/>
+            <a:chOff x="3484879" y="609600"/>
+            <a:chExt cx="2529841" cy="2257786"/>
           </a:xfrm>
         </p:grpSpPr>
         <p:sp>
@@ -4642,6 +4369,639 @@
           </p:nvSpPr>
           <p:spPr>
             <a:xfrm>
+              <a:off x="3484879" y="1038385"/>
+              <a:ext cx="2529840" cy="1829001"/>
+            </a:xfrm>
+            <a:prstGeom prst="rect">
+              <a:avLst/>
+            </a:prstGeom>
+            <a:noFill/>
+            <a:ln w="9525" cap="flat" cmpd="sng" algn="ctr">
+              <a:solidFill>
+                <a:schemeClr val="dk1"/>
+              </a:solidFill>
+              <a:prstDash val="solid"/>
+              <a:round/>
+              <a:headEnd type="none" w="med" len="med"/>
+              <a:tailEnd type="arrow" w="med" len="med"/>
+            </a:ln>
+          </p:spPr>
+          <p:style>
+            <a:lnRef idx="0">
+              <a:scrgbClr r="0" g="0" b="0"/>
+            </a:lnRef>
+            <a:fillRef idx="0">
+              <a:scrgbClr r="0" g="0" b="0"/>
+            </a:fillRef>
+            <a:effectRef idx="0">
+              <a:scrgbClr r="0" g="0" b="0"/>
+            </a:effectRef>
+            <a:fontRef idx="minor">
+              <a:schemeClr val="dk1"/>
+            </a:fontRef>
+          </p:style>
+          <p:txBody>
+            <a:bodyPr rtlCol="0" anchor="ctr"/>
+            <a:lstStyle/>
+            <a:p>
+              <a:pPr algn="ctr"/>
+              <a:r>
+                <a:rPr lang="de-AT" dirty="0">
+                  <a:latin typeface="Arial" panose="020B0604020202020204" pitchFamily="34" charset="0"/>
+                  <a:cs typeface="Arial" panose="020B0604020202020204" pitchFamily="34" charset="0"/>
+                </a:rPr>
+                <a:t>Name: String</a:t>
+              </a:r>
+            </a:p>
+            <a:p>
+              <a:pPr algn="ctr"/>
+              <a:r>
+                <a:rPr lang="de-AT" dirty="0" err="1">
+                  <a:latin typeface="Arial" panose="020B0604020202020204" pitchFamily="34" charset="0"/>
+                  <a:cs typeface="Arial" panose="020B0604020202020204" pitchFamily="34" charset="0"/>
+                </a:rPr>
+                <a:t>displayName</a:t>
+              </a:r>
+              <a:r>
+                <a:rPr lang="de-AT" dirty="0">
+                  <a:latin typeface="Arial" panose="020B0604020202020204" pitchFamily="34" charset="0"/>
+                  <a:cs typeface="Arial" panose="020B0604020202020204" pitchFamily="34" charset="0"/>
+                </a:rPr>
+                <a:t>: String</a:t>
+              </a:r>
+            </a:p>
+            <a:p>
+              <a:pPr algn="ctr"/>
+              <a:r>
+                <a:rPr lang="de-AT" dirty="0">
+                  <a:latin typeface="Arial" panose="020B0604020202020204" pitchFamily="34" charset="0"/>
+                  <a:cs typeface="Arial" panose="020B0604020202020204" pitchFamily="34" charset="0"/>
+                </a:rPr>
+                <a:t>Comment: String</a:t>
+              </a:r>
+            </a:p>
+            <a:p>
+              <a:pPr algn="ctr"/>
+              <a:r>
+                <a:rPr lang="de-AT" dirty="0">
+                  <a:latin typeface="Arial" panose="020B0604020202020204" pitchFamily="34" charset="0"/>
+                  <a:cs typeface="Arial" panose="020B0604020202020204" pitchFamily="34" charset="0"/>
+                </a:rPr>
+                <a:t>Description: String</a:t>
+              </a:r>
+            </a:p>
+            <a:p>
+              <a:pPr algn="ctr"/>
+              <a:r>
+                <a:rPr lang="de-AT" dirty="0">
+                  <a:latin typeface="Arial" panose="020B0604020202020204" pitchFamily="34" charset="0"/>
+                  <a:cs typeface="Arial" panose="020B0604020202020204" pitchFamily="34" charset="0"/>
+                </a:rPr>
+                <a:t>Schema: String</a:t>
+              </a:r>
+            </a:p>
+          </p:txBody>
+        </p:sp>
+      </p:grpSp>
+      <p:sp>
+        <p:nvSpPr>
+          <p:cNvPr id="85" name="Raute 84">
+            <a:extLst>
+              <a:ext uri="{FF2B5EF4-FFF2-40B4-BE49-F238E27FC236}">
+                <a16:creationId xmlns:a16="http://schemas.microsoft.com/office/drawing/2014/main" id="{EADC2439-A820-4D5E-BBF6-2A3E4983B55A}"/>
+              </a:ext>
+            </a:extLst>
+          </p:cNvPr>
+          <p:cNvSpPr/>
+          <p:nvPr/>
+        </p:nvSpPr>
+        <p:spPr>
+          <a:xfrm rot="168924" flipH="1">
+            <a:off x="5274666" y="2143284"/>
+            <a:ext cx="252119" cy="235049"/>
+          </a:xfrm>
+          <a:prstGeom prst="diamond">
+            <a:avLst/>
+          </a:prstGeom>
+          <a:ln>
+            <a:headEnd type="none" w="med" len="med"/>
+            <a:tailEnd type="arrow" w="med" len="med"/>
+          </a:ln>
+        </p:spPr>
+        <p:style>
+          <a:lnRef idx="2">
+            <a:schemeClr val="dk1">
+              <a:shade val="50000"/>
+            </a:schemeClr>
+          </a:lnRef>
+          <a:fillRef idx="1">
+            <a:schemeClr val="dk1"/>
+          </a:fillRef>
+          <a:effectRef idx="0">
+            <a:schemeClr val="dk1"/>
+          </a:effectRef>
+          <a:fontRef idx="minor">
+            <a:schemeClr val="lt1"/>
+          </a:fontRef>
+        </p:style>
+        <p:txBody>
+          <a:bodyPr rtlCol="0" anchor="ctr"/>
+          <a:lstStyle/>
+          <a:p>
+            <a:pPr algn="ctr"/>
+            <a:endParaRPr lang="de-AT">
+              <a:latin typeface="Arial" panose="020B0604020202020204" pitchFamily="34" charset="0"/>
+              <a:cs typeface="Arial" panose="020B0604020202020204" pitchFamily="34" charset="0"/>
+            </a:endParaRPr>
+          </a:p>
+        </p:txBody>
+      </p:sp>
+      <p:cxnSp>
+        <p:nvCxnSpPr>
+          <p:cNvPr id="86" name="Verbinder: gewinkelt 171">
+            <a:extLst>
+              <a:ext uri="{FF2B5EF4-FFF2-40B4-BE49-F238E27FC236}">
+                <a16:creationId xmlns:a16="http://schemas.microsoft.com/office/drawing/2014/main" id="{F722153F-0738-4C73-A978-D3E6F75BE852}"/>
+              </a:ext>
+            </a:extLst>
+          </p:cNvPr>
+          <p:cNvCxnSpPr>
+            <a:cxnSpLocks/>
+            <a:stCxn id="18" idx="0"/>
+            <a:endCxn id="42" idx="2"/>
+          </p:cNvCxnSpPr>
+          <p:nvPr/>
+        </p:nvCxnSpPr>
+        <p:spPr>
+          <a:xfrm rot="16200000" flipV="1">
+            <a:off x="5072945" y="4048264"/>
+            <a:ext cx="1208768" cy="621968"/>
+          </a:xfrm>
+          <a:prstGeom prst="bentConnector3">
+            <a:avLst>
+              <a:gd name="adj1" fmla="val 50000"/>
+            </a:avLst>
+          </a:prstGeom>
+          <a:ln>
+            <a:headEnd type="none" w="med" len="med"/>
+            <a:tailEnd type="triangle" w="med" len="med"/>
+          </a:ln>
+        </p:spPr>
+        <p:style>
+          <a:lnRef idx="1">
+            <a:schemeClr val="dk1"/>
+          </a:lnRef>
+          <a:fillRef idx="0">
+            <a:schemeClr val="dk1"/>
+          </a:fillRef>
+          <a:effectRef idx="0">
+            <a:schemeClr val="dk1"/>
+          </a:effectRef>
+          <a:fontRef idx="minor">
+            <a:schemeClr val="tx1"/>
+          </a:fontRef>
+        </p:style>
+      </p:cxnSp>
+      <p:cxnSp>
+        <p:nvCxnSpPr>
+          <p:cNvPr id="96" name="Verbinder: gewinkelt 171">
+            <a:extLst>
+              <a:ext uri="{FF2B5EF4-FFF2-40B4-BE49-F238E27FC236}">
+                <a16:creationId xmlns:a16="http://schemas.microsoft.com/office/drawing/2014/main" id="{0F9CA7FC-4649-4906-8B82-E8E1AAD426B5}"/>
+              </a:ext>
+            </a:extLst>
+          </p:cNvPr>
+          <p:cNvCxnSpPr>
+            <a:cxnSpLocks/>
+            <a:stCxn id="85" idx="2"/>
+            <a:endCxn id="40" idx="0"/>
+          </p:cNvCxnSpPr>
+          <p:nvPr/>
+        </p:nvCxnSpPr>
+        <p:spPr>
+          <a:xfrm rot="5400000">
+            <a:off x="5102525" y="2642012"/>
+            <a:ext cx="556249" cy="28607"/>
+          </a:xfrm>
+          <a:prstGeom prst="bentConnector3">
+            <a:avLst>
+              <a:gd name="adj1" fmla="val 50000"/>
+            </a:avLst>
+          </a:prstGeom>
+          <a:ln>
+            <a:headEnd type="none" w="med" len="med"/>
+            <a:tailEnd type="arrow" w="med" len="med"/>
+          </a:ln>
+        </p:spPr>
+        <p:style>
+          <a:lnRef idx="1">
+            <a:schemeClr val="dk1"/>
+          </a:lnRef>
+          <a:fillRef idx="0">
+            <a:schemeClr val="dk1"/>
+          </a:fillRef>
+          <a:effectRef idx="0">
+            <a:schemeClr val="dk1"/>
+          </a:effectRef>
+          <a:fontRef idx="minor">
+            <a:schemeClr val="tx1"/>
+          </a:fontRef>
+        </p:style>
+      </p:cxnSp>
+      <p:sp>
+        <p:nvSpPr>
+          <p:cNvPr id="102" name="Raute 101">
+            <a:extLst>
+              <a:ext uri="{FF2B5EF4-FFF2-40B4-BE49-F238E27FC236}">
+                <a16:creationId xmlns:a16="http://schemas.microsoft.com/office/drawing/2014/main" id="{CB7584A6-ABF7-4717-AE09-77F1E298835D}"/>
+              </a:ext>
+            </a:extLst>
+          </p:cNvPr>
+          <p:cNvSpPr/>
+          <p:nvPr/>
+        </p:nvSpPr>
+        <p:spPr>
+          <a:xfrm rot="168924" flipH="1">
+            <a:off x="934731" y="4795789"/>
+            <a:ext cx="252119" cy="235049"/>
+          </a:xfrm>
+          <a:prstGeom prst="diamond">
+            <a:avLst/>
+          </a:prstGeom>
+          <a:ln>
+            <a:headEnd type="none" w="med" len="med"/>
+            <a:tailEnd type="arrow" w="med" len="med"/>
+          </a:ln>
+        </p:spPr>
+        <p:style>
+          <a:lnRef idx="2">
+            <a:schemeClr val="dk1">
+              <a:shade val="50000"/>
+            </a:schemeClr>
+          </a:lnRef>
+          <a:fillRef idx="1">
+            <a:schemeClr val="dk1"/>
+          </a:fillRef>
+          <a:effectRef idx="0">
+            <a:schemeClr val="dk1"/>
+          </a:effectRef>
+          <a:fontRef idx="minor">
+            <a:schemeClr val="lt1"/>
+          </a:fontRef>
+        </p:style>
+        <p:txBody>
+          <a:bodyPr rtlCol="0" anchor="ctr"/>
+          <a:lstStyle/>
+          <a:p>
+            <a:pPr algn="ctr"/>
+            <a:endParaRPr lang="de-AT">
+              <a:latin typeface="Arial" panose="020B0604020202020204" pitchFamily="34" charset="0"/>
+              <a:cs typeface="Arial" panose="020B0604020202020204" pitchFamily="34" charset="0"/>
+            </a:endParaRPr>
+          </a:p>
+        </p:txBody>
+      </p:sp>
+      <p:cxnSp>
+        <p:nvCxnSpPr>
+          <p:cNvPr id="103" name="Verbinder: gewinkelt 171">
+            <a:extLst>
+              <a:ext uri="{FF2B5EF4-FFF2-40B4-BE49-F238E27FC236}">
+                <a16:creationId xmlns:a16="http://schemas.microsoft.com/office/drawing/2014/main" id="{310C4C7D-E24F-4AC7-87FC-08021A425F69}"/>
+              </a:ext>
+            </a:extLst>
+          </p:cNvPr>
+          <p:cNvCxnSpPr>
+            <a:cxnSpLocks/>
+            <a:stCxn id="102" idx="0"/>
+            <a:endCxn id="83" idx="2"/>
+          </p:cNvCxnSpPr>
+          <p:nvPr/>
+        </p:nvCxnSpPr>
+        <p:spPr>
+          <a:xfrm rot="5400000" flipH="1" flipV="1">
+            <a:off x="1137077" y="4328711"/>
+            <a:ext cx="396707" cy="537735"/>
+          </a:xfrm>
+          <a:prstGeom prst="bentConnector3">
+            <a:avLst>
+              <a:gd name="adj1" fmla="val 50000"/>
+            </a:avLst>
+          </a:prstGeom>
+          <a:ln>
+            <a:headEnd type="none" w="med" len="med"/>
+            <a:tailEnd type="arrow" w="med" len="med"/>
+          </a:ln>
+        </p:spPr>
+        <p:style>
+          <a:lnRef idx="1">
+            <a:schemeClr val="dk1"/>
+          </a:lnRef>
+          <a:fillRef idx="0">
+            <a:schemeClr val="dk1"/>
+          </a:fillRef>
+          <a:effectRef idx="0">
+            <a:schemeClr val="dk1"/>
+          </a:effectRef>
+          <a:fontRef idx="minor">
+            <a:schemeClr val="tx1"/>
+          </a:fontRef>
+        </p:style>
+      </p:cxnSp>
+      <p:cxnSp>
+        <p:nvCxnSpPr>
+          <p:cNvPr id="106" name="Verbinder: gewinkelt 171">
+            <a:extLst>
+              <a:ext uri="{FF2B5EF4-FFF2-40B4-BE49-F238E27FC236}">
+                <a16:creationId xmlns:a16="http://schemas.microsoft.com/office/drawing/2014/main" id="{10A3D31B-749B-4BC3-855B-AE32E0B6C9B6}"/>
+              </a:ext>
+            </a:extLst>
+          </p:cNvPr>
+          <p:cNvCxnSpPr>
+            <a:cxnSpLocks/>
+            <a:stCxn id="107" idx="0"/>
+            <a:endCxn id="83" idx="2"/>
+          </p:cNvCxnSpPr>
+          <p:nvPr/>
+        </p:nvCxnSpPr>
+        <p:spPr>
+          <a:xfrm rot="16200000" flipV="1">
+            <a:off x="1522471" y="4481051"/>
+            <a:ext cx="447026" cy="283372"/>
+          </a:xfrm>
+          <a:prstGeom prst="bentConnector3">
+            <a:avLst>
+              <a:gd name="adj1" fmla="val 50000"/>
+            </a:avLst>
+          </a:prstGeom>
+          <a:ln>
+            <a:headEnd type="none" w="med" len="med"/>
+            <a:tailEnd type="arrow" w="med" len="med"/>
+          </a:ln>
+        </p:spPr>
+        <p:style>
+          <a:lnRef idx="1">
+            <a:schemeClr val="dk1"/>
+          </a:lnRef>
+          <a:fillRef idx="0">
+            <a:schemeClr val="dk1"/>
+          </a:fillRef>
+          <a:effectRef idx="0">
+            <a:schemeClr val="dk1"/>
+          </a:effectRef>
+          <a:fontRef idx="minor">
+            <a:schemeClr val="tx1"/>
+          </a:fontRef>
+        </p:style>
+      </p:cxnSp>
+      <p:sp>
+        <p:nvSpPr>
+          <p:cNvPr id="107" name="Raute 106">
+            <a:extLst>
+              <a:ext uri="{FF2B5EF4-FFF2-40B4-BE49-F238E27FC236}">
+                <a16:creationId xmlns:a16="http://schemas.microsoft.com/office/drawing/2014/main" id="{185260BB-4138-4F20-978E-DFC26624E6C3}"/>
+              </a:ext>
+            </a:extLst>
+          </p:cNvPr>
+          <p:cNvSpPr/>
+          <p:nvPr/>
+        </p:nvSpPr>
+        <p:spPr>
+          <a:xfrm rot="168924" flipH="1">
+            <a:off x="1755838" y="4846108"/>
+            <a:ext cx="252119" cy="235049"/>
+          </a:xfrm>
+          <a:prstGeom prst="diamond">
+            <a:avLst/>
+          </a:prstGeom>
+          <a:ln>
+            <a:headEnd type="none" w="med" len="med"/>
+            <a:tailEnd type="arrow" w="med" len="med"/>
+          </a:ln>
+        </p:spPr>
+        <p:style>
+          <a:lnRef idx="2">
+            <a:schemeClr val="dk1">
+              <a:shade val="50000"/>
+            </a:schemeClr>
+          </a:lnRef>
+          <a:fillRef idx="1">
+            <a:schemeClr val="dk1"/>
+          </a:fillRef>
+          <a:effectRef idx="0">
+            <a:schemeClr val="dk1"/>
+          </a:effectRef>
+          <a:fontRef idx="minor">
+            <a:schemeClr val="lt1"/>
+          </a:fontRef>
+        </p:style>
+        <p:txBody>
+          <a:bodyPr rtlCol="0" anchor="ctr"/>
+          <a:lstStyle/>
+          <a:p>
+            <a:pPr algn="ctr"/>
+            <a:endParaRPr lang="de-AT">
+              <a:latin typeface="Arial" panose="020B0604020202020204" pitchFamily="34" charset="0"/>
+              <a:cs typeface="Arial" panose="020B0604020202020204" pitchFamily="34" charset="0"/>
+            </a:endParaRPr>
+          </a:p>
+        </p:txBody>
+      </p:sp>
+      <p:sp>
+        <p:nvSpPr>
+          <p:cNvPr id="110" name="Textfeld 109">
+            <a:extLst>
+              <a:ext uri="{FF2B5EF4-FFF2-40B4-BE49-F238E27FC236}">
+                <a16:creationId xmlns:a16="http://schemas.microsoft.com/office/drawing/2014/main" id="{BFFAC7F8-A565-4BA1-8EAB-EE9E38B0BC8E}"/>
+              </a:ext>
+            </a:extLst>
+          </p:cNvPr>
+          <p:cNvSpPr txBox="1"/>
+          <p:nvPr/>
+        </p:nvSpPr>
+        <p:spPr>
+          <a:xfrm>
+            <a:off x="138225" y="3244334"/>
+            <a:ext cx="1457395" cy="369332"/>
+          </a:xfrm>
+          <a:prstGeom prst="rect">
+            <a:avLst/>
+          </a:prstGeom>
+          <a:noFill/>
+        </p:spPr>
+        <p:txBody>
+          <a:bodyPr wrap="square" rtlCol="0">
+            <a:spAutoFit/>
+          </a:bodyPr>
+          <a:lstStyle/>
+          <a:p>
+            <a:r>
+              <a:rPr lang="de-AT" sz="1600" dirty="0">
+                <a:latin typeface="Arial" panose="020B0604020202020204" pitchFamily="34" charset="0"/>
+                <a:cs typeface="Arial" panose="020B0604020202020204" pitchFamily="34" charset="0"/>
+              </a:rPr>
+              <a:t>[0..*] </a:t>
+            </a:r>
+            <a:r>
+              <a:rPr lang="de-AT" dirty="0" err="1">
+                <a:latin typeface="Arial" panose="020B0604020202020204" pitchFamily="34" charset="0"/>
+                <a:cs typeface="Arial" panose="020B0604020202020204" pitchFamily="34" charset="0"/>
+              </a:rPr>
+              <a:t>request</a:t>
+            </a:r>
+            <a:endParaRPr lang="de-AT" dirty="0">
+              <a:latin typeface="Arial" panose="020B0604020202020204" pitchFamily="34" charset="0"/>
+              <a:cs typeface="Arial" panose="020B0604020202020204" pitchFamily="34" charset="0"/>
+            </a:endParaRPr>
+          </a:p>
+        </p:txBody>
+      </p:sp>
+      <p:sp>
+        <p:nvSpPr>
+          <p:cNvPr id="111" name="Textfeld 110">
+            <a:extLst>
+              <a:ext uri="{FF2B5EF4-FFF2-40B4-BE49-F238E27FC236}">
+                <a16:creationId xmlns:a16="http://schemas.microsoft.com/office/drawing/2014/main" id="{1C7D9B4E-4D9E-447B-B862-2FCEDFF99175}"/>
+              </a:ext>
+            </a:extLst>
+          </p:cNvPr>
+          <p:cNvSpPr txBox="1"/>
+          <p:nvPr/>
+        </p:nvSpPr>
+        <p:spPr>
+          <a:xfrm>
+            <a:off x="1639739" y="3189427"/>
+            <a:ext cx="1264922" cy="615553"/>
+          </a:xfrm>
+          <a:prstGeom prst="rect">
+            <a:avLst/>
+          </a:prstGeom>
+          <a:noFill/>
+        </p:spPr>
+        <p:txBody>
+          <a:bodyPr wrap="square" rtlCol="0">
+            <a:spAutoFit/>
+          </a:bodyPr>
+          <a:lstStyle/>
+          <a:p>
+            <a:r>
+              <a:rPr lang="de-AT" sz="1600" dirty="0">
+                <a:latin typeface="Arial" panose="020B0604020202020204" pitchFamily="34" charset="0"/>
+                <a:cs typeface="Arial" panose="020B0604020202020204" pitchFamily="34" charset="0"/>
+              </a:rPr>
+              <a:t>[0..*] </a:t>
+            </a:r>
+            <a:r>
+              <a:rPr lang="de-AT" dirty="0" err="1">
+                <a:latin typeface="Arial" panose="020B0604020202020204" pitchFamily="34" charset="0"/>
+                <a:cs typeface="Arial" panose="020B0604020202020204" pitchFamily="34" charset="0"/>
+              </a:rPr>
+              <a:t>response</a:t>
+            </a:r>
+            <a:endParaRPr lang="de-AT" dirty="0">
+              <a:latin typeface="Arial" panose="020B0604020202020204" pitchFamily="34" charset="0"/>
+              <a:cs typeface="Arial" panose="020B0604020202020204" pitchFamily="34" charset="0"/>
+            </a:endParaRPr>
+          </a:p>
+        </p:txBody>
+      </p:sp>
+      <p:grpSp>
+        <p:nvGrpSpPr>
+          <p:cNvPr id="39" name="Gruppieren 38">
+            <a:extLst>
+              <a:ext uri="{FF2B5EF4-FFF2-40B4-BE49-F238E27FC236}">
+                <a16:creationId xmlns:a16="http://schemas.microsoft.com/office/drawing/2014/main" id="{57E9D1E6-2163-4C46-A307-A2C677B2440E}"/>
+              </a:ext>
+            </a:extLst>
+          </p:cNvPr>
+          <p:cNvGrpSpPr/>
+          <p:nvPr/>
+        </p:nvGrpSpPr>
+        <p:grpSpPr>
+          <a:xfrm>
+            <a:off x="4236826" y="2934440"/>
+            <a:ext cx="2259037" cy="820424"/>
+            <a:chOff x="3484880" y="609600"/>
+            <a:chExt cx="2529840" cy="857572"/>
+          </a:xfrm>
+        </p:grpSpPr>
+        <p:sp>
+          <p:nvSpPr>
+            <p:cNvPr id="40" name="Rechteck 39">
+              <a:extLst>
+                <a:ext uri="{FF2B5EF4-FFF2-40B4-BE49-F238E27FC236}">
+                  <a16:creationId xmlns:a16="http://schemas.microsoft.com/office/drawing/2014/main" id="{7F7FD008-B025-4E12-BAB9-8E858F50F386}"/>
+                </a:ext>
+              </a:extLst>
+            </p:cNvPr>
+            <p:cNvSpPr/>
+            <p:nvPr/>
+          </p:nvSpPr>
+          <p:spPr>
+            <a:xfrm>
+              <a:off x="3484880" y="609600"/>
+              <a:ext cx="2529840" cy="428786"/>
+            </a:xfrm>
+            <a:prstGeom prst="rect">
+              <a:avLst/>
+            </a:prstGeom>
+            <a:noFill/>
+            <a:ln w="9525" cap="flat" cmpd="sng" algn="ctr">
+              <a:solidFill>
+                <a:schemeClr val="dk1"/>
+              </a:solidFill>
+              <a:prstDash val="solid"/>
+              <a:round/>
+              <a:headEnd type="none" w="med" len="med"/>
+              <a:tailEnd type="arrow" w="med" len="med"/>
+            </a:ln>
+          </p:spPr>
+          <p:style>
+            <a:lnRef idx="0">
+              <a:scrgbClr r="0" g="0" b="0"/>
+            </a:lnRef>
+            <a:fillRef idx="0">
+              <a:scrgbClr r="0" g="0" b="0"/>
+            </a:fillRef>
+            <a:effectRef idx="0">
+              <a:scrgbClr r="0" g="0" b="0"/>
+            </a:effectRef>
+            <a:fontRef idx="minor">
+              <a:schemeClr val="dk1"/>
+            </a:fontRef>
+          </p:style>
+          <p:txBody>
+            <a:bodyPr rtlCol="0" anchor="ctr"/>
+            <a:lstStyle/>
+            <a:p>
+              <a:pPr algn="ctr"/>
+              <a:r>
+                <a:rPr lang="de-AT" b="1" dirty="0" err="1">
+                  <a:latin typeface="Arial" panose="020B0604020202020204" pitchFamily="34" charset="0"/>
+                  <a:cs typeface="Arial" panose="020B0604020202020204" pitchFamily="34" charset="0"/>
+                </a:rPr>
+                <a:t>InterfaceContent</a:t>
+              </a:r>
+              <a:endParaRPr lang="de-AT" b="1" dirty="0">
+                <a:latin typeface="Arial" panose="020B0604020202020204" pitchFamily="34" charset="0"/>
+                <a:cs typeface="Arial" panose="020B0604020202020204" pitchFamily="34" charset="0"/>
+              </a:endParaRPr>
+            </a:p>
+          </p:txBody>
+        </p:sp>
+        <p:sp>
+          <p:nvSpPr>
+            <p:cNvPr id="42" name="Rechteck 41">
+              <a:extLst>
+                <a:ext uri="{FF2B5EF4-FFF2-40B4-BE49-F238E27FC236}">
+                  <a16:creationId xmlns:a16="http://schemas.microsoft.com/office/drawing/2014/main" id="{92A0D814-D841-4DD4-B61E-DC16B2EB45C9}"/>
+                </a:ext>
+              </a:extLst>
+            </p:cNvPr>
+            <p:cNvSpPr/>
+            <p:nvPr/>
+          </p:nvSpPr>
+          <p:spPr>
+            <a:xfrm>
               <a:off x="3484880" y="1038386"/>
               <a:ext cx="2529840" cy="428786"/>
             </a:xfrm>
@@ -4686,83 +5046,375 @@
           </p:txBody>
         </p:sp>
       </p:grpSp>
-      <p:sp>
-        <p:nvSpPr>
-          <p:cNvPr id="85" name="Raute 84">
-            <a:extLst>
-              <a:ext uri="{FF2B5EF4-FFF2-40B4-BE49-F238E27FC236}">
-                <a16:creationId xmlns:a16="http://schemas.microsoft.com/office/drawing/2014/main" id="{EADC2439-A820-4D5E-BBF6-2A3E4983B55A}"/>
-              </a:ext>
-            </a:extLst>
-          </p:cNvPr>
-          <p:cNvSpPr/>
+      <p:grpSp>
+        <p:nvGrpSpPr>
+          <p:cNvPr id="44" name="Gruppieren 43">
+            <a:extLst>
+              <a:ext uri="{FF2B5EF4-FFF2-40B4-BE49-F238E27FC236}">
+                <a16:creationId xmlns:a16="http://schemas.microsoft.com/office/drawing/2014/main" id="{126F9912-0C29-4C9A-AE22-89A8E3240E2D}"/>
+              </a:ext>
+            </a:extLst>
+          </p:cNvPr>
+          <p:cNvGrpSpPr/>
           <p:nvPr/>
-        </p:nvSpPr>
-        <p:spPr>
-          <a:xfrm rot="168924" flipH="1">
-            <a:off x="5347609" y="3085976"/>
-            <a:ext cx="252119" cy="235049"/>
+        </p:nvGrpSpPr>
+        <p:grpSpPr>
+          <a:xfrm>
+            <a:off x="2708938" y="519144"/>
+            <a:ext cx="1578362" cy="820424"/>
+            <a:chOff x="3484880" y="609600"/>
+            <a:chExt cx="2529840" cy="857572"/>
           </a:xfrm>
-          <a:prstGeom prst="diamond">
-            <a:avLst/>
-          </a:prstGeom>
-          <a:ln>
-            <a:headEnd type="none" w="med" len="med"/>
-            <a:tailEnd type="arrow" w="med" len="med"/>
-          </a:ln>
-        </p:spPr>
-        <p:style>
-          <a:lnRef idx="2">
-            <a:schemeClr val="dk1">
-              <a:shade val="50000"/>
-            </a:schemeClr>
-          </a:lnRef>
-          <a:fillRef idx="1">
-            <a:schemeClr val="dk1"/>
-          </a:fillRef>
-          <a:effectRef idx="0">
-            <a:schemeClr val="dk1"/>
-          </a:effectRef>
-          <a:fontRef idx="minor">
-            <a:schemeClr val="lt1"/>
-          </a:fontRef>
-        </p:style>
-        <p:txBody>
-          <a:bodyPr rtlCol="0" anchor="ctr"/>
-          <a:lstStyle/>
-          <a:p>
-            <a:pPr algn="ctr"/>
-            <a:endParaRPr lang="de-AT">
-              <a:latin typeface="Arial" panose="020B0604020202020204" pitchFamily="34" charset="0"/>
-              <a:cs typeface="Arial" panose="020B0604020202020204" pitchFamily="34" charset="0"/>
-            </a:endParaRPr>
-          </a:p>
-        </p:txBody>
-      </p:sp>
+        </p:grpSpPr>
+        <p:sp>
+          <p:nvSpPr>
+            <p:cNvPr id="45" name="Rechteck 44">
+              <a:extLst>
+                <a:ext uri="{FF2B5EF4-FFF2-40B4-BE49-F238E27FC236}">
+                  <a16:creationId xmlns:a16="http://schemas.microsoft.com/office/drawing/2014/main" id="{D9C67E8F-1842-49E7-A406-416682BD9C2E}"/>
+                </a:ext>
+              </a:extLst>
+            </p:cNvPr>
+            <p:cNvSpPr/>
+            <p:nvPr/>
+          </p:nvSpPr>
+          <p:spPr>
+            <a:xfrm>
+              <a:off x="3484880" y="609600"/>
+              <a:ext cx="2529840" cy="428786"/>
+            </a:xfrm>
+            <a:prstGeom prst="rect">
+              <a:avLst/>
+            </a:prstGeom>
+            <a:noFill/>
+            <a:ln w="9525" cap="flat" cmpd="sng" algn="ctr">
+              <a:solidFill>
+                <a:schemeClr val="dk1"/>
+              </a:solidFill>
+              <a:prstDash val="solid"/>
+              <a:round/>
+              <a:headEnd type="none" w="med" len="med"/>
+              <a:tailEnd type="arrow" w="med" len="med"/>
+            </a:ln>
+          </p:spPr>
+          <p:style>
+            <a:lnRef idx="0">
+              <a:scrgbClr r="0" g="0" b="0"/>
+            </a:lnRef>
+            <a:fillRef idx="0">
+              <a:scrgbClr r="0" g="0" b="0"/>
+            </a:fillRef>
+            <a:effectRef idx="0">
+              <a:scrgbClr r="0" g="0" b="0"/>
+            </a:effectRef>
+            <a:fontRef idx="minor">
+              <a:schemeClr val="dk1"/>
+            </a:fontRef>
+          </p:style>
+          <p:txBody>
+            <a:bodyPr rtlCol="0" anchor="ctr"/>
+            <a:lstStyle/>
+            <a:p>
+              <a:pPr algn="ctr"/>
+              <a:r>
+                <a:rPr lang="de-AT" b="1" dirty="0" err="1">
+                  <a:latin typeface="Arial" panose="020B0604020202020204" pitchFamily="34" charset="0"/>
+                  <a:cs typeface="Arial" panose="020B0604020202020204" pitchFamily="34" charset="0"/>
+                </a:rPr>
+                <a:t>DTElement</a:t>
+              </a:r>
+              <a:endParaRPr lang="de-AT" b="1" dirty="0">
+                <a:latin typeface="Arial" panose="020B0604020202020204" pitchFamily="34" charset="0"/>
+                <a:cs typeface="Arial" panose="020B0604020202020204" pitchFamily="34" charset="0"/>
+              </a:endParaRPr>
+            </a:p>
+          </p:txBody>
+        </p:sp>
+        <p:sp>
+          <p:nvSpPr>
+            <p:cNvPr id="46" name="Rechteck 45">
+              <a:extLst>
+                <a:ext uri="{FF2B5EF4-FFF2-40B4-BE49-F238E27FC236}">
+                  <a16:creationId xmlns:a16="http://schemas.microsoft.com/office/drawing/2014/main" id="{9CA66CF3-4B1A-43E6-B7E3-E946C6B45475}"/>
+                </a:ext>
+              </a:extLst>
+            </p:cNvPr>
+            <p:cNvSpPr/>
+            <p:nvPr/>
+          </p:nvSpPr>
+          <p:spPr>
+            <a:xfrm>
+              <a:off x="3484880" y="1038386"/>
+              <a:ext cx="2529840" cy="428786"/>
+            </a:xfrm>
+            <a:prstGeom prst="rect">
+              <a:avLst/>
+            </a:prstGeom>
+            <a:noFill/>
+            <a:ln w="9525" cap="flat" cmpd="sng" algn="ctr">
+              <a:solidFill>
+                <a:schemeClr val="dk1"/>
+              </a:solidFill>
+              <a:prstDash val="solid"/>
+              <a:round/>
+              <a:headEnd type="none" w="med" len="med"/>
+              <a:tailEnd type="arrow" w="med" len="med"/>
+            </a:ln>
+          </p:spPr>
+          <p:style>
+            <a:lnRef idx="0">
+              <a:scrgbClr r="0" g="0" b="0"/>
+            </a:lnRef>
+            <a:fillRef idx="0">
+              <a:scrgbClr r="0" g="0" b="0"/>
+            </a:fillRef>
+            <a:effectRef idx="0">
+              <a:scrgbClr r="0" g="0" b="0"/>
+            </a:effectRef>
+            <a:fontRef idx="minor">
+              <a:schemeClr val="dk1"/>
+            </a:fontRef>
+          </p:style>
+          <p:txBody>
+            <a:bodyPr rtlCol="0" anchor="ctr"/>
+            <a:lstStyle/>
+            <a:p>
+              <a:pPr algn="ctr"/>
+              <a:r>
+                <a:rPr lang="de-AT" dirty="0" err="1">
+                  <a:latin typeface="Arial" panose="020B0604020202020204" pitchFamily="34" charset="0"/>
+                  <a:cs typeface="Arial" panose="020B0604020202020204" pitchFamily="34" charset="0"/>
+                </a:rPr>
+                <a:t>displayName</a:t>
+              </a:r>
+              <a:r>
+                <a:rPr lang="de-AT" dirty="0">
+                  <a:latin typeface="Arial" panose="020B0604020202020204" pitchFamily="34" charset="0"/>
+                  <a:cs typeface="Arial" panose="020B0604020202020204" pitchFamily="34" charset="0"/>
+                </a:rPr>
+                <a:t>: String</a:t>
+              </a:r>
+            </a:p>
+            <a:p>
+              <a:pPr algn="ctr"/>
+              <a:r>
+                <a:rPr lang="de-AT" dirty="0">
+                  <a:latin typeface="Arial" panose="020B0604020202020204" pitchFamily="34" charset="0"/>
+                  <a:cs typeface="Arial" panose="020B0604020202020204" pitchFamily="34" charset="0"/>
+                </a:rPr>
+                <a:t>Description: String</a:t>
+              </a:r>
+            </a:p>
+            <a:p>
+              <a:pPr algn="ctr"/>
+              <a:r>
+                <a:rPr lang="de-AT" dirty="0">
+                  <a:latin typeface="Arial" panose="020B0604020202020204" pitchFamily="34" charset="0"/>
+                  <a:cs typeface="Arial" panose="020B0604020202020204" pitchFamily="34" charset="0"/>
+                </a:rPr>
+                <a:t>Comment: String</a:t>
+              </a:r>
+            </a:p>
+          </p:txBody>
+        </p:sp>
+      </p:grpSp>
+      <p:grpSp>
+        <p:nvGrpSpPr>
+          <p:cNvPr id="47" name="Gruppieren 46">
+            <a:extLst>
+              <a:ext uri="{FF2B5EF4-FFF2-40B4-BE49-F238E27FC236}">
+                <a16:creationId xmlns:a16="http://schemas.microsoft.com/office/drawing/2014/main" id="{B470326F-5452-4F5D-818E-C7D908BA037A}"/>
+              </a:ext>
+            </a:extLst>
+          </p:cNvPr>
+          <p:cNvGrpSpPr/>
+          <p:nvPr/>
+        </p:nvGrpSpPr>
+        <p:grpSpPr>
+          <a:xfrm>
+            <a:off x="650143" y="724250"/>
+            <a:ext cx="1578362" cy="820424"/>
+            <a:chOff x="3484880" y="609600"/>
+            <a:chExt cx="2529840" cy="857572"/>
+          </a:xfrm>
+        </p:grpSpPr>
+        <p:sp>
+          <p:nvSpPr>
+            <p:cNvPr id="48" name="Rechteck 47">
+              <a:extLst>
+                <a:ext uri="{FF2B5EF4-FFF2-40B4-BE49-F238E27FC236}">
+                  <a16:creationId xmlns:a16="http://schemas.microsoft.com/office/drawing/2014/main" id="{7CC6EF15-114C-4790-AF31-DECA8578FC2B}"/>
+                </a:ext>
+              </a:extLst>
+            </p:cNvPr>
+            <p:cNvSpPr/>
+            <p:nvPr/>
+          </p:nvSpPr>
+          <p:spPr>
+            <a:xfrm>
+              <a:off x="3484880" y="609600"/>
+              <a:ext cx="2529840" cy="428786"/>
+            </a:xfrm>
+            <a:prstGeom prst="rect">
+              <a:avLst/>
+            </a:prstGeom>
+            <a:noFill/>
+            <a:ln w="9525" cap="flat" cmpd="sng" algn="ctr">
+              <a:solidFill>
+                <a:schemeClr val="dk1"/>
+              </a:solidFill>
+              <a:prstDash val="solid"/>
+              <a:round/>
+              <a:headEnd type="none" w="med" len="med"/>
+              <a:tailEnd type="arrow" w="med" len="med"/>
+            </a:ln>
+          </p:spPr>
+          <p:style>
+            <a:lnRef idx="0">
+              <a:scrgbClr r="0" g="0" b="0"/>
+            </a:lnRef>
+            <a:fillRef idx="0">
+              <a:scrgbClr r="0" g="0" b="0"/>
+            </a:fillRef>
+            <a:effectRef idx="0">
+              <a:scrgbClr r="0" g="0" b="0"/>
+            </a:effectRef>
+            <a:fontRef idx="minor">
+              <a:schemeClr val="dk1"/>
+            </a:fontRef>
+          </p:style>
+          <p:txBody>
+            <a:bodyPr rtlCol="0" anchor="ctr"/>
+            <a:lstStyle/>
+            <a:p>
+              <a:pPr algn="ctr"/>
+              <a:r>
+                <a:rPr lang="de-AT" b="1" dirty="0">
+                  <a:latin typeface="Arial" panose="020B0604020202020204" pitchFamily="34" charset="0"/>
+                  <a:cs typeface="Arial" panose="020B0604020202020204" pitchFamily="34" charset="0"/>
+                </a:rPr>
+                <a:t>DTMI</a:t>
+              </a:r>
+            </a:p>
+          </p:txBody>
+        </p:sp>
+        <p:sp>
+          <p:nvSpPr>
+            <p:cNvPr id="49" name="Rechteck 48">
+              <a:extLst>
+                <a:ext uri="{FF2B5EF4-FFF2-40B4-BE49-F238E27FC236}">
+                  <a16:creationId xmlns:a16="http://schemas.microsoft.com/office/drawing/2014/main" id="{9CDB77B4-CA9A-49AC-B8CC-18783475BA4A}"/>
+                </a:ext>
+              </a:extLst>
+            </p:cNvPr>
+            <p:cNvSpPr/>
+            <p:nvPr/>
+          </p:nvSpPr>
+          <p:spPr>
+            <a:xfrm>
+              <a:off x="3484880" y="1038386"/>
+              <a:ext cx="2529840" cy="428786"/>
+            </a:xfrm>
+            <a:prstGeom prst="rect">
+              <a:avLst/>
+            </a:prstGeom>
+            <a:noFill/>
+            <a:ln w="9525" cap="flat" cmpd="sng" algn="ctr">
+              <a:solidFill>
+                <a:schemeClr val="dk1"/>
+              </a:solidFill>
+              <a:prstDash val="solid"/>
+              <a:round/>
+              <a:headEnd type="none" w="med" len="med"/>
+              <a:tailEnd type="arrow" w="med" len="med"/>
+            </a:ln>
+          </p:spPr>
+          <p:style>
+            <a:lnRef idx="0">
+              <a:scrgbClr r="0" g="0" b="0"/>
+            </a:lnRef>
+            <a:fillRef idx="0">
+              <a:scrgbClr r="0" g="0" b="0"/>
+            </a:fillRef>
+            <a:effectRef idx="0">
+              <a:scrgbClr r="0" g="0" b="0"/>
+            </a:effectRef>
+            <a:fontRef idx="minor">
+              <a:schemeClr val="dk1"/>
+            </a:fontRef>
+          </p:style>
+          <p:txBody>
+            <a:bodyPr rtlCol="0" anchor="ctr"/>
+            <a:lstStyle/>
+            <a:p>
+              <a:pPr algn="ctr"/>
+              <a:r>
+                <a:rPr lang="de-AT" dirty="0">
+                  <a:latin typeface="Arial" panose="020B0604020202020204" pitchFamily="34" charset="0"/>
+                  <a:cs typeface="Arial" panose="020B0604020202020204" pitchFamily="34" charset="0"/>
+                </a:rPr>
+                <a:t>Scheme: String</a:t>
+              </a:r>
+            </a:p>
+            <a:p>
+              <a:pPr algn="ctr"/>
+              <a:r>
+                <a:rPr lang="de-AT" dirty="0">
+                  <a:latin typeface="Arial" panose="020B0604020202020204" pitchFamily="34" charset="0"/>
+                  <a:cs typeface="Arial" panose="020B0604020202020204" pitchFamily="34" charset="0"/>
+                </a:rPr>
+                <a:t>Path: String</a:t>
+              </a:r>
+            </a:p>
+            <a:p>
+              <a:pPr algn="ctr"/>
+              <a:r>
+                <a:rPr lang="de-AT" dirty="0">
+                  <a:latin typeface="Arial" panose="020B0604020202020204" pitchFamily="34" charset="0"/>
+                  <a:cs typeface="Arial" panose="020B0604020202020204" pitchFamily="34" charset="0"/>
+                </a:rPr>
+                <a:t>Version: </a:t>
+              </a:r>
+              <a:r>
+                <a:rPr lang="de-AT" dirty="0" err="1">
+                  <a:latin typeface="Arial" panose="020B0604020202020204" pitchFamily="34" charset="0"/>
+                  <a:cs typeface="Arial" panose="020B0604020202020204" pitchFamily="34" charset="0"/>
+                </a:rPr>
+                <a:t>Int</a:t>
+              </a:r>
+              <a:endParaRPr lang="de-AT" dirty="0">
+                <a:latin typeface="Arial" panose="020B0604020202020204" pitchFamily="34" charset="0"/>
+                <a:cs typeface="Arial" panose="020B0604020202020204" pitchFamily="34" charset="0"/>
+              </a:endParaRPr>
+            </a:p>
+          </p:txBody>
+        </p:sp>
+      </p:grpSp>
       <p:cxnSp>
         <p:nvCxnSpPr>
-          <p:cNvPr id="86" name="Verbinder: gewinkelt 171">
-            <a:extLst>
-              <a:ext uri="{FF2B5EF4-FFF2-40B4-BE49-F238E27FC236}">
-                <a16:creationId xmlns:a16="http://schemas.microsoft.com/office/drawing/2014/main" id="{F722153F-0738-4C73-A978-D3E6F75BE852}"/>
+          <p:cNvPr id="51" name="Verbinder: gewinkelt 171">
+            <a:extLst>
+              <a:ext uri="{FF2B5EF4-FFF2-40B4-BE49-F238E27FC236}">
+                <a16:creationId xmlns:a16="http://schemas.microsoft.com/office/drawing/2014/main" id="{35BA1016-0498-4902-99C2-565A2D1BA98A}"/>
               </a:ext>
             </a:extLst>
           </p:cNvPr>
           <p:cNvCxnSpPr>
             <a:cxnSpLocks/>
-            <a:stCxn id="85" idx="2"/>
-            <a:endCxn id="18" idx="0"/>
+            <a:stCxn id="9" idx="0"/>
+            <a:endCxn id="10" idx="1"/>
           </p:cNvCxnSpPr>
           <p:nvPr/>
         </p:nvCxnSpPr>
         <p:spPr>
-          <a:xfrm rot="16200000" flipH="1">
-            <a:off x="5352769" y="3436009"/>
-            <a:ext cx="1886734" cy="1656482"/>
+          <a:xfrm rot="16200000" flipH="1" flipV="1">
+            <a:off x="4791313" y="1360445"/>
+            <a:ext cx="615318" cy="632461"/>
           </a:xfrm>
-          <a:prstGeom prst="bentConnector3">
+          <a:prstGeom prst="bentConnector4">
             <a:avLst>
-              <a:gd name="adj1" fmla="val 50000"/>
+              <a:gd name="adj1" fmla="val -37152"/>
+              <a:gd name="adj2" fmla="val 136145"/>
             </a:avLst>
           </a:prstGeom>
           <a:ln>
@@ -4785,31 +5437,212 @@
           </a:fontRef>
         </p:style>
       </p:cxnSp>
+      <p:grpSp>
+        <p:nvGrpSpPr>
+          <p:cNvPr id="57" name="Gruppieren 56">
+            <a:extLst>
+              <a:ext uri="{FF2B5EF4-FFF2-40B4-BE49-F238E27FC236}">
+                <a16:creationId xmlns:a16="http://schemas.microsoft.com/office/drawing/2014/main" id="{15F6D3F8-6381-45B5-A5E2-B634B866084A}"/>
+              </a:ext>
+            </a:extLst>
+          </p:cNvPr>
+          <p:cNvGrpSpPr/>
+          <p:nvPr/>
+        </p:nvGrpSpPr>
+        <p:grpSpPr>
+          <a:xfrm>
+            <a:off x="10026334" y="4951435"/>
+            <a:ext cx="2056755" cy="1409668"/>
+            <a:chOff x="3484880" y="609600"/>
+            <a:chExt cx="2879997" cy="1143434"/>
+          </a:xfrm>
+        </p:grpSpPr>
+        <p:sp>
+          <p:nvSpPr>
+            <p:cNvPr id="58" name="Rechteck 57">
+              <a:extLst>
+                <a:ext uri="{FF2B5EF4-FFF2-40B4-BE49-F238E27FC236}">
+                  <a16:creationId xmlns:a16="http://schemas.microsoft.com/office/drawing/2014/main" id="{EA0D2D79-7DA9-4B8D-86FE-CC209EEC2775}"/>
+                </a:ext>
+              </a:extLst>
+            </p:cNvPr>
+            <p:cNvSpPr/>
+            <p:nvPr/>
+          </p:nvSpPr>
+          <p:spPr>
+            <a:xfrm>
+              <a:off x="3484880" y="609600"/>
+              <a:ext cx="2879997" cy="428786"/>
+            </a:xfrm>
+            <a:prstGeom prst="rect">
+              <a:avLst/>
+            </a:prstGeom>
+            <a:noFill/>
+            <a:ln w="9525" cap="flat" cmpd="sng" algn="ctr">
+              <a:solidFill>
+                <a:schemeClr val="dk1"/>
+              </a:solidFill>
+              <a:prstDash val="solid"/>
+              <a:round/>
+              <a:headEnd type="none" w="med" len="med"/>
+              <a:tailEnd type="arrow" w="med" len="med"/>
+            </a:ln>
+          </p:spPr>
+          <p:style>
+            <a:lnRef idx="0">
+              <a:scrgbClr r="0" g="0" b="0"/>
+            </a:lnRef>
+            <a:fillRef idx="0">
+              <a:scrgbClr r="0" g="0" b="0"/>
+            </a:fillRef>
+            <a:effectRef idx="0">
+              <a:scrgbClr r="0" g="0" b="0"/>
+            </a:effectRef>
+            <a:fontRef idx="minor">
+              <a:schemeClr val="dk1"/>
+            </a:fontRef>
+          </p:style>
+          <p:txBody>
+            <a:bodyPr rtlCol="0" anchor="ctr"/>
+            <a:lstStyle/>
+            <a:p>
+              <a:pPr algn="ctr"/>
+              <a:r>
+                <a:rPr lang="de-AT" sz="2000" b="1" dirty="0" err="1">
+                  <a:latin typeface="Arial" panose="020B0604020202020204" pitchFamily="34" charset="0"/>
+                  <a:cs typeface="Arial" panose="020B0604020202020204" pitchFamily="34" charset="0"/>
+                </a:rPr>
+                <a:t>Component</a:t>
+              </a:r>
+              <a:endParaRPr lang="de-AT" sz="2000" b="1" dirty="0">
+                <a:latin typeface="Arial" panose="020B0604020202020204" pitchFamily="34" charset="0"/>
+                <a:cs typeface="Arial" panose="020B0604020202020204" pitchFamily="34" charset="0"/>
+              </a:endParaRPr>
+            </a:p>
+          </p:txBody>
+        </p:sp>
+        <p:sp>
+          <p:nvSpPr>
+            <p:cNvPr id="59" name="Rechteck 58">
+              <a:extLst>
+                <a:ext uri="{FF2B5EF4-FFF2-40B4-BE49-F238E27FC236}">
+                  <a16:creationId xmlns:a16="http://schemas.microsoft.com/office/drawing/2014/main" id="{F2B74DB5-D91E-42BC-BCE0-FCA3161FD18B}"/>
+                </a:ext>
+              </a:extLst>
+            </p:cNvPr>
+            <p:cNvSpPr/>
+            <p:nvPr/>
+          </p:nvSpPr>
+          <p:spPr>
+            <a:xfrm>
+              <a:off x="3484880" y="1038386"/>
+              <a:ext cx="2879997" cy="714648"/>
+            </a:xfrm>
+            <a:prstGeom prst="rect">
+              <a:avLst/>
+            </a:prstGeom>
+            <a:noFill/>
+            <a:ln w="9525" cap="flat" cmpd="sng" algn="ctr">
+              <a:solidFill>
+                <a:schemeClr val="dk1"/>
+              </a:solidFill>
+              <a:prstDash val="solid"/>
+              <a:round/>
+              <a:headEnd type="none" w="med" len="med"/>
+              <a:tailEnd type="arrow" w="med" len="med"/>
+            </a:ln>
+          </p:spPr>
+          <p:style>
+            <a:lnRef idx="0">
+              <a:scrgbClr r="0" g="0" b="0"/>
+            </a:lnRef>
+            <a:fillRef idx="0">
+              <a:scrgbClr r="0" g="0" b="0"/>
+            </a:fillRef>
+            <a:effectRef idx="0">
+              <a:scrgbClr r="0" g="0" b="0"/>
+            </a:effectRef>
+            <a:fontRef idx="minor">
+              <a:schemeClr val="dk1"/>
+            </a:fontRef>
+          </p:style>
+          <p:txBody>
+            <a:bodyPr rtlCol="0" anchor="ctr"/>
+            <a:lstStyle/>
+            <a:p>
+              <a:r>
+                <a:rPr lang="de-AT" dirty="0">
+                  <a:latin typeface="Arial" panose="020B0604020202020204" pitchFamily="34" charset="0"/>
+                  <a:cs typeface="Arial" panose="020B0604020202020204" pitchFamily="34" charset="0"/>
+                </a:rPr>
+                <a:t>Name: String</a:t>
+              </a:r>
+            </a:p>
+          </p:txBody>
+        </p:sp>
+      </p:grpSp>
+      <p:sp>
+        <p:nvSpPr>
+          <p:cNvPr id="7" name="Textfeld 6">
+            <a:extLst>
+              <a:ext uri="{FF2B5EF4-FFF2-40B4-BE49-F238E27FC236}">
+                <a16:creationId xmlns:a16="http://schemas.microsoft.com/office/drawing/2014/main" id="{7E278B90-3489-4211-9729-3112FB2ACCF1}"/>
+              </a:ext>
+            </a:extLst>
+          </p:cNvPr>
+          <p:cNvSpPr txBox="1"/>
+          <p:nvPr/>
+        </p:nvSpPr>
+        <p:spPr>
+          <a:xfrm>
+            <a:off x="4521731" y="786321"/>
+            <a:ext cx="1525931" cy="369332"/>
+          </a:xfrm>
+          <a:prstGeom prst="rect">
+            <a:avLst/>
+          </a:prstGeom>
+          <a:noFill/>
+        </p:spPr>
+        <p:txBody>
+          <a:bodyPr wrap="none" rtlCol="0">
+            <a:spAutoFit/>
+          </a:bodyPr>
+          <a:lstStyle/>
+          <a:p>
+            <a:r>
+              <a:rPr lang="de-AT" dirty="0" err="1"/>
+              <a:t>extends</a:t>
+            </a:r>
+            <a:r>
+              <a:rPr lang="de-AT" dirty="0"/>
+              <a:t>: [0..2]</a:t>
+            </a:r>
+          </a:p>
+        </p:txBody>
+      </p:sp>
       <p:cxnSp>
         <p:nvCxnSpPr>
-          <p:cNvPr id="96" name="Verbinder: gewinkelt 171">
-            <a:extLst>
-              <a:ext uri="{FF2B5EF4-FFF2-40B4-BE49-F238E27FC236}">
-                <a16:creationId xmlns:a16="http://schemas.microsoft.com/office/drawing/2014/main" id="{0F9CA7FC-4649-4906-8B82-E8E1AAD426B5}"/>
+          <p:cNvPr id="60" name="Verbinder: gewinkelt 171">
+            <a:extLst>
+              <a:ext uri="{FF2B5EF4-FFF2-40B4-BE49-F238E27FC236}">
+                <a16:creationId xmlns:a16="http://schemas.microsoft.com/office/drawing/2014/main" id="{5EB6AD48-2AB7-49FC-9FCB-FB85553F49BC}"/>
               </a:ext>
             </a:extLst>
           </p:cNvPr>
           <p:cNvCxnSpPr>
             <a:cxnSpLocks/>
-            <a:stCxn id="85" idx="2"/>
-            <a:endCxn id="73" idx="0"/>
+            <a:stCxn id="58" idx="0"/>
+            <a:endCxn id="9" idx="3"/>
           </p:cNvCxnSpPr>
           <p:nvPr/>
         </p:nvCxnSpPr>
         <p:spPr>
-          <a:xfrm rot="5400000">
-            <a:off x="3866413" y="3490545"/>
-            <a:ext cx="1771144" cy="1431820"/>
+          <a:xfrm rot="16200000" flipV="1">
+            <a:off x="6862532" y="759254"/>
+            <a:ext cx="3377312" cy="5007049"/>
           </a:xfrm>
-          <a:prstGeom prst="bentConnector3">
-            <a:avLst>
-              <a:gd name="adj1" fmla="val 50000"/>
-            </a:avLst>
+          <a:prstGeom prst="bentConnector2">
+            <a:avLst/>
           </a:prstGeom>
           <a:ln>
             <a:headEnd type="none" w="med" len="med"/>
@@ -4831,26 +5664,75 @@
           </a:fontRef>
         </p:style>
       </p:cxnSp>
+      <p:sp>
+        <p:nvSpPr>
+          <p:cNvPr id="61" name="Textfeld 60">
+            <a:extLst>
+              <a:ext uri="{FF2B5EF4-FFF2-40B4-BE49-F238E27FC236}">
+                <a16:creationId xmlns:a16="http://schemas.microsoft.com/office/drawing/2014/main" id="{3BA5FE68-6C83-408B-8375-AE49DAE90778}"/>
+              </a:ext>
+            </a:extLst>
+          </p:cNvPr>
+          <p:cNvSpPr txBox="1"/>
+          <p:nvPr/>
+        </p:nvSpPr>
+        <p:spPr>
+          <a:xfrm>
+            <a:off x="6144339" y="1225118"/>
+            <a:ext cx="2079276" cy="369332"/>
+          </a:xfrm>
+          <a:prstGeom prst="rect">
+            <a:avLst/>
+          </a:prstGeom>
+          <a:noFill/>
+        </p:spPr>
+        <p:txBody>
+          <a:bodyPr wrap="square" rtlCol="0">
+            <a:spAutoFit/>
+          </a:bodyPr>
+          <a:lstStyle/>
+          <a:p>
+            <a:r>
+              <a:rPr lang="de-AT" sz="1600" dirty="0">
+                <a:latin typeface="Arial" panose="020B0604020202020204" pitchFamily="34" charset="0"/>
+                <a:cs typeface="Arial" panose="020B0604020202020204" pitchFamily="34" charset="0"/>
+              </a:rPr>
+              <a:t>[1..1] </a:t>
+            </a:r>
+            <a:r>
+              <a:rPr lang="de-AT" dirty="0" err="1">
+                <a:latin typeface="Arial" panose="020B0604020202020204" pitchFamily="34" charset="0"/>
+                <a:cs typeface="Arial" panose="020B0604020202020204" pitchFamily="34" charset="0"/>
+              </a:rPr>
+              <a:t>schema</a:t>
+            </a:r>
+            <a:endParaRPr lang="de-AT" dirty="0">
+              <a:latin typeface="Arial" panose="020B0604020202020204" pitchFamily="34" charset="0"/>
+              <a:cs typeface="Arial" panose="020B0604020202020204" pitchFamily="34" charset="0"/>
+            </a:endParaRPr>
+          </a:p>
+        </p:txBody>
+      </p:sp>
       <p:cxnSp>
         <p:nvCxnSpPr>
-          <p:cNvPr id="99" name="Verbinder: gewinkelt 171">
-            <a:extLst>
-              <a:ext uri="{FF2B5EF4-FFF2-40B4-BE49-F238E27FC236}">
-                <a16:creationId xmlns:a16="http://schemas.microsoft.com/office/drawing/2014/main" id="{F1CA2390-3203-4321-9105-7CCF5A7A33D0}"/>
+          <p:cNvPr id="69" name="Verbinder: gewinkelt 171">
+            <a:extLst>
+              <a:ext uri="{FF2B5EF4-FFF2-40B4-BE49-F238E27FC236}">
+                <a16:creationId xmlns:a16="http://schemas.microsoft.com/office/drawing/2014/main" id="{1475F4F0-BFC7-4C17-80DD-DC7B8FA84539}"/>
               </a:ext>
             </a:extLst>
           </p:cNvPr>
           <p:cNvCxnSpPr>
             <a:cxnSpLocks/>
-            <a:stCxn id="85" idx="2"/>
-            <a:endCxn id="79" idx="0"/>
+            <a:stCxn id="22" idx="1"/>
+            <a:endCxn id="19" idx="3"/>
           </p:cNvCxnSpPr>
           <p:nvPr/>
         </p:nvCxnSpPr>
         <p:spPr>
-          <a:xfrm rot="5400000">
-            <a:off x="2617882" y="2211702"/>
-            <a:ext cx="1740833" cy="3959195"/>
+          <a:xfrm rot="10800000" flipV="1">
+            <a:off x="7016690" y="5996216"/>
+            <a:ext cx="1147578" cy="86830"/>
           </a:xfrm>
           <a:prstGeom prst="bentConnector3">
             <a:avLst>
@@ -4879,51 +5761,47 @@
       </p:cxnSp>
       <p:sp>
         <p:nvSpPr>
-          <p:cNvPr id="102" name="Raute 101">
-            <a:extLst>
-              <a:ext uri="{FF2B5EF4-FFF2-40B4-BE49-F238E27FC236}">
-                <a16:creationId xmlns:a16="http://schemas.microsoft.com/office/drawing/2014/main" id="{CB7584A6-ABF7-4717-AE09-77F1E298835D}"/>
-              </a:ext>
-            </a:extLst>
-          </p:cNvPr>
-          <p:cNvSpPr/>
+          <p:cNvPr id="75" name="Textfeld 74">
+            <a:extLst>
+              <a:ext uri="{FF2B5EF4-FFF2-40B4-BE49-F238E27FC236}">
+                <a16:creationId xmlns:a16="http://schemas.microsoft.com/office/drawing/2014/main" id="{4548FF3D-AD0D-4073-9ED5-09FF47FA0C8F}"/>
+              </a:ext>
+            </a:extLst>
+          </p:cNvPr>
+          <p:cNvSpPr txBox="1"/>
           <p:nvPr/>
         </p:nvSpPr>
         <p:spPr>
-          <a:xfrm rot="168924" flipH="1">
-            <a:off x="934731" y="4795789"/>
-            <a:ext cx="252119" cy="235049"/>
+          <a:xfrm>
+            <a:off x="6942052" y="5266587"/>
+            <a:ext cx="1363851" cy="615553"/>
           </a:xfrm>
-          <a:prstGeom prst="diamond">
+          <a:prstGeom prst="rect">
             <a:avLst/>
           </a:prstGeom>
-          <a:ln>
-            <a:headEnd type="none" w="med" len="med"/>
-            <a:tailEnd type="arrow" w="med" len="med"/>
-          </a:ln>
+          <a:noFill/>
         </p:spPr>
-        <p:style>
-          <a:lnRef idx="2">
-            <a:schemeClr val="dk1">
-              <a:shade val="50000"/>
-            </a:schemeClr>
-          </a:lnRef>
-          <a:fillRef idx="1">
-            <a:schemeClr val="dk1"/>
-          </a:fillRef>
-          <a:effectRef idx="0">
-            <a:schemeClr val="dk1"/>
-          </a:effectRef>
-          <a:fontRef idx="minor">
-            <a:schemeClr val="lt1"/>
-          </a:fontRef>
-        </p:style>
         <p:txBody>
-          <a:bodyPr rtlCol="0" anchor="ctr"/>
+          <a:bodyPr wrap="square" rtlCol="0">
+            <a:spAutoFit/>
+          </a:bodyPr>
           <a:lstStyle/>
           <a:p>
-            <a:pPr algn="ctr"/>
-            <a:endParaRPr lang="de-AT">
+            <a:r>
+              <a:rPr lang="de-AT" sz="1600" dirty="0">
+                <a:latin typeface="Arial" panose="020B0604020202020204" pitchFamily="34" charset="0"/>
+                <a:cs typeface="Arial" panose="020B0604020202020204" pitchFamily="34" charset="0"/>
+              </a:rPr>
+              <a:t>[0..300] </a:t>
+            </a:r>
+            <a:r>
+              <a:rPr lang="de-AT" dirty="0" err="1">
+                <a:latin typeface="Arial" panose="020B0604020202020204" pitchFamily="34" charset="0"/>
+                <a:cs typeface="Arial" panose="020B0604020202020204" pitchFamily="34" charset="0"/>
+              </a:rPr>
+              <a:t>properties</a:t>
+            </a:r>
+            <a:endParaRPr lang="de-AT" dirty="0">
               <a:latin typeface="Arial" panose="020B0604020202020204" pitchFamily="34" charset="0"/>
               <a:cs typeface="Arial" panose="020B0604020202020204" pitchFamily="34" charset="0"/>
             </a:endParaRPr>
@@ -4932,75 +5810,27 @@
       </p:sp>
       <p:cxnSp>
         <p:nvCxnSpPr>
-          <p:cNvPr id="103" name="Verbinder: gewinkelt 171">
-            <a:extLst>
-              <a:ext uri="{FF2B5EF4-FFF2-40B4-BE49-F238E27FC236}">
-                <a16:creationId xmlns:a16="http://schemas.microsoft.com/office/drawing/2014/main" id="{310C4C7D-E24F-4AC7-87FC-08021A425F69}"/>
+          <p:cNvPr id="77" name="Verbinder: gewinkelt 171">
+            <a:extLst>
+              <a:ext uri="{FF2B5EF4-FFF2-40B4-BE49-F238E27FC236}">
+                <a16:creationId xmlns:a16="http://schemas.microsoft.com/office/drawing/2014/main" id="{6E9F8B5E-BDA9-4CA5-AA27-750D0E3A3C02}"/>
               </a:ext>
             </a:extLst>
           </p:cNvPr>
           <p:cNvCxnSpPr>
             <a:cxnSpLocks/>
-            <a:stCxn id="102" idx="0"/>
-            <a:endCxn id="83" idx="2"/>
-          </p:cNvCxnSpPr>
-          <p:nvPr/>
-        </p:nvCxnSpPr>
-        <p:spPr>
-          <a:xfrm rot="5400000" flipH="1" flipV="1">
-            <a:off x="481753" y="3700587"/>
-            <a:ext cx="1680155" cy="510534"/>
-          </a:xfrm>
-          <a:prstGeom prst="bentConnector3">
-            <a:avLst>
-              <a:gd name="adj1" fmla="val 50000"/>
-            </a:avLst>
-          </a:prstGeom>
-          <a:ln>
-            <a:headEnd type="none" w="med" len="med"/>
-            <a:tailEnd type="arrow" w="med" len="med"/>
-          </a:ln>
-        </p:spPr>
-        <p:style>
-          <a:lnRef idx="1">
-            <a:schemeClr val="dk1"/>
-          </a:lnRef>
-          <a:fillRef idx="0">
-            <a:schemeClr val="dk1"/>
-          </a:fillRef>
-          <a:effectRef idx="0">
-            <a:schemeClr val="dk1"/>
-          </a:effectRef>
-          <a:fontRef idx="minor">
-            <a:schemeClr val="tx1"/>
-          </a:fontRef>
-        </p:style>
-      </p:cxnSp>
-      <p:cxnSp>
-        <p:nvCxnSpPr>
-          <p:cNvPr id="106" name="Verbinder: gewinkelt 171">
-            <a:extLst>
-              <a:ext uri="{FF2B5EF4-FFF2-40B4-BE49-F238E27FC236}">
-                <a16:creationId xmlns:a16="http://schemas.microsoft.com/office/drawing/2014/main" id="{10A3D31B-749B-4BC3-855B-AE32E0B6C9B6}"/>
-              </a:ext>
-            </a:extLst>
-          </p:cNvPr>
-          <p:cNvCxnSpPr>
-            <a:cxnSpLocks/>
-            <a:stCxn id="107" idx="0"/>
-            <a:endCxn id="83" idx="2"/>
+            <a:stCxn id="21" idx="0"/>
+            <a:endCxn id="10" idx="3"/>
           </p:cNvCxnSpPr>
           <p:nvPr/>
         </p:nvCxnSpPr>
         <p:spPr>
           <a:xfrm rot="16200000" flipV="1">
-            <a:off x="867147" y="3825726"/>
-            <a:ext cx="1730474" cy="310573"/>
+            <a:off x="6038080" y="1993919"/>
+            <a:ext cx="3009173" cy="2990006"/>
           </a:xfrm>
-          <a:prstGeom prst="bentConnector3">
-            <a:avLst>
-              <a:gd name="adj1" fmla="val 50000"/>
-            </a:avLst>
+          <a:prstGeom prst="bentConnector2">
+            <a:avLst/>
           </a:prstGeom>
           <a:ln>
             <a:headEnd type="none" w="med" len="med"/>
@@ -5024,63 +5854,10 @@
       </p:cxnSp>
       <p:sp>
         <p:nvSpPr>
-          <p:cNvPr id="107" name="Raute 106">
-            <a:extLst>
-              <a:ext uri="{FF2B5EF4-FFF2-40B4-BE49-F238E27FC236}">
-                <a16:creationId xmlns:a16="http://schemas.microsoft.com/office/drawing/2014/main" id="{185260BB-4138-4F20-978E-DFC26624E6C3}"/>
-              </a:ext>
-            </a:extLst>
-          </p:cNvPr>
-          <p:cNvSpPr/>
-          <p:nvPr/>
-        </p:nvSpPr>
-        <p:spPr>
-          <a:xfrm rot="168924" flipH="1">
-            <a:off x="1755838" y="4846108"/>
-            <a:ext cx="252119" cy="235049"/>
-          </a:xfrm>
-          <a:prstGeom prst="diamond">
-            <a:avLst/>
-          </a:prstGeom>
-          <a:ln>
-            <a:headEnd type="none" w="med" len="med"/>
-            <a:tailEnd type="arrow" w="med" len="med"/>
-          </a:ln>
-        </p:spPr>
-        <p:style>
-          <a:lnRef idx="2">
-            <a:schemeClr val="dk1">
-              <a:shade val="50000"/>
-            </a:schemeClr>
-          </a:lnRef>
-          <a:fillRef idx="1">
-            <a:schemeClr val="dk1"/>
-          </a:fillRef>
-          <a:effectRef idx="0">
-            <a:schemeClr val="dk1"/>
-          </a:effectRef>
-          <a:fontRef idx="minor">
-            <a:schemeClr val="lt1"/>
-          </a:fontRef>
-        </p:style>
-        <p:txBody>
-          <a:bodyPr rtlCol="0" anchor="ctr"/>
-          <a:lstStyle/>
-          <a:p>
-            <a:pPr algn="ctr"/>
-            <a:endParaRPr lang="de-AT">
-              <a:latin typeface="Arial" panose="020B0604020202020204" pitchFamily="34" charset="0"/>
-              <a:cs typeface="Arial" panose="020B0604020202020204" pitchFamily="34" charset="0"/>
-            </a:endParaRPr>
-          </a:p>
-        </p:txBody>
-      </p:sp>
-      <p:sp>
-        <p:nvSpPr>
-          <p:cNvPr id="110" name="Textfeld 109">
-            <a:extLst>
-              <a:ext uri="{FF2B5EF4-FFF2-40B4-BE49-F238E27FC236}">
-                <a16:creationId xmlns:a16="http://schemas.microsoft.com/office/drawing/2014/main" id="{BFFAC7F8-A565-4BA1-8EAB-EE9E38B0BC8E}"/>
+          <p:cNvPr id="84" name="Textfeld 83">
+            <a:extLst>
+              <a:ext uri="{FF2B5EF4-FFF2-40B4-BE49-F238E27FC236}">
+                <a16:creationId xmlns:a16="http://schemas.microsoft.com/office/drawing/2014/main" id="{7A2B20B6-EEC4-4B37-AC92-1D5CAFB528B6}"/>
               </a:ext>
             </a:extLst>
           </p:cNvPr>
@@ -5089,8 +5866,8 @@
         </p:nvSpPr>
         <p:spPr>
           <a:xfrm>
-            <a:off x="-152007" y="4494186"/>
-            <a:ext cx="1457395" cy="369332"/>
+            <a:off x="5394953" y="2547077"/>
+            <a:ext cx="1810837" cy="369332"/>
           </a:xfrm>
           <a:prstGeom prst="rect">
             <a:avLst/>
@@ -5115,7 +5892,7 @@
                 <a:latin typeface="Arial" panose="020B0604020202020204" pitchFamily="34" charset="0"/>
                 <a:cs typeface="Arial" panose="020B0604020202020204" pitchFamily="34" charset="0"/>
               </a:rPr>
-              <a:t>inputs</a:t>
+              <a:t>contents</a:t>
             </a:r>
             <a:endParaRPr lang="de-AT" dirty="0">
               <a:latin typeface="Arial" panose="020B0604020202020204" pitchFamily="34" charset="0"/>
@@ -5124,55 +5901,144 @@
           </a:p>
         </p:txBody>
       </p:sp>
-      <p:sp>
-        <p:nvSpPr>
-          <p:cNvPr id="111" name="Textfeld 110">
-            <a:extLst>
-              <a:ext uri="{FF2B5EF4-FFF2-40B4-BE49-F238E27FC236}">
-                <a16:creationId xmlns:a16="http://schemas.microsoft.com/office/drawing/2014/main" id="{1C7D9B4E-4D9E-447B-B862-2FCEDFF99175}"/>
-              </a:ext>
-            </a:extLst>
-          </p:cNvPr>
-          <p:cNvSpPr txBox="1"/>
+      <p:cxnSp>
+        <p:nvCxnSpPr>
+          <p:cNvPr id="87" name="Verbinder: gewinkelt 171">
+            <a:extLst>
+              <a:ext uri="{FF2B5EF4-FFF2-40B4-BE49-F238E27FC236}">
+                <a16:creationId xmlns:a16="http://schemas.microsoft.com/office/drawing/2014/main" id="{9AED0297-CF91-42E1-8095-A18F3366EA07}"/>
+              </a:ext>
+            </a:extLst>
+          </p:cNvPr>
+          <p:cNvCxnSpPr>
+            <a:cxnSpLocks/>
+            <a:stCxn id="21" idx="0"/>
+            <a:endCxn id="42" idx="2"/>
+          </p:cNvCxnSpPr>
           <p:nvPr/>
-        </p:nvSpPr>
+        </p:nvCxnSpPr>
         <p:spPr>
-          <a:xfrm>
-            <a:off x="2013578" y="4605073"/>
-            <a:ext cx="2004548" cy="369332"/>
+          <a:xfrm rot="16200000" flipV="1">
+            <a:off x="6582685" y="2538524"/>
+            <a:ext cx="1238644" cy="3671324"/>
           </a:xfrm>
-          <a:prstGeom prst="rect">
-            <a:avLst/>
+          <a:prstGeom prst="bentConnector3">
+            <a:avLst>
+              <a:gd name="adj1" fmla="val 50000"/>
+            </a:avLst>
           </a:prstGeom>
-          <a:noFill/>
+          <a:ln>
+            <a:headEnd type="none" w="med" len="med"/>
+            <a:tailEnd type="triangle" w="med" len="med"/>
+          </a:ln>
         </p:spPr>
-        <p:txBody>
-          <a:bodyPr wrap="square" rtlCol="0">
-            <a:spAutoFit/>
-          </a:bodyPr>
-          <a:lstStyle/>
-          <a:p>
-            <a:r>
-              <a:rPr lang="de-AT" sz="1600" dirty="0">
-                <a:latin typeface="Arial" panose="020B0604020202020204" pitchFamily="34" charset="0"/>
-                <a:cs typeface="Arial" panose="020B0604020202020204" pitchFamily="34" charset="0"/>
-              </a:rPr>
-              <a:t>[0..1] </a:t>
-            </a:r>
-            <a:r>
-              <a:rPr lang="de-AT" dirty="0" err="1">
-                <a:latin typeface="Arial" panose="020B0604020202020204" pitchFamily="34" charset="0"/>
-                <a:cs typeface="Arial" panose="020B0604020202020204" pitchFamily="34" charset="0"/>
-              </a:rPr>
-              <a:t>result</a:t>
-            </a:r>
-            <a:endParaRPr lang="de-AT" dirty="0">
-              <a:latin typeface="Arial" panose="020B0604020202020204" pitchFamily="34" charset="0"/>
-              <a:cs typeface="Arial" panose="020B0604020202020204" pitchFamily="34" charset="0"/>
-            </a:endParaRPr>
-          </a:p>
-        </p:txBody>
-      </p:sp>
+        <p:style>
+          <a:lnRef idx="1">
+            <a:schemeClr val="dk1"/>
+          </a:lnRef>
+          <a:fillRef idx="0">
+            <a:schemeClr val="dk1"/>
+          </a:fillRef>
+          <a:effectRef idx="0">
+            <a:schemeClr val="dk1"/>
+          </a:effectRef>
+          <a:fontRef idx="minor">
+            <a:schemeClr val="tx1"/>
+          </a:fontRef>
+        </p:style>
+      </p:cxnSp>
+      <p:cxnSp>
+        <p:nvCxnSpPr>
+          <p:cNvPr id="90" name="Verbinder: gewinkelt 171">
+            <a:extLst>
+              <a:ext uri="{FF2B5EF4-FFF2-40B4-BE49-F238E27FC236}">
+                <a16:creationId xmlns:a16="http://schemas.microsoft.com/office/drawing/2014/main" id="{0FD7BDC1-BAA5-4A2F-AB93-C1ECFDA7B4D9}"/>
+              </a:ext>
+            </a:extLst>
+          </p:cNvPr>
+          <p:cNvCxnSpPr>
+            <a:cxnSpLocks/>
+            <a:stCxn id="73" idx="0"/>
+            <a:endCxn id="42" idx="2"/>
+          </p:cNvCxnSpPr>
+          <p:nvPr/>
+        </p:nvCxnSpPr>
+        <p:spPr>
+          <a:xfrm rot="5400000" flipH="1" flipV="1">
+            <a:off x="3926331" y="3647123"/>
+            <a:ext cx="1332273" cy="1547756"/>
+          </a:xfrm>
+          <a:prstGeom prst="bentConnector3">
+            <a:avLst>
+              <a:gd name="adj1" fmla="val 50000"/>
+            </a:avLst>
+          </a:prstGeom>
+          <a:ln>
+            <a:headEnd type="none" w="med" len="med"/>
+            <a:tailEnd type="triangle" w="med" len="med"/>
+          </a:ln>
+        </p:spPr>
+        <p:style>
+          <a:lnRef idx="1">
+            <a:schemeClr val="dk1"/>
+          </a:lnRef>
+          <a:fillRef idx="0">
+            <a:schemeClr val="dk1"/>
+          </a:fillRef>
+          <a:effectRef idx="0">
+            <a:schemeClr val="dk1"/>
+          </a:effectRef>
+          <a:fontRef idx="minor">
+            <a:schemeClr val="tx1"/>
+          </a:fontRef>
+        </p:style>
+      </p:cxnSp>
+      <p:cxnSp>
+        <p:nvCxnSpPr>
+          <p:cNvPr id="95" name="Verbinder: gewinkelt 171">
+            <a:extLst>
+              <a:ext uri="{FF2B5EF4-FFF2-40B4-BE49-F238E27FC236}">
+                <a16:creationId xmlns:a16="http://schemas.microsoft.com/office/drawing/2014/main" id="{E804D7E0-C58A-4F4B-8AD5-19ABE26F4E15}"/>
+              </a:ext>
+            </a:extLst>
+          </p:cNvPr>
+          <p:cNvCxnSpPr>
+            <a:cxnSpLocks/>
+            <a:stCxn id="79" idx="0"/>
+            <a:endCxn id="42" idx="2"/>
+          </p:cNvCxnSpPr>
+          <p:nvPr/>
+        </p:nvCxnSpPr>
+        <p:spPr>
+          <a:xfrm rot="5400000" flipH="1" flipV="1">
+            <a:off x="2779650" y="2475022"/>
+            <a:ext cx="1306852" cy="3866537"/>
+          </a:xfrm>
+          <a:prstGeom prst="bentConnector3">
+            <a:avLst>
+              <a:gd name="adj1" fmla="val 50000"/>
+            </a:avLst>
+          </a:prstGeom>
+          <a:ln>
+            <a:headEnd type="none" w="med" len="med"/>
+            <a:tailEnd type="triangle" w="med" len="med"/>
+          </a:ln>
+        </p:spPr>
+        <p:style>
+          <a:lnRef idx="1">
+            <a:schemeClr val="dk1"/>
+          </a:lnRef>
+          <a:fillRef idx="0">
+            <a:schemeClr val="dk1"/>
+          </a:fillRef>
+          <a:effectRef idx="0">
+            <a:schemeClr val="dk1"/>
+          </a:effectRef>
+          <a:fontRef idx="minor">
+            <a:schemeClr val="tx1"/>
+          </a:fontRef>
+        </p:style>
+      </p:cxnSp>
     </p:spTree>
     <p:extLst>
       <p:ext uri="{BB962C8B-B14F-4D97-AF65-F5344CB8AC3E}">

</xml_diff>

<commit_message>
update during meeting with Jerome
</commit_message>
<xml_diff>
--- a/Figures.pptx
+++ b/Figures.pptx
@@ -268,7 +268,7 @@
           <a:p>
             <a:fld id="{221DF790-08EF-4309-8C7D-573F11C98FD5}" type="datetimeFigureOut">
               <a:rPr lang="de-AT" smtClean="0"/>
-              <a:t>08.02.2022</a:t>
+              <a:t>09.02.2022</a:t>
             </a:fld>
             <a:endParaRPr lang="de-AT"/>
           </a:p>
@@ -468,7 +468,7 @@
           <a:p>
             <a:fld id="{221DF790-08EF-4309-8C7D-573F11C98FD5}" type="datetimeFigureOut">
               <a:rPr lang="de-AT" smtClean="0"/>
-              <a:t>08.02.2022</a:t>
+              <a:t>09.02.2022</a:t>
             </a:fld>
             <a:endParaRPr lang="de-AT"/>
           </a:p>
@@ -678,7 +678,7 @@
           <a:p>
             <a:fld id="{221DF790-08EF-4309-8C7D-573F11C98FD5}" type="datetimeFigureOut">
               <a:rPr lang="de-AT" smtClean="0"/>
-              <a:t>08.02.2022</a:t>
+              <a:t>09.02.2022</a:t>
             </a:fld>
             <a:endParaRPr lang="de-AT"/>
           </a:p>
@@ -878,7 +878,7 @@
           <a:p>
             <a:fld id="{221DF790-08EF-4309-8C7D-573F11C98FD5}" type="datetimeFigureOut">
               <a:rPr lang="de-AT" smtClean="0"/>
-              <a:t>08.02.2022</a:t>
+              <a:t>09.02.2022</a:t>
             </a:fld>
             <a:endParaRPr lang="de-AT"/>
           </a:p>
@@ -1154,7 +1154,7 @@
           <a:p>
             <a:fld id="{221DF790-08EF-4309-8C7D-573F11C98FD5}" type="datetimeFigureOut">
               <a:rPr lang="de-AT" smtClean="0"/>
-              <a:t>08.02.2022</a:t>
+              <a:t>09.02.2022</a:t>
             </a:fld>
             <a:endParaRPr lang="de-AT"/>
           </a:p>
@@ -1422,7 +1422,7 @@
           <a:p>
             <a:fld id="{221DF790-08EF-4309-8C7D-573F11C98FD5}" type="datetimeFigureOut">
               <a:rPr lang="de-AT" smtClean="0"/>
-              <a:t>08.02.2022</a:t>
+              <a:t>09.02.2022</a:t>
             </a:fld>
             <a:endParaRPr lang="de-AT"/>
           </a:p>
@@ -1837,7 +1837,7 @@
           <a:p>
             <a:fld id="{221DF790-08EF-4309-8C7D-573F11C98FD5}" type="datetimeFigureOut">
               <a:rPr lang="de-AT" smtClean="0"/>
-              <a:t>08.02.2022</a:t>
+              <a:t>09.02.2022</a:t>
             </a:fld>
             <a:endParaRPr lang="de-AT"/>
           </a:p>
@@ -1979,7 +1979,7 @@
           <a:p>
             <a:fld id="{221DF790-08EF-4309-8C7D-573F11C98FD5}" type="datetimeFigureOut">
               <a:rPr lang="de-AT" smtClean="0"/>
-              <a:t>08.02.2022</a:t>
+              <a:t>09.02.2022</a:t>
             </a:fld>
             <a:endParaRPr lang="de-AT"/>
           </a:p>
@@ -2092,7 +2092,7 @@
           <a:p>
             <a:fld id="{221DF790-08EF-4309-8C7D-573F11C98FD5}" type="datetimeFigureOut">
               <a:rPr lang="de-AT" smtClean="0"/>
-              <a:t>08.02.2022</a:t>
+              <a:t>09.02.2022</a:t>
             </a:fld>
             <a:endParaRPr lang="de-AT"/>
           </a:p>
@@ -2405,7 +2405,7 @@
           <a:p>
             <a:fld id="{221DF790-08EF-4309-8C7D-573F11C98FD5}" type="datetimeFigureOut">
               <a:rPr lang="de-AT" smtClean="0"/>
-              <a:t>08.02.2022</a:t>
+              <a:t>09.02.2022</a:t>
             </a:fld>
             <a:endParaRPr lang="de-AT"/>
           </a:p>
@@ -2694,7 +2694,7 @@
           <a:p>
             <a:fld id="{221DF790-08EF-4309-8C7D-573F11C98FD5}" type="datetimeFigureOut">
               <a:rPr lang="de-AT" smtClean="0"/>
-              <a:t>08.02.2022</a:t>
+              <a:t>09.02.2022</a:t>
             </a:fld>
             <a:endParaRPr lang="de-AT"/>
           </a:p>
@@ -2937,7 +2937,7 @@
           <a:p>
             <a:fld id="{221DF790-08EF-4309-8C7D-573F11C98FD5}" type="datetimeFigureOut">
               <a:rPr lang="de-AT" smtClean="0"/>
-              <a:t>08.02.2022</a:t>
+              <a:t>09.02.2022</a:t>
             </a:fld>
             <a:endParaRPr lang="de-AT"/>
           </a:p>
@@ -7001,7 +7001,7 @@
         </p:nvSpPr>
         <p:spPr>
           <a:xfrm>
-            <a:off x="4669583" y="3603906"/>
+            <a:off x="5885437" y="3507719"/>
             <a:ext cx="933269" cy="307777"/>
           </a:xfrm>
           <a:prstGeom prst="rect">
@@ -7211,7 +7211,7 @@
           </a:xfrm>
           <a:prstGeom prst="bentConnector3">
             <a:avLst>
-              <a:gd name="adj1" fmla="val -73625"/>
+              <a:gd name="adj1" fmla="val -128844"/>
             </a:avLst>
           </a:prstGeom>
           <a:noFill/>
@@ -7720,20 +7720,19 @@
           </p:cNvPr>
           <p:cNvCxnSpPr>
             <a:cxnSpLocks/>
-            <a:stCxn id="9" idx="0"/>
-            <a:endCxn id="10" idx="3"/>
+            <a:stCxn id="9" idx="1"/>
+            <a:endCxn id="10" idx="1"/>
           </p:cNvCxnSpPr>
           <p:nvPr/>
         </p:nvCxnSpPr>
         <p:spPr>
-          <a:xfrm rot="16200000" flipH="1">
-            <a:off x="6061719" y="3580374"/>
-            <a:ext cx="715145" cy="1398271"/>
+          <a:xfrm rot="10800000" flipV="1">
+            <a:off x="4321886" y="4160318"/>
+            <a:ext cx="12700" cy="476763"/>
           </a:xfrm>
-          <a:prstGeom prst="bentConnector4">
+          <a:prstGeom prst="bentConnector3">
             <a:avLst>
-              <a:gd name="adj1" fmla="val -31966"/>
-              <a:gd name="adj2" fmla="val 116349"/>
+              <a:gd name="adj1" fmla="val 1800000"/>
             </a:avLst>
           </a:prstGeom>
           <a:noFill/>
@@ -7762,7 +7761,7 @@
         </p:nvSpPr>
         <p:spPr>
           <a:xfrm>
-            <a:off x="6060932" y="3339049"/>
+            <a:off x="2799678" y="4225341"/>
             <a:ext cx="1700274" cy="369332"/>
           </a:xfrm>
           <a:prstGeom prst="rect">
@@ -8026,8 +8025,8 @@
             </a:solidFill>
             <a:prstDash val="solid"/>
             <a:miter lim="800000"/>
-            <a:headEnd type="none" w="sm" len="sm"/>
-            <a:tailEnd type="triangle" w="lg" len="lg"/>
+            <a:headEnd type="none" w="med" len="med"/>
+            <a:tailEnd type="none" w="med" len="med"/>
           </a:ln>
         </p:spPr>
       </p:cxnSp>
@@ -8064,8 +8063,8 @@
             </a:solidFill>
             <a:prstDash val="solid"/>
             <a:miter lim="800000"/>
-            <a:headEnd type="none" w="sm" len="sm"/>
-            <a:tailEnd type="triangle" w="lg" len="lg"/>
+            <a:headEnd type="none" w="med" len="med"/>
+            <a:tailEnd type="none" w="med" len="med"/>
           </a:ln>
         </p:spPr>
       </p:cxnSp>
@@ -10521,8 +10520,8 @@
         </p:nvGrpSpPr>
         <p:grpSpPr>
           <a:xfrm>
-            <a:off x="1309038" y="2870002"/>
-            <a:ext cx="2095558" cy="993807"/>
+            <a:off x="1309038" y="2821748"/>
+            <a:ext cx="2095558" cy="1042062"/>
             <a:chOff x="5786656" y="1797718"/>
             <a:chExt cx="1372894" cy="616200"/>
           </a:xfrm>
@@ -13087,8 +13086,8 @@
         </p:nvCxnSpPr>
         <p:spPr>
           <a:xfrm>
-            <a:off x="2356683" y="3863809"/>
-            <a:ext cx="8138" cy="431696"/>
+            <a:off x="2356683" y="3863810"/>
+            <a:ext cx="8138" cy="431695"/>
           </a:xfrm>
           <a:prstGeom prst="straightConnector1">
             <a:avLst/>
@@ -13528,7 +13527,7 @@
         <p:spPr>
           <a:xfrm flipH="1">
             <a:off x="2356683" y="2420678"/>
-            <a:ext cx="2159" cy="449324"/>
+            <a:ext cx="2159" cy="401070"/>
           </a:xfrm>
           <a:prstGeom prst="straightConnector1">
             <a:avLst/>

</xml_diff>

<commit_message>
add use case 2 models + evaluation data
</commit_message>
<xml_diff>
--- a/Figures.pptx
+++ b/Figures.pptx
@@ -269,7 +269,7 @@
           <a:p>
             <a:fld id="{221DF790-08EF-4309-8C7D-573F11C98FD5}" type="datetimeFigureOut">
               <a:rPr lang="de-AT" smtClean="0"/>
-              <a:t>10.02.2022</a:t>
+              <a:t>14.02.2022</a:t>
             </a:fld>
             <a:endParaRPr lang="de-AT"/>
           </a:p>
@@ -469,7 +469,7 @@
           <a:p>
             <a:fld id="{221DF790-08EF-4309-8C7D-573F11C98FD5}" type="datetimeFigureOut">
               <a:rPr lang="de-AT" smtClean="0"/>
-              <a:t>10.02.2022</a:t>
+              <a:t>14.02.2022</a:t>
             </a:fld>
             <a:endParaRPr lang="de-AT"/>
           </a:p>
@@ -679,7 +679,7 @@
           <a:p>
             <a:fld id="{221DF790-08EF-4309-8C7D-573F11C98FD5}" type="datetimeFigureOut">
               <a:rPr lang="de-AT" smtClean="0"/>
-              <a:t>10.02.2022</a:t>
+              <a:t>14.02.2022</a:t>
             </a:fld>
             <a:endParaRPr lang="de-AT"/>
           </a:p>
@@ -879,7 +879,7 @@
           <a:p>
             <a:fld id="{221DF790-08EF-4309-8C7D-573F11C98FD5}" type="datetimeFigureOut">
               <a:rPr lang="de-AT" smtClean="0"/>
-              <a:t>10.02.2022</a:t>
+              <a:t>14.02.2022</a:t>
             </a:fld>
             <a:endParaRPr lang="de-AT"/>
           </a:p>
@@ -1155,7 +1155,7 @@
           <a:p>
             <a:fld id="{221DF790-08EF-4309-8C7D-573F11C98FD5}" type="datetimeFigureOut">
               <a:rPr lang="de-AT" smtClean="0"/>
-              <a:t>10.02.2022</a:t>
+              <a:t>14.02.2022</a:t>
             </a:fld>
             <a:endParaRPr lang="de-AT"/>
           </a:p>
@@ -1423,7 +1423,7 @@
           <a:p>
             <a:fld id="{221DF790-08EF-4309-8C7D-573F11C98FD5}" type="datetimeFigureOut">
               <a:rPr lang="de-AT" smtClean="0"/>
-              <a:t>10.02.2022</a:t>
+              <a:t>14.02.2022</a:t>
             </a:fld>
             <a:endParaRPr lang="de-AT"/>
           </a:p>
@@ -1838,7 +1838,7 @@
           <a:p>
             <a:fld id="{221DF790-08EF-4309-8C7D-573F11C98FD5}" type="datetimeFigureOut">
               <a:rPr lang="de-AT" smtClean="0"/>
-              <a:t>10.02.2022</a:t>
+              <a:t>14.02.2022</a:t>
             </a:fld>
             <a:endParaRPr lang="de-AT"/>
           </a:p>
@@ -1980,7 +1980,7 @@
           <a:p>
             <a:fld id="{221DF790-08EF-4309-8C7D-573F11C98FD5}" type="datetimeFigureOut">
               <a:rPr lang="de-AT" smtClean="0"/>
-              <a:t>10.02.2022</a:t>
+              <a:t>14.02.2022</a:t>
             </a:fld>
             <a:endParaRPr lang="de-AT"/>
           </a:p>
@@ -2093,7 +2093,7 @@
           <a:p>
             <a:fld id="{221DF790-08EF-4309-8C7D-573F11C98FD5}" type="datetimeFigureOut">
               <a:rPr lang="de-AT" smtClean="0"/>
-              <a:t>10.02.2022</a:t>
+              <a:t>14.02.2022</a:t>
             </a:fld>
             <a:endParaRPr lang="de-AT"/>
           </a:p>
@@ -2406,7 +2406,7 @@
           <a:p>
             <a:fld id="{221DF790-08EF-4309-8C7D-573F11C98FD5}" type="datetimeFigureOut">
               <a:rPr lang="de-AT" smtClean="0"/>
-              <a:t>10.02.2022</a:t>
+              <a:t>14.02.2022</a:t>
             </a:fld>
             <a:endParaRPr lang="de-AT"/>
           </a:p>
@@ -2695,7 +2695,7 @@
           <a:p>
             <a:fld id="{221DF790-08EF-4309-8C7D-573F11C98FD5}" type="datetimeFigureOut">
               <a:rPr lang="de-AT" smtClean="0"/>
-              <a:t>10.02.2022</a:t>
+              <a:t>14.02.2022</a:t>
             </a:fld>
             <a:endParaRPr lang="de-AT"/>
           </a:p>
@@ -2938,7 +2938,7 @@
           <a:p>
             <a:fld id="{221DF790-08EF-4309-8C7D-573F11C98FD5}" type="datetimeFigureOut">
               <a:rPr lang="de-AT" smtClean="0"/>
-              <a:t>10.02.2022</a:t>
+              <a:t>14.02.2022</a:t>
             </a:fld>
             <a:endParaRPr lang="de-AT"/>
           </a:p>
@@ -12868,6 +12868,33 @@
               <a:cs typeface="Arial" panose="020B0604020202020204" pitchFamily="34" charset="0"/>
             </a:endParaRPr>
           </a:p>
+          <a:p>
+            <a:r>
+              <a:rPr lang="de-AT" dirty="0" err="1">
+                <a:latin typeface="Arial" panose="020B0604020202020204" pitchFamily="34" charset="0"/>
+                <a:cs typeface="Arial" panose="020B0604020202020204" pitchFamily="34" charset="0"/>
+              </a:rPr>
+              <a:t>Int</a:t>
+            </a:r>
+            <a:r>
+              <a:rPr lang="de-AT" dirty="0">
+                <a:latin typeface="Arial" panose="020B0604020202020204" pitchFamily="34" charset="0"/>
+                <a:cs typeface="Arial" panose="020B0604020202020204" pitchFamily="34" charset="0"/>
+              </a:rPr>
+              <a:t> </a:t>
+            </a:r>
+            <a:r>
+              <a:rPr lang="de-AT" dirty="0" err="1">
+                <a:latin typeface="Arial" panose="020B0604020202020204" pitchFamily="34" charset="0"/>
+                <a:cs typeface="Arial" panose="020B0604020202020204" pitchFamily="34" charset="0"/>
+              </a:rPr>
+              <a:t>batteryLevel</a:t>
+            </a:r>
+            <a:endParaRPr lang="de-AT" dirty="0">
+              <a:latin typeface="Arial" panose="020B0604020202020204" pitchFamily="34" charset="0"/>
+              <a:cs typeface="Arial" panose="020B0604020202020204" pitchFamily="34" charset="0"/>
+            </a:endParaRPr>
+          </a:p>
         </p:txBody>
       </p:sp>
       <p:sp>

</xml_diff>

<commit_message>
adapt profile + add argumentation pptx
</commit_message>
<xml_diff>
--- a/Figures.pptx
+++ b/Figures.pptx
@@ -219,7 +219,7 @@
           <a:p>
             <a:fld id="{81844386-878F-4A39-854F-4F47558F0F3E}" type="datetimeFigureOut">
               <a:rPr lang="de-AT" smtClean="0"/>
-              <a:t>18.02.2022</a:t>
+              <a:t>22.02.2022</a:t>
             </a:fld>
             <a:endParaRPr lang="de-AT"/>
           </a:p>
@@ -1092,7 +1092,7 @@
           <a:p>
             <a:fld id="{221DF790-08EF-4309-8C7D-573F11C98FD5}" type="datetimeFigureOut">
               <a:rPr lang="de-AT" smtClean="0"/>
-              <a:t>18.02.2022</a:t>
+              <a:t>22.02.2022</a:t>
             </a:fld>
             <a:endParaRPr lang="de-AT"/>
           </a:p>
@@ -1292,7 +1292,7 @@
           <a:p>
             <a:fld id="{221DF790-08EF-4309-8C7D-573F11C98FD5}" type="datetimeFigureOut">
               <a:rPr lang="de-AT" smtClean="0"/>
-              <a:t>18.02.2022</a:t>
+              <a:t>22.02.2022</a:t>
             </a:fld>
             <a:endParaRPr lang="de-AT"/>
           </a:p>
@@ -1502,7 +1502,7 @@
           <a:p>
             <a:fld id="{221DF790-08EF-4309-8C7D-573F11C98FD5}" type="datetimeFigureOut">
               <a:rPr lang="de-AT" smtClean="0"/>
-              <a:t>18.02.2022</a:t>
+              <a:t>22.02.2022</a:t>
             </a:fld>
             <a:endParaRPr lang="de-AT"/>
           </a:p>
@@ -1702,7 +1702,7 @@
           <a:p>
             <a:fld id="{221DF790-08EF-4309-8C7D-573F11C98FD5}" type="datetimeFigureOut">
               <a:rPr lang="de-AT" smtClean="0"/>
-              <a:t>18.02.2022</a:t>
+              <a:t>22.02.2022</a:t>
             </a:fld>
             <a:endParaRPr lang="de-AT"/>
           </a:p>
@@ -1978,7 +1978,7 @@
           <a:p>
             <a:fld id="{221DF790-08EF-4309-8C7D-573F11C98FD5}" type="datetimeFigureOut">
               <a:rPr lang="de-AT" smtClean="0"/>
-              <a:t>18.02.2022</a:t>
+              <a:t>22.02.2022</a:t>
             </a:fld>
             <a:endParaRPr lang="de-AT"/>
           </a:p>
@@ -2246,7 +2246,7 @@
           <a:p>
             <a:fld id="{221DF790-08EF-4309-8C7D-573F11C98FD5}" type="datetimeFigureOut">
               <a:rPr lang="de-AT" smtClean="0"/>
-              <a:t>18.02.2022</a:t>
+              <a:t>22.02.2022</a:t>
             </a:fld>
             <a:endParaRPr lang="de-AT"/>
           </a:p>
@@ -2661,7 +2661,7 @@
           <a:p>
             <a:fld id="{221DF790-08EF-4309-8C7D-573F11C98FD5}" type="datetimeFigureOut">
               <a:rPr lang="de-AT" smtClean="0"/>
-              <a:t>18.02.2022</a:t>
+              <a:t>22.02.2022</a:t>
             </a:fld>
             <a:endParaRPr lang="de-AT"/>
           </a:p>
@@ -2803,7 +2803,7 @@
           <a:p>
             <a:fld id="{221DF790-08EF-4309-8C7D-573F11C98FD5}" type="datetimeFigureOut">
               <a:rPr lang="de-AT" smtClean="0"/>
-              <a:t>18.02.2022</a:t>
+              <a:t>22.02.2022</a:t>
             </a:fld>
             <a:endParaRPr lang="de-AT"/>
           </a:p>
@@ -2916,7 +2916,7 @@
           <a:p>
             <a:fld id="{221DF790-08EF-4309-8C7D-573F11C98FD5}" type="datetimeFigureOut">
               <a:rPr lang="de-AT" smtClean="0"/>
-              <a:t>18.02.2022</a:t>
+              <a:t>22.02.2022</a:t>
             </a:fld>
             <a:endParaRPr lang="de-AT"/>
           </a:p>
@@ -3229,7 +3229,7 @@
           <a:p>
             <a:fld id="{221DF790-08EF-4309-8C7D-573F11C98FD5}" type="datetimeFigureOut">
               <a:rPr lang="de-AT" smtClean="0"/>
-              <a:t>18.02.2022</a:t>
+              <a:t>22.02.2022</a:t>
             </a:fld>
             <a:endParaRPr lang="de-AT"/>
           </a:p>
@@ -3518,7 +3518,7 @@
           <a:p>
             <a:fld id="{221DF790-08EF-4309-8C7D-573F11C98FD5}" type="datetimeFigureOut">
               <a:rPr lang="de-AT" smtClean="0"/>
-              <a:t>18.02.2022</a:t>
+              <a:t>22.02.2022</a:t>
             </a:fld>
             <a:endParaRPr lang="de-AT"/>
           </a:p>
@@ -3761,7 +3761,7 @@
           <a:p>
             <a:fld id="{221DF790-08EF-4309-8C7D-573F11C98FD5}" type="datetimeFigureOut">
               <a:rPr lang="de-AT" smtClean="0"/>
-              <a:t>18.02.2022</a:t>
+              <a:t>22.02.2022</a:t>
             </a:fld>
             <a:endParaRPr lang="de-AT"/>
           </a:p>
@@ -41271,10 +41271,10 @@
       </p:grpSpPr>
       <p:grpSp>
         <p:nvGrpSpPr>
-          <p:cNvPr id="43" name="Gruppieren 42">
-            <a:extLst>
-              <a:ext uri="{FF2B5EF4-FFF2-40B4-BE49-F238E27FC236}">
-                <a16:creationId xmlns:a16="http://schemas.microsoft.com/office/drawing/2014/main" id="{7FF306AA-6B2E-400E-B331-D06CE0339642}"/>
+          <p:cNvPr id="5" name="Gruppieren 4">
+            <a:extLst>
+              <a:ext uri="{FF2B5EF4-FFF2-40B4-BE49-F238E27FC236}">
+                <a16:creationId xmlns:a16="http://schemas.microsoft.com/office/drawing/2014/main" id="{88F4C440-8752-4E5F-92F5-5BB692E3FB30}"/>
               </a:ext>
             </a:extLst>
           </p:cNvPr>
@@ -41283,290 +41283,18 @@
         </p:nvGrpSpPr>
         <p:grpSpPr>
           <a:xfrm>
-            <a:off x="2110810" y="1638961"/>
-            <a:ext cx="8976289" cy="3580078"/>
-            <a:chOff x="1854436" y="673286"/>
-            <a:chExt cx="8976289" cy="3580078"/>
+            <a:off x="4213562" y="4701156"/>
+            <a:ext cx="3467880" cy="2084669"/>
+            <a:chOff x="1941564" y="-1318416"/>
+            <a:chExt cx="2529840" cy="2179060"/>
           </a:xfrm>
         </p:grpSpPr>
-        <p:grpSp>
-          <p:nvGrpSpPr>
-            <p:cNvPr id="5" name="Gruppieren 4">
+        <p:sp>
+          <p:nvSpPr>
+            <p:cNvPr id="6" name="Rechteck 5">
               <a:extLst>
                 <a:ext uri="{FF2B5EF4-FFF2-40B4-BE49-F238E27FC236}">
-                  <a16:creationId xmlns:a16="http://schemas.microsoft.com/office/drawing/2014/main" id="{88F4C440-8752-4E5F-92F5-5BB692E3FB30}"/>
-                </a:ext>
-              </a:extLst>
-            </p:cNvPr>
-            <p:cNvGrpSpPr/>
-            <p:nvPr/>
-          </p:nvGrpSpPr>
-          <p:grpSpPr>
-            <a:xfrm>
-              <a:off x="1969805" y="1098643"/>
-              <a:ext cx="3260808" cy="2084666"/>
-              <a:chOff x="3484880" y="832918"/>
-              <a:chExt cx="2529840" cy="2179057"/>
-            </a:xfrm>
-          </p:grpSpPr>
-          <p:sp>
-            <p:nvSpPr>
-              <p:cNvPr id="6" name="Rechteck 5">
-                <a:extLst>
-                  <a:ext uri="{FF2B5EF4-FFF2-40B4-BE49-F238E27FC236}">
-                    <a16:creationId xmlns:a16="http://schemas.microsoft.com/office/drawing/2014/main" id="{106A0107-28A1-49F8-84B5-3E9BF5F3600D}"/>
-                  </a:ext>
-                </a:extLst>
-              </p:cNvPr>
-              <p:cNvSpPr/>
-              <p:nvPr/>
-            </p:nvSpPr>
-            <p:spPr>
-              <a:xfrm>
-                <a:off x="3484880" y="832918"/>
-                <a:ext cx="2529840" cy="673890"/>
-              </a:xfrm>
-              <a:prstGeom prst="rect">
-                <a:avLst/>
-              </a:prstGeom>
-              <a:noFill/>
-              <a:ln w="9525" cap="flat" cmpd="sng" algn="ctr">
-                <a:solidFill>
-                  <a:schemeClr val="dk1"/>
-                </a:solidFill>
-                <a:prstDash val="solid"/>
-                <a:round/>
-                <a:headEnd type="none" w="med" len="med"/>
-                <a:tailEnd type="arrow" w="med" len="med"/>
-              </a:ln>
-            </p:spPr>
-            <p:style>
-              <a:lnRef idx="0">
-                <a:scrgbClr r="0" g="0" b="0"/>
-              </a:lnRef>
-              <a:fillRef idx="0">
-                <a:scrgbClr r="0" g="0" b="0"/>
-              </a:fillRef>
-              <a:effectRef idx="0">
-                <a:scrgbClr r="0" g="0" b="0"/>
-              </a:effectRef>
-              <a:fontRef idx="minor">
-                <a:schemeClr val="dk1"/>
-              </a:fontRef>
-            </p:style>
-            <p:txBody>
-              <a:bodyPr rtlCol="0" anchor="ctr"/>
-              <a:lstStyle/>
-              <a:p>
-                <a:pPr algn="ctr"/>
-                <a:r>
-                  <a:rPr lang="de-DE" altLang="de-DE" sz="2000" dirty="0">
-                    <a:cs typeface="Arial" charset="0"/>
-                  </a:rPr>
-                  <a:t>«</a:t>
-                </a:r>
-                <a:r>
-                  <a:rPr lang="de-DE" altLang="de-DE" sz="1800" dirty="0">
-                    <a:cs typeface="Arial" charset="0"/>
-                  </a:rPr>
-                  <a:t>Stereotype»</a:t>
-                </a:r>
-                <a:r>
-                  <a:rPr lang="de-DE" altLang="de-DE" sz="1800" i="1" dirty="0"/>
-                  <a:t> </a:t>
-                </a:r>
-                <a:endParaRPr lang="de-AT" b="1" dirty="0">
-                  <a:latin typeface="Arial" panose="020B0604020202020204" pitchFamily="34" charset="0"/>
-                  <a:cs typeface="Arial" panose="020B0604020202020204" pitchFamily="34" charset="0"/>
-                </a:endParaRPr>
-              </a:p>
-              <a:p>
-                <a:pPr algn="ctr"/>
-                <a:r>
-                  <a:rPr lang="de-AT" b="1" dirty="0" err="1">
-                    <a:latin typeface="Arial" panose="020B0604020202020204" pitchFamily="34" charset="0"/>
-                    <a:cs typeface="Arial" panose="020B0604020202020204" pitchFamily="34" charset="0"/>
-                  </a:rPr>
-                  <a:t>VersionableElement</a:t>
-                </a:r>
-                <a:endParaRPr lang="de-AT" b="1" dirty="0">
-                  <a:latin typeface="Arial" panose="020B0604020202020204" pitchFamily="34" charset="0"/>
-                  <a:cs typeface="Arial" panose="020B0604020202020204" pitchFamily="34" charset="0"/>
-                </a:endParaRPr>
-              </a:p>
-            </p:txBody>
-          </p:sp>
-          <p:sp>
-            <p:nvSpPr>
-              <p:cNvPr id="7" name="Rechteck 6">
-                <a:extLst>
-                  <a:ext uri="{FF2B5EF4-FFF2-40B4-BE49-F238E27FC236}">
-                    <a16:creationId xmlns:a16="http://schemas.microsoft.com/office/drawing/2014/main" id="{0E34EE82-9BFE-40CA-8F42-7326B20A5EF6}"/>
-                  </a:ext>
-                </a:extLst>
-              </p:cNvPr>
-              <p:cNvSpPr/>
-              <p:nvPr/>
-            </p:nvSpPr>
-            <p:spPr>
-              <a:xfrm>
-                <a:off x="3484880" y="1506808"/>
-                <a:ext cx="2529840" cy="1505167"/>
-              </a:xfrm>
-              <a:prstGeom prst="rect">
-                <a:avLst/>
-              </a:prstGeom>
-              <a:noFill/>
-              <a:ln w="9525" cap="flat" cmpd="sng" algn="ctr">
-                <a:solidFill>
-                  <a:schemeClr val="dk1"/>
-                </a:solidFill>
-                <a:prstDash val="solid"/>
-                <a:round/>
-                <a:headEnd type="none" w="med" len="med"/>
-                <a:tailEnd type="arrow" w="med" len="med"/>
-              </a:ln>
-            </p:spPr>
-            <p:style>
-              <a:lnRef idx="0">
-                <a:scrgbClr r="0" g="0" b="0"/>
-              </a:lnRef>
-              <a:fillRef idx="0">
-                <a:scrgbClr r="0" g="0" b="0"/>
-              </a:fillRef>
-              <a:effectRef idx="0">
-                <a:scrgbClr r="0" g="0" b="0"/>
-              </a:effectRef>
-              <a:fontRef idx="minor">
-                <a:schemeClr val="dk1"/>
-              </a:fontRef>
-            </p:style>
-            <p:txBody>
-              <a:bodyPr rtlCol="0" anchor="ctr"/>
-              <a:lstStyle/>
-              <a:p>
-                <a:r>
-                  <a:rPr lang="de-AT" dirty="0">
-                    <a:latin typeface="Arial" panose="020B0604020202020204" pitchFamily="34" charset="0"/>
-                    <a:cs typeface="Arial" panose="020B0604020202020204" pitchFamily="34" charset="0"/>
-                  </a:rPr>
-                  <a:t>String </a:t>
-                </a:r>
-                <a:r>
-                  <a:rPr lang="de-AT" dirty="0" err="1">
-                    <a:latin typeface="Arial" panose="020B0604020202020204" pitchFamily="34" charset="0"/>
-                    <a:cs typeface="Arial" panose="020B0604020202020204" pitchFamily="34" charset="0"/>
-                  </a:rPr>
-                  <a:t>displayName</a:t>
-                </a:r>
-                <a:endParaRPr lang="de-AT" dirty="0">
-                  <a:latin typeface="Arial" panose="020B0604020202020204" pitchFamily="34" charset="0"/>
-                  <a:cs typeface="Arial" panose="020B0604020202020204" pitchFamily="34" charset="0"/>
-                </a:endParaRPr>
-              </a:p>
-              <a:p>
-                <a:r>
-                  <a:rPr lang="de-AT" dirty="0">
-                    <a:latin typeface="Arial" panose="020B0604020202020204" pitchFamily="34" charset="0"/>
-                    <a:cs typeface="Arial" panose="020B0604020202020204" pitchFamily="34" charset="0"/>
-                  </a:rPr>
-                  <a:t>String </a:t>
-                </a:r>
-                <a:r>
-                  <a:rPr lang="de-AT" dirty="0" err="1">
-                    <a:latin typeface="Arial" panose="020B0604020202020204" pitchFamily="34" charset="0"/>
-                    <a:cs typeface="Arial" panose="020B0604020202020204" pitchFamily="34" charset="0"/>
-                  </a:rPr>
-                  <a:t>description</a:t>
-                </a:r>
-                <a:endParaRPr lang="de-AT" dirty="0">
-                  <a:latin typeface="Arial" panose="020B0604020202020204" pitchFamily="34" charset="0"/>
-                  <a:cs typeface="Arial" panose="020B0604020202020204" pitchFamily="34" charset="0"/>
-                </a:endParaRPr>
-              </a:p>
-              <a:p>
-                <a:r>
-                  <a:rPr lang="de-AT" dirty="0">
-                    <a:latin typeface="Arial" panose="020B0604020202020204" pitchFamily="34" charset="0"/>
-                    <a:cs typeface="Arial" panose="020B0604020202020204" pitchFamily="34" charset="0"/>
-                  </a:rPr>
-                  <a:t>String</a:t>
-                </a:r>
-                <a:r>
-                  <a:rPr lang="de-AT" i="1" dirty="0">
-                    <a:latin typeface="Arial" panose="020B0604020202020204" pitchFamily="34" charset="0"/>
-                    <a:cs typeface="Arial" panose="020B0604020202020204" pitchFamily="34" charset="0"/>
-                  </a:rPr>
-                  <a:t> </a:t>
-                </a:r>
-                <a:r>
-                  <a:rPr lang="de-AT" dirty="0" err="1">
-                    <a:latin typeface="Arial" panose="020B0604020202020204" pitchFamily="34" charset="0"/>
-                    <a:cs typeface="Arial" panose="020B0604020202020204" pitchFamily="34" charset="0"/>
-                  </a:rPr>
-                  <a:t>id_scheme</a:t>
-                </a:r>
-                <a:endParaRPr lang="de-AT" dirty="0">
-                  <a:latin typeface="Arial" panose="020B0604020202020204" pitchFamily="34" charset="0"/>
-                  <a:cs typeface="Arial" panose="020B0604020202020204" pitchFamily="34" charset="0"/>
-                </a:endParaRPr>
-              </a:p>
-              <a:p>
-                <a:r>
-                  <a:rPr lang="de-AT" dirty="0">
-                    <a:latin typeface="Arial" panose="020B0604020202020204" pitchFamily="34" charset="0"/>
-                    <a:cs typeface="Arial" panose="020B0604020202020204" pitchFamily="34" charset="0"/>
-                  </a:rPr>
-                  <a:t>String </a:t>
-                </a:r>
-                <a:r>
-                  <a:rPr lang="de-AT" dirty="0" err="1">
-                    <a:latin typeface="Arial" panose="020B0604020202020204" pitchFamily="34" charset="0"/>
-                    <a:cs typeface="Arial" panose="020B0604020202020204" pitchFamily="34" charset="0"/>
-                  </a:rPr>
-                  <a:t>id_path</a:t>
-                </a:r>
-                <a:endParaRPr lang="de-AT" dirty="0">
-                  <a:latin typeface="Arial" panose="020B0604020202020204" pitchFamily="34" charset="0"/>
-                  <a:cs typeface="Arial" panose="020B0604020202020204" pitchFamily="34" charset="0"/>
-                </a:endParaRPr>
-              </a:p>
-              <a:p>
-                <a:r>
-                  <a:rPr lang="de-AT" dirty="0" err="1">
-                    <a:latin typeface="Arial" panose="020B0604020202020204" pitchFamily="34" charset="0"/>
-                    <a:cs typeface="Arial" panose="020B0604020202020204" pitchFamily="34" charset="0"/>
-                  </a:rPr>
-                  <a:t>Int</a:t>
-                </a:r>
-                <a:r>
-                  <a:rPr lang="de-AT" i="1" dirty="0">
-                    <a:latin typeface="Arial" panose="020B0604020202020204" pitchFamily="34" charset="0"/>
-                    <a:cs typeface="Arial" panose="020B0604020202020204" pitchFamily="34" charset="0"/>
-                  </a:rPr>
-                  <a:t> </a:t>
-                </a:r>
-                <a:r>
-                  <a:rPr lang="de-AT" dirty="0" err="1">
-                    <a:latin typeface="Arial" panose="020B0604020202020204" pitchFamily="34" charset="0"/>
-                    <a:cs typeface="Arial" panose="020B0604020202020204" pitchFamily="34" charset="0"/>
-                  </a:rPr>
-                  <a:t>id_version</a:t>
-                </a:r>
-                <a:endParaRPr lang="de-AT" i="1" dirty="0">
-                  <a:latin typeface="Arial" panose="020B0604020202020204" pitchFamily="34" charset="0"/>
-                  <a:cs typeface="Arial" panose="020B0604020202020204" pitchFamily="34" charset="0"/>
-                </a:endParaRPr>
-              </a:p>
-            </p:txBody>
-          </p:sp>
-        </p:grpSp>
-        <p:sp>
-          <p:nvSpPr>
-            <p:cNvPr id="9" name="Rechteck 8">
-              <a:extLst>
-                <a:ext uri="{FF2B5EF4-FFF2-40B4-BE49-F238E27FC236}">
-                  <a16:creationId xmlns:a16="http://schemas.microsoft.com/office/drawing/2014/main" id="{4D613E46-1DE6-4F12-AC26-DB23EA18B53B}"/>
+                  <a16:creationId xmlns:a16="http://schemas.microsoft.com/office/drawing/2014/main" id="{106A0107-28A1-49F8-84B5-3E9BF5F3600D}"/>
                 </a:ext>
               </a:extLst>
             </p:cNvPr>
@@ -41575,8 +41303,8 @@
           </p:nvSpPr>
           <p:spPr>
             <a:xfrm>
-              <a:off x="8403301" y="1098642"/>
-              <a:ext cx="2373805" cy="644699"/>
+              <a:off x="1941564" y="-1318416"/>
+              <a:ext cx="2529840" cy="673891"/>
             </a:xfrm>
             <a:prstGeom prst="rect">
               <a:avLst/>
@@ -41639,7 +41367,7 @@
                   <a:latin typeface="Arial" panose="020B0604020202020204" pitchFamily="34" charset="0"/>
                   <a:cs typeface="Arial" panose="020B0604020202020204" pitchFamily="34" charset="0"/>
                 </a:rPr>
-                <a:t>ObservableProperty</a:t>
+                <a:t>VersionableElement</a:t>
               </a:r>
               <a:endParaRPr lang="de-AT" b="1" dirty="0">
                 <a:latin typeface="Arial" panose="020B0604020202020204" pitchFamily="34" charset="0"/>
@@ -41650,10 +41378,10 @@
         </p:sp>
         <p:sp>
           <p:nvSpPr>
-            <p:cNvPr id="14" name="Rechteck 13">
+            <p:cNvPr id="7" name="Rechteck 6">
               <a:extLst>
                 <a:ext uri="{FF2B5EF4-FFF2-40B4-BE49-F238E27FC236}">
-                  <a16:creationId xmlns:a16="http://schemas.microsoft.com/office/drawing/2014/main" id="{24DF49E4-A308-45E1-AE02-FE78B37308F7}"/>
+                  <a16:creationId xmlns:a16="http://schemas.microsoft.com/office/drawing/2014/main" id="{0E34EE82-9BFE-40CA-8F42-7326B20A5EF6}"/>
                 </a:ext>
               </a:extLst>
             </p:cNvPr>
@@ -41662,8 +41390,8 @@
           </p:nvSpPr>
           <p:spPr>
             <a:xfrm>
-              <a:off x="1969805" y="3562511"/>
-              <a:ext cx="1509757" cy="644699"/>
+              <a:off x="1941564" y="-644526"/>
+              <a:ext cx="2529840" cy="1505170"/>
             </a:xfrm>
             <a:prstGeom prst="rect">
               <a:avLst/>
@@ -41697,626 +41425,589 @@
             <a:bodyPr rtlCol="0" anchor="ctr"/>
             <a:lstStyle/>
             <a:p>
-              <a:pPr algn="ctr"/>
               <a:r>
-                <a:rPr lang="de-DE" altLang="de-DE" sz="2000" dirty="0">
-                  <a:cs typeface="Arial" charset="0"/>
+                <a:rPr lang="de-AT" dirty="0">
+                  <a:latin typeface="Arial" panose="020B0604020202020204" pitchFamily="34" charset="0"/>
+                  <a:cs typeface="Arial" panose="020B0604020202020204" pitchFamily="34" charset="0"/>
                 </a:rPr>
-                <a:t>«</a:t>
+                <a:t>String </a:t>
               </a:r>
               <a:r>
-                <a:rPr lang="de-DE" altLang="de-DE" sz="1800" dirty="0" err="1">
-                  <a:cs typeface="Arial" charset="0"/>
+                <a:rPr lang="de-AT" dirty="0" err="1">
+                  <a:latin typeface="Arial" panose="020B0604020202020204" pitchFamily="34" charset="0"/>
+                  <a:cs typeface="Arial" panose="020B0604020202020204" pitchFamily="34" charset="0"/>
                 </a:rPr>
-                <a:t>Metaclass</a:t>
+                <a:t>displayName</a:t>
               </a:r>
-              <a:r>
-                <a:rPr lang="de-DE" altLang="de-DE" sz="1800" dirty="0">
-                  <a:cs typeface="Arial" charset="0"/>
-                </a:rPr>
-                <a:t>»</a:t>
-              </a:r>
-              <a:r>
-                <a:rPr lang="de-DE" altLang="de-DE" sz="1800" i="1" dirty="0"/>
-                <a:t> </a:t>
-              </a:r>
-              <a:endParaRPr lang="de-AT" b="1" dirty="0">
+              <a:endParaRPr lang="de-AT" dirty="0">
                 <a:latin typeface="Arial" panose="020B0604020202020204" pitchFamily="34" charset="0"/>
                 <a:cs typeface="Arial" panose="020B0604020202020204" pitchFamily="34" charset="0"/>
               </a:endParaRPr>
             </a:p>
             <a:p>
-              <a:pPr algn="ctr"/>
               <a:r>
-                <a:rPr lang="de-AT" b="1" dirty="0">
+                <a:rPr lang="de-AT" dirty="0">
                   <a:latin typeface="Arial" panose="020B0604020202020204" pitchFamily="34" charset="0"/>
                   <a:cs typeface="Arial" panose="020B0604020202020204" pitchFamily="34" charset="0"/>
                 </a:rPr>
-                <a:t>Class</a:t>
-              </a:r>
-            </a:p>
-          </p:txBody>
-        </p:sp>
-        <p:sp>
-          <p:nvSpPr>
-            <p:cNvPr id="15" name="Rechteck 14">
-              <a:extLst>
-                <a:ext uri="{FF2B5EF4-FFF2-40B4-BE49-F238E27FC236}">
-                  <a16:creationId xmlns:a16="http://schemas.microsoft.com/office/drawing/2014/main" id="{94BCBAB1-61A5-4CC5-8706-99A84F44014C}"/>
-                </a:ext>
-              </a:extLst>
-            </p:cNvPr>
-            <p:cNvSpPr/>
-            <p:nvPr/>
-          </p:nvSpPr>
-          <p:spPr>
-            <a:xfrm>
-              <a:off x="3720856" y="3557475"/>
-              <a:ext cx="1509757" cy="644699"/>
-            </a:xfrm>
-            <a:prstGeom prst="rect">
-              <a:avLst/>
-            </a:prstGeom>
-            <a:noFill/>
-            <a:ln w="9525" cap="flat" cmpd="sng" algn="ctr">
-              <a:solidFill>
-                <a:schemeClr val="dk1"/>
-              </a:solidFill>
-              <a:prstDash val="solid"/>
-              <a:round/>
-              <a:headEnd type="none" w="med" len="med"/>
-              <a:tailEnd type="arrow" w="med" len="med"/>
-            </a:ln>
-          </p:spPr>
-          <p:style>
-            <a:lnRef idx="0">
-              <a:scrgbClr r="0" g="0" b="0"/>
-            </a:lnRef>
-            <a:fillRef idx="0">
-              <a:scrgbClr r="0" g="0" b="0"/>
-            </a:fillRef>
-            <a:effectRef idx="0">
-              <a:scrgbClr r="0" g="0" b="0"/>
-            </a:effectRef>
-            <a:fontRef idx="minor">
-              <a:schemeClr val="dk1"/>
-            </a:fontRef>
-          </p:style>
-          <p:txBody>
-            <a:bodyPr rtlCol="0" anchor="ctr"/>
-            <a:lstStyle/>
-            <a:p>
-              <a:pPr algn="ctr"/>
-              <a:r>
-                <a:rPr lang="de-DE" altLang="de-DE" sz="2000" dirty="0">
-                  <a:cs typeface="Arial" charset="0"/>
-                </a:rPr>
-                <a:t>«</a:t>
+                <a:t>String </a:t>
               </a:r>
               <a:r>
-                <a:rPr lang="de-DE" altLang="de-DE" sz="1800" dirty="0" err="1">
-                  <a:cs typeface="Arial" charset="0"/>
+                <a:rPr lang="de-AT" dirty="0" err="1">
+                  <a:latin typeface="Arial" panose="020B0604020202020204" pitchFamily="34" charset="0"/>
+                  <a:cs typeface="Arial" panose="020B0604020202020204" pitchFamily="34" charset="0"/>
                 </a:rPr>
-                <a:t>Metaclass</a:t>
+                <a:t>description</a:t>
               </a:r>
-              <a:r>
-                <a:rPr lang="de-DE" altLang="de-DE" sz="1800" dirty="0">
-                  <a:cs typeface="Arial" charset="0"/>
-                </a:rPr>
-                <a:t>»</a:t>
-              </a:r>
-              <a:r>
-                <a:rPr lang="de-DE" altLang="de-DE" sz="1800" i="1" dirty="0"/>
-                <a:t> </a:t>
-              </a:r>
-              <a:endParaRPr lang="de-AT" b="1" dirty="0">
+              <a:endParaRPr lang="de-AT" dirty="0">
                 <a:latin typeface="Arial" panose="020B0604020202020204" pitchFamily="34" charset="0"/>
                 <a:cs typeface="Arial" panose="020B0604020202020204" pitchFamily="34" charset="0"/>
               </a:endParaRPr>
             </a:p>
             <a:p>
-              <a:pPr algn="ctr"/>
               <a:r>
-                <a:rPr lang="de-AT" b="1" dirty="0">
+                <a:rPr lang="de-AT" dirty="0">
                   <a:latin typeface="Arial" panose="020B0604020202020204" pitchFamily="34" charset="0"/>
                   <a:cs typeface="Arial" panose="020B0604020202020204" pitchFamily="34" charset="0"/>
                 </a:rPr>
-                <a:t>Operation</a:t>
-              </a:r>
-            </a:p>
-          </p:txBody>
-        </p:sp>
-        <p:sp>
-          <p:nvSpPr>
-            <p:cNvPr id="16" name="Rechteck 15">
-              <a:extLst>
-                <a:ext uri="{FF2B5EF4-FFF2-40B4-BE49-F238E27FC236}">
-                  <a16:creationId xmlns:a16="http://schemas.microsoft.com/office/drawing/2014/main" id="{FB3AA1AC-EDB7-461E-A900-BEDB5E7E69E0}"/>
-                </a:ext>
-              </a:extLst>
-            </p:cNvPr>
-            <p:cNvSpPr/>
-            <p:nvPr/>
-          </p:nvSpPr>
-          <p:spPr>
-            <a:xfrm>
-              <a:off x="7248981" y="3567547"/>
-              <a:ext cx="1509757" cy="644699"/>
-            </a:xfrm>
-            <a:prstGeom prst="rect">
-              <a:avLst/>
-            </a:prstGeom>
-            <a:noFill/>
-            <a:ln w="9525" cap="flat" cmpd="sng" algn="ctr">
-              <a:solidFill>
-                <a:schemeClr val="dk1"/>
-              </a:solidFill>
-              <a:prstDash val="solid"/>
-              <a:round/>
-              <a:headEnd type="none" w="med" len="med"/>
-              <a:tailEnd type="arrow" w="med" len="med"/>
-            </a:ln>
-          </p:spPr>
-          <p:style>
-            <a:lnRef idx="0">
-              <a:scrgbClr r="0" g="0" b="0"/>
-            </a:lnRef>
-            <a:fillRef idx="0">
-              <a:scrgbClr r="0" g="0" b="0"/>
-            </a:fillRef>
-            <a:effectRef idx="0">
-              <a:scrgbClr r="0" g="0" b="0"/>
-            </a:effectRef>
-            <a:fontRef idx="minor">
-              <a:schemeClr val="dk1"/>
-            </a:fontRef>
-          </p:style>
-          <p:txBody>
-            <a:bodyPr rtlCol="0" anchor="ctr"/>
-            <a:lstStyle/>
-            <a:p>
-              <a:pPr algn="ctr"/>
-              <a:r>
-                <a:rPr lang="de-DE" altLang="de-DE" sz="2000" dirty="0">
-                  <a:cs typeface="Arial" charset="0"/>
-                </a:rPr>
-                <a:t>«</a:t>
+                <a:t>String</a:t>
               </a:r>
               <a:r>
-                <a:rPr lang="de-DE" altLang="de-DE" sz="1800" dirty="0" err="1">
-                  <a:cs typeface="Arial" charset="0"/>
+                <a:rPr lang="de-AT" i="1" dirty="0">
+                  <a:latin typeface="Arial" panose="020B0604020202020204" pitchFamily="34" charset="0"/>
+                  <a:cs typeface="Arial" panose="020B0604020202020204" pitchFamily="34" charset="0"/>
                 </a:rPr>
-                <a:t>Metaclass</a:t>
+                <a:t> </a:t>
               </a:r>
               <a:r>
-                <a:rPr lang="de-DE" altLang="de-DE" sz="1800" dirty="0">
-                  <a:cs typeface="Arial" charset="0"/>
+                <a:rPr lang="de-AT" dirty="0" err="1">
+                  <a:latin typeface="Arial" panose="020B0604020202020204" pitchFamily="34" charset="0"/>
+                  <a:cs typeface="Arial" panose="020B0604020202020204" pitchFamily="34" charset="0"/>
                 </a:rPr>
-                <a:t>»</a:t>
+                <a:t>id_scheme</a:t>
               </a:r>
-              <a:r>
-                <a:rPr lang="de-DE" altLang="de-DE" sz="1800" i="1" dirty="0"/>
-                <a:t> </a:t>
-              </a:r>
-              <a:endParaRPr lang="de-AT" b="1" dirty="0">
+              <a:endParaRPr lang="de-AT" dirty="0">
                 <a:latin typeface="Arial" panose="020B0604020202020204" pitchFamily="34" charset="0"/>
                 <a:cs typeface="Arial" panose="020B0604020202020204" pitchFamily="34" charset="0"/>
               </a:endParaRPr>
             </a:p>
             <a:p>
-              <a:pPr algn="ctr"/>
               <a:r>
-                <a:rPr lang="de-AT" b="1" dirty="0">
+                <a:rPr lang="de-AT" dirty="0">
                   <a:latin typeface="Arial" panose="020B0604020202020204" pitchFamily="34" charset="0"/>
                   <a:cs typeface="Arial" panose="020B0604020202020204" pitchFamily="34" charset="0"/>
                 </a:rPr>
-                <a:t>Property</a:t>
-              </a:r>
-            </a:p>
-          </p:txBody>
-        </p:sp>
-        <p:sp>
-          <p:nvSpPr>
-            <p:cNvPr id="17" name="Rechteck 16">
-              <a:extLst>
-                <a:ext uri="{FF2B5EF4-FFF2-40B4-BE49-F238E27FC236}">
-                  <a16:creationId xmlns:a16="http://schemas.microsoft.com/office/drawing/2014/main" id="{A939C987-F01F-4AEC-9C46-5E903EB3C383}"/>
-                </a:ext>
-              </a:extLst>
-            </p:cNvPr>
-            <p:cNvSpPr/>
-            <p:nvPr/>
-          </p:nvSpPr>
-          <p:spPr>
-            <a:xfrm>
-              <a:off x="5497929" y="3562511"/>
-              <a:ext cx="1509757" cy="644699"/>
-            </a:xfrm>
-            <a:prstGeom prst="rect">
-              <a:avLst/>
-            </a:prstGeom>
-            <a:noFill/>
-            <a:ln w="9525" cap="flat" cmpd="sng" algn="ctr">
-              <a:solidFill>
-                <a:schemeClr val="dk1"/>
-              </a:solidFill>
-              <a:prstDash val="solid"/>
-              <a:round/>
-              <a:headEnd type="none" w="med" len="med"/>
-              <a:tailEnd type="arrow" w="med" len="med"/>
-            </a:ln>
-          </p:spPr>
-          <p:style>
-            <a:lnRef idx="0">
-              <a:scrgbClr r="0" g="0" b="0"/>
-            </a:lnRef>
-            <a:fillRef idx="0">
-              <a:scrgbClr r="0" g="0" b="0"/>
-            </a:fillRef>
-            <a:effectRef idx="0">
-              <a:scrgbClr r="0" g="0" b="0"/>
-            </a:effectRef>
-            <a:fontRef idx="minor">
-              <a:schemeClr val="dk1"/>
-            </a:fontRef>
-          </p:style>
-          <p:txBody>
-            <a:bodyPr rtlCol="0" anchor="ctr"/>
-            <a:lstStyle/>
-            <a:p>
-              <a:pPr algn="ctr"/>
-              <a:r>
-                <a:rPr lang="de-DE" altLang="de-DE" sz="2000" dirty="0">
-                  <a:cs typeface="Arial" charset="0"/>
-                </a:rPr>
-                <a:t>«</a:t>
+                <a:t>String </a:t>
               </a:r>
               <a:r>
-                <a:rPr lang="de-DE" altLang="de-DE" sz="1800" dirty="0" err="1">
-                  <a:cs typeface="Arial" charset="0"/>
+                <a:rPr lang="de-AT" dirty="0" err="1">
+                  <a:latin typeface="Arial" panose="020B0604020202020204" pitchFamily="34" charset="0"/>
+                  <a:cs typeface="Arial" panose="020B0604020202020204" pitchFamily="34" charset="0"/>
                 </a:rPr>
-                <a:t>Metaclass</a:t>
+                <a:t>id_path</a:t>
               </a:r>
-              <a:r>
-                <a:rPr lang="de-DE" altLang="de-DE" sz="1800" dirty="0">
-                  <a:cs typeface="Arial" charset="0"/>
-                </a:rPr>
-                <a:t>»</a:t>
-              </a:r>
-              <a:r>
-                <a:rPr lang="de-DE" altLang="de-DE" sz="1800" i="1" dirty="0"/>
-                <a:t> </a:t>
-              </a:r>
-              <a:endParaRPr lang="de-AT" b="1" dirty="0">
+              <a:endParaRPr lang="de-AT" dirty="0">
                 <a:latin typeface="Arial" panose="020B0604020202020204" pitchFamily="34" charset="0"/>
                 <a:cs typeface="Arial" panose="020B0604020202020204" pitchFamily="34" charset="0"/>
               </a:endParaRPr>
             </a:p>
             <a:p>
-              <a:pPr algn="ctr"/>
               <a:r>
-                <a:rPr lang="de-AT" b="1" dirty="0" err="1">
+                <a:rPr lang="de-AT" dirty="0" err="1">
                   <a:latin typeface="Arial" panose="020B0604020202020204" pitchFamily="34" charset="0"/>
                   <a:cs typeface="Arial" panose="020B0604020202020204" pitchFamily="34" charset="0"/>
                 </a:rPr>
-                <a:t>Association</a:t>
+                <a:t>Int</a:t>
               </a:r>
-              <a:endParaRPr lang="de-AT" b="1" dirty="0">
+              <a:r>
+                <a:rPr lang="de-AT" i="1" dirty="0">
+                  <a:latin typeface="Arial" panose="020B0604020202020204" pitchFamily="34" charset="0"/>
+                  <a:cs typeface="Arial" panose="020B0604020202020204" pitchFamily="34" charset="0"/>
+                </a:rPr>
+                <a:t> </a:t>
+              </a:r>
+              <a:r>
+                <a:rPr lang="de-AT" dirty="0" err="1">
+                  <a:latin typeface="Arial" panose="020B0604020202020204" pitchFamily="34" charset="0"/>
+                  <a:cs typeface="Arial" panose="020B0604020202020204" pitchFamily="34" charset="0"/>
+                </a:rPr>
+                <a:t>id_version</a:t>
+              </a:r>
+              <a:endParaRPr lang="de-AT" i="1" dirty="0">
                 <a:latin typeface="Arial" panose="020B0604020202020204" pitchFamily="34" charset="0"/>
                 <a:cs typeface="Arial" panose="020B0604020202020204" pitchFamily="34" charset="0"/>
               </a:endParaRPr>
             </a:p>
           </p:txBody>
         </p:sp>
-        <p:cxnSp>
-          <p:nvCxnSpPr>
-            <p:cNvPr id="19" name="Gerade Verbindung mit Pfeil 18">
-              <a:extLst>
-                <a:ext uri="{FF2B5EF4-FFF2-40B4-BE49-F238E27FC236}">
-                  <a16:creationId xmlns:a16="http://schemas.microsoft.com/office/drawing/2014/main" id="{205E955F-148D-47E3-87B2-B52309360909}"/>
-                </a:ext>
-              </a:extLst>
-            </p:cNvPr>
-            <p:cNvCxnSpPr>
-              <a:cxnSpLocks/>
-            </p:cNvCxnSpPr>
-            <p:nvPr/>
-          </p:nvCxnSpPr>
-          <p:spPr>
-            <a:xfrm>
-              <a:off x="2724683" y="3183309"/>
-              <a:ext cx="1" cy="384306"/>
-            </a:xfrm>
-            <a:prstGeom prst="straightConnector1">
-              <a:avLst/>
-            </a:prstGeom>
-            <a:ln w="38100">
-              <a:solidFill>
-                <a:schemeClr val="tx1"/>
-              </a:solidFill>
-              <a:tailEnd type="triangle"/>
-            </a:ln>
-          </p:spPr>
-          <p:style>
-            <a:lnRef idx="1">
-              <a:schemeClr val="accent1"/>
-            </a:lnRef>
-            <a:fillRef idx="0">
-              <a:schemeClr val="accent1"/>
-            </a:fillRef>
-            <a:effectRef idx="0">
-              <a:schemeClr val="accent1"/>
-            </a:effectRef>
-            <a:fontRef idx="minor">
-              <a:schemeClr val="tx1"/>
-            </a:fontRef>
-          </p:style>
-        </p:cxnSp>
-        <p:cxnSp>
-          <p:nvCxnSpPr>
-            <p:cNvPr id="20" name="Gerade Verbindung mit Pfeil 19">
-              <a:extLst>
-                <a:ext uri="{FF2B5EF4-FFF2-40B4-BE49-F238E27FC236}">
-                  <a16:creationId xmlns:a16="http://schemas.microsoft.com/office/drawing/2014/main" id="{72AC6761-603A-4099-94E7-5DE93C394C65}"/>
-                </a:ext>
-              </a:extLst>
-            </p:cNvPr>
-            <p:cNvCxnSpPr>
-              <a:cxnSpLocks/>
-            </p:cNvCxnSpPr>
-            <p:nvPr/>
-          </p:nvCxnSpPr>
-          <p:spPr>
-            <a:xfrm>
-              <a:off x="4475734" y="3167781"/>
-              <a:ext cx="0" cy="381788"/>
-            </a:xfrm>
-            <a:prstGeom prst="straightConnector1">
-              <a:avLst/>
-            </a:prstGeom>
-            <a:ln w="38100">
-              <a:solidFill>
-                <a:schemeClr val="tx1"/>
-              </a:solidFill>
-              <a:tailEnd type="triangle"/>
-            </a:ln>
-          </p:spPr>
-          <p:style>
-            <a:lnRef idx="1">
-              <a:schemeClr val="accent1"/>
-            </a:lnRef>
-            <a:fillRef idx="0">
-              <a:schemeClr val="accent1"/>
-            </a:fillRef>
-            <a:effectRef idx="0">
-              <a:schemeClr val="accent1"/>
-            </a:effectRef>
-            <a:fontRef idx="minor">
-              <a:schemeClr val="tx1"/>
-            </a:fontRef>
-          </p:style>
-        </p:cxnSp>
-        <p:cxnSp>
-          <p:nvCxnSpPr>
-            <p:cNvPr id="31" name="Gerade Verbindung mit Pfeil 30">
-              <a:extLst>
-                <a:ext uri="{FF2B5EF4-FFF2-40B4-BE49-F238E27FC236}">
-                  <a16:creationId xmlns:a16="http://schemas.microsoft.com/office/drawing/2014/main" id="{92F03C21-0A2F-4DE9-8FE7-85C35E10A622}"/>
-                </a:ext>
-              </a:extLst>
-            </p:cNvPr>
-            <p:cNvCxnSpPr>
-              <a:cxnSpLocks/>
-              <a:endCxn id="16" idx="0"/>
-            </p:cNvCxnSpPr>
-            <p:nvPr/>
-          </p:nvCxnSpPr>
-          <p:spPr>
-            <a:xfrm>
-              <a:off x="7998626" y="2133125"/>
-              <a:ext cx="5234" cy="1434422"/>
-            </a:xfrm>
-            <a:prstGeom prst="straightConnector1">
-              <a:avLst/>
-            </a:prstGeom>
-            <a:ln w="38100">
-              <a:solidFill>
-                <a:schemeClr val="tx1"/>
-              </a:solidFill>
-              <a:tailEnd type="triangle"/>
-            </a:ln>
-          </p:spPr>
-          <p:style>
-            <a:lnRef idx="1">
-              <a:schemeClr val="accent1"/>
-            </a:lnRef>
-            <a:fillRef idx="0">
-              <a:schemeClr val="accent1"/>
-            </a:fillRef>
-            <a:effectRef idx="0">
-              <a:schemeClr val="accent1"/>
-            </a:effectRef>
-            <a:fontRef idx="minor">
-              <a:schemeClr val="tx1"/>
-            </a:fontRef>
-          </p:style>
-        </p:cxnSp>
-        <p:cxnSp>
-          <p:nvCxnSpPr>
-            <p:cNvPr id="35" name="Verbinder: gewinkelt 34">
-              <a:extLst>
-                <a:ext uri="{FF2B5EF4-FFF2-40B4-BE49-F238E27FC236}">
-                  <a16:creationId xmlns:a16="http://schemas.microsoft.com/office/drawing/2014/main" id="{67071F73-2EB8-4DD6-9C09-F942AA10FFE0}"/>
-                </a:ext>
-              </a:extLst>
-            </p:cNvPr>
-            <p:cNvCxnSpPr>
-              <a:cxnSpLocks/>
-              <a:endCxn id="17" idx="0"/>
-            </p:cNvCxnSpPr>
-            <p:nvPr/>
-          </p:nvCxnSpPr>
-          <p:spPr>
-            <a:xfrm>
-              <a:off x="5230612" y="2921516"/>
-              <a:ext cx="1022196" cy="640995"/>
-            </a:xfrm>
-            <a:prstGeom prst="bentConnector2">
-              <a:avLst/>
-            </a:prstGeom>
-            <a:ln w="38100">
-              <a:solidFill>
-                <a:schemeClr val="tx1"/>
-              </a:solidFill>
-              <a:tailEnd type="triangle"/>
-            </a:ln>
-          </p:spPr>
-          <p:style>
-            <a:lnRef idx="1">
-              <a:schemeClr val="accent1"/>
-            </a:lnRef>
-            <a:fillRef idx="0">
-              <a:schemeClr val="accent1"/>
-            </a:fillRef>
-            <a:effectRef idx="0">
-              <a:schemeClr val="accent1"/>
-            </a:effectRef>
-            <a:fontRef idx="minor">
-              <a:schemeClr val="tx1"/>
-            </a:fontRef>
-          </p:style>
-        </p:cxnSp>
-        <p:sp>
-          <p:nvSpPr>
-            <p:cNvPr id="41" name="Rechteck 40">
-              <a:extLst>
-                <a:ext uri="{FF2B5EF4-FFF2-40B4-BE49-F238E27FC236}">
-                  <a16:creationId xmlns:a16="http://schemas.microsoft.com/office/drawing/2014/main" id="{62286CE6-89CB-42CB-9DE7-FA43B229429E}"/>
-                </a:ext>
-              </a:extLst>
-            </p:cNvPr>
-            <p:cNvSpPr/>
-            <p:nvPr/>
-          </p:nvSpPr>
-          <p:spPr>
-            <a:xfrm>
-              <a:off x="1854436" y="974220"/>
-              <a:ext cx="8976289" cy="3279144"/>
-            </a:xfrm>
-            <a:prstGeom prst="rect">
-              <a:avLst/>
-            </a:prstGeom>
-            <a:noFill/>
-            <a:ln w="9525">
-              <a:solidFill>
-                <a:schemeClr val="tx1"/>
-              </a:solidFill>
-            </a:ln>
-          </p:spPr>
-          <p:style>
-            <a:lnRef idx="2">
-              <a:schemeClr val="accent1">
-                <a:shade val="50000"/>
-              </a:schemeClr>
-            </a:lnRef>
-            <a:fillRef idx="1">
-              <a:schemeClr val="accent1"/>
-            </a:fillRef>
-            <a:effectRef idx="0">
-              <a:schemeClr val="accent1"/>
-            </a:effectRef>
-            <a:fontRef idx="minor">
-              <a:schemeClr val="lt1"/>
-            </a:fontRef>
-          </p:style>
-          <p:txBody>
-            <a:bodyPr rtlCol="0" anchor="ctr"/>
-            <a:lstStyle/>
-            <a:p>
-              <a:pPr algn="ctr"/>
-              <a:endParaRPr lang="en-US"/>
-            </a:p>
-          </p:txBody>
-        </p:sp>
-        <p:sp>
-          <p:nvSpPr>
-            <p:cNvPr id="42" name="Rechteck 41">
-              <a:extLst>
-                <a:ext uri="{FF2B5EF4-FFF2-40B4-BE49-F238E27FC236}">
-                  <a16:creationId xmlns:a16="http://schemas.microsoft.com/office/drawing/2014/main" id="{F8922935-032B-4F30-879C-CFAB05EB075C}"/>
-                </a:ext>
-              </a:extLst>
-            </p:cNvPr>
-            <p:cNvSpPr/>
-            <p:nvPr/>
-          </p:nvSpPr>
-          <p:spPr>
-            <a:xfrm>
-              <a:off x="1854437" y="673286"/>
-              <a:ext cx="1708238" cy="300934"/>
-            </a:xfrm>
-            <a:prstGeom prst="rect">
-              <a:avLst/>
-            </a:prstGeom>
-            <a:noFill/>
-            <a:ln w="9525" cap="flat" cmpd="sng" algn="ctr">
-              <a:solidFill>
-                <a:schemeClr val="dk1"/>
-              </a:solidFill>
-              <a:prstDash val="solid"/>
-              <a:round/>
-              <a:headEnd type="none" w="med" len="med"/>
-              <a:tailEnd type="arrow" w="med" len="med"/>
-            </a:ln>
-          </p:spPr>
-          <p:style>
-            <a:lnRef idx="0">
-              <a:scrgbClr r="0" g="0" b="0"/>
-            </a:lnRef>
-            <a:fillRef idx="0">
-              <a:scrgbClr r="0" g="0" b="0"/>
-            </a:fillRef>
-            <a:effectRef idx="0">
-              <a:scrgbClr r="0" g="0" b="0"/>
-            </a:effectRef>
-            <a:fontRef idx="minor">
+      </p:grpSp>
+      <p:sp>
+        <p:nvSpPr>
+          <p:cNvPr id="9" name="Rechteck 8">
+            <a:extLst>
+              <a:ext uri="{FF2B5EF4-FFF2-40B4-BE49-F238E27FC236}">
+                <a16:creationId xmlns:a16="http://schemas.microsoft.com/office/drawing/2014/main" id="{4D613E46-1DE6-4F12-AC26-DB23EA18B53B}"/>
+              </a:ext>
+            </a:extLst>
+          </p:cNvPr>
+          <p:cNvSpPr/>
+          <p:nvPr/>
+        </p:nvSpPr>
+        <p:spPr>
+          <a:xfrm>
+            <a:off x="8655152" y="949881"/>
+            <a:ext cx="2692624" cy="644699"/>
+          </a:xfrm>
+          <a:prstGeom prst="rect">
+            <a:avLst/>
+          </a:prstGeom>
+          <a:noFill/>
+          <a:ln w="9525" cap="flat" cmpd="sng" algn="ctr">
+            <a:solidFill>
               <a:schemeClr val="dk1"/>
-            </a:fontRef>
-          </p:style>
-          <p:txBody>
-            <a:bodyPr rtlCol="0" anchor="ctr"/>
-            <a:lstStyle/>
-            <a:p>
-              <a:pPr algn="ctr"/>
-              <a:r>
-                <a:rPr lang="de-AT" sz="1400" dirty="0">
-                  <a:latin typeface="Arial" panose="020B0604020202020204" pitchFamily="34" charset="0"/>
-                  <a:cs typeface="Arial" panose="020B0604020202020204" pitchFamily="34" charset="0"/>
-                </a:rPr>
-                <a:t>Profile UML_DTDL</a:t>
-              </a:r>
-            </a:p>
-          </p:txBody>
-        </p:sp>
-      </p:grpSp>
+            </a:solidFill>
+            <a:prstDash val="solid"/>
+            <a:round/>
+            <a:headEnd type="none" w="med" len="med"/>
+            <a:tailEnd type="arrow" w="med" len="med"/>
+          </a:ln>
+        </p:spPr>
+        <p:style>
+          <a:lnRef idx="0">
+            <a:scrgbClr r="0" g="0" b="0"/>
+          </a:lnRef>
+          <a:fillRef idx="0">
+            <a:scrgbClr r="0" g="0" b="0"/>
+          </a:fillRef>
+          <a:effectRef idx="0">
+            <a:scrgbClr r="0" g="0" b="0"/>
+          </a:effectRef>
+          <a:fontRef idx="minor">
+            <a:schemeClr val="dk1"/>
+          </a:fontRef>
+        </p:style>
+        <p:txBody>
+          <a:bodyPr rtlCol="0" anchor="ctr"/>
+          <a:lstStyle/>
+          <a:p>
+            <a:pPr algn="ctr"/>
+            <a:r>
+              <a:rPr lang="de-DE" altLang="de-DE" sz="2000" dirty="0">
+                <a:cs typeface="Arial" charset="0"/>
+              </a:rPr>
+              <a:t>«</a:t>
+            </a:r>
+            <a:r>
+              <a:rPr lang="de-DE" altLang="de-DE" sz="1800" dirty="0">
+                <a:cs typeface="Arial" charset="0"/>
+              </a:rPr>
+              <a:t>Stereotype»</a:t>
+            </a:r>
+            <a:r>
+              <a:rPr lang="de-DE" altLang="de-DE" sz="1800" i="1" dirty="0"/>
+              <a:t> </a:t>
+            </a:r>
+            <a:endParaRPr lang="de-AT" b="1" dirty="0">
+              <a:latin typeface="Arial" panose="020B0604020202020204" pitchFamily="34" charset="0"/>
+              <a:cs typeface="Arial" panose="020B0604020202020204" pitchFamily="34" charset="0"/>
+            </a:endParaRPr>
+          </a:p>
+          <a:p>
+            <a:pPr algn="ctr"/>
+            <a:r>
+              <a:rPr lang="de-AT" b="1" dirty="0" err="1">
+                <a:latin typeface="Arial" panose="020B0604020202020204" pitchFamily="34" charset="0"/>
+                <a:cs typeface="Arial" panose="020B0604020202020204" pitchFamily="34" charset="0"/>
+              </a:rPr>
+              <a:t>DTProperty</a:t>
+            </a:r>
+            <a:endParaRPr lang="de-AT" b="1" dirty="0">
+              <a:latin typeface="Arial" panose="020B0604020202020204" pitchFamily="34" charset="0"/>
+              <a:cs typeface="Arial" panose="020B0604020202020204" pitchFamily="34" charset="0"/>
+            </a:endParaRPr>
+          </a:p>
+        </p:txBody>
+      </p:sp>
+      <p:sp>
+        <p:nvSpPr>
+          <p:cNvPr id="14" name="Rechteck 13">
+            <a:extLst>
+              <a:ext uri="{FF2B5EF4-FFF2-40B4-BE49-F238E27FC236}">
+                <a16:creationId xmlns:a16="http://schemas.microsoft.com/office/drawing/2014/main" id="{24DF49E4-A308-45E1-AE02-FE78B37308F7}"/>
+              </a:ext>
+            </a:extLst>
+          </p:cNvPr>
+          <p:cNvSpPr/>
+          <p:nvPr/>
+        </p:nvSpPr>
+        <p:spPr>
+          <a:xfrm>
+            <a:off x="394431" y="3587550"/>
+            <a:ext cx="2334014" cy="644699"/>
+          </a:xfrm>
+          <a:prstGeom prst="rect">
+            <a:avLst/>
+          </a:prstGeom>
+          <a:noFill/>
+          <a:ln w="9525" cap="flat" cmpd="sng" algn="ctr">
+            <a:solidFill>
+              <a:schemeClr val="dk1"/>
+            </a:solidFill>
+            <a:prstDash val="solid"/>
+            <a:round/>
+            <a:headEnd type="none" w="med" len="med"/>
+            <a:tailEnd type="arrow" w="med" len="med"/>
+          </a:ln>
+        </p:spPr>
+        <p:style>
+          <a:lnRef idx="0">
+            <a:scrgbClr r="0" g="0" b="0"/>
+          </a:lnRef>
+          <a:fillRef idx="0">
+            <a:scrgbClr r="0" g="0" b="0"/>
+          </a:fillRef>
+          <a:effectRef idx="0">
+            <a:scrgbClr r="0" g="0" b="0"/>
+          </a:effectRef>
+          <a:fontRef idx="minor">
+            <a:schemeClr val="dk1"/>
+          </a:fontRef>
+        </p:style>
+        <p:txBody>
+          <a:bodyPr rtlCol="0" anchor="ctr"/>
+          <a:lstStyle/>
+          <a:p>
+            <a:pPr algn="ctr"/>
+            <a:r>
+              <a:rPr lang="de-DE" altLang="de-DE" sz="2000" dirty="0">
+                <a:cs typeface="Arial" charset="0"/>
+              </a:rPr>
+              <a:t>«</a:t>
+            </a:r>
+            <a:r>
+              <a:rPr lang="de-DE" altLang="de-DE" sz="1800" dirty="0" err="1">
+                <a:cs typeface="Arial" charset="0"/>
+              </a:rPr>
+              <a:t>Metaclass</a:t>
+            </a:r>
+            <a:r>
+              <a:rPr lang="de-DE" altLang="de-DE" sz="1800" dirty="0">
+                <a:cs typeface="Arial" charset="0"/>
+              </a:rPr>
+              <a:t>»</a:t>
+            </a:r>
+            <a:r>
+              <a:rPr lang="de-DE" altLang="de-DE" sz="1800" i="1" dirty="0"/>
+              <a:t> </a:t>
+            </a:r>
+            <a:endParaRPr lang="de-AT" b="1" dirty="0">
+              <a:latin typeface="Arial" panose="020B0604020202020204" pitchFamily="34" charset="0"/>
+              <a:cs typeface="Arial" panose="020B0604020202020204" pitchFamily="34" charset="0"/>
+            </a:endParaRPr>
+          </a:p>
+          <a:p>
+            <a:pPr algn="ctr"/>
+            <a:r>
+              <a:rPr lang="de-AT" b="1" dirty="0">
+                <a:latin typeface="Arial" panose="020B0604020202020204" pitchFamily="34" charset="0"/>
+                <a:cs typeface="Arial" panose="020B0604020202020204" pitchFamily="34" charset="0"/>
+              </a:rPr>
+              <a:t>Class</a:t>
+            </a:r>
+          </a:p>
+        </p:txBody>
+      </p:sp>
+      <p:sp>
+        <p:nvSpPr>
+          <p:cNvPr id="15" name="Rechteck 14">
+            <a:extLst>
+              <a:ext uri="{FF2B5EF4-FFF2-40B4-BE49-F238E27FC236}">
+                <a16:creationId xmlns:a16="http://schemas.microsoft.com/office/drawing/2014/main" id="{94BCBAB1-61A5-4CC5-8706-99A84F44014C}"/>
+              </a:ext>
+            </a:extLst>
+          </p:cNvPr>
+          <p:cNvSpPr/>
+          <p:nvPr/>
+        </p:nvSpPr>
+        <p:spPr>
+          <a:xfrm>
+            <a:off x="2910686" y="3567555"/>
+            <a:ext cx="2701798" cy="644699"/>
+          </a:xfrm>
+          <a:prstGeom prst="rect">
+            <a:avLst/>
+          </a:prstGeom>
+          <a:noFill/>
+          <a:ln w="9525" cap="flat" cmpd="sng" algn="ctr">
+            <a:solidFill>
+              <a:schemeClr val="dk1"/>
+            </a:solidFill>
+            <a:prstDash val="solid"/>
+            <a:round/>
+            <a:headEnd type="none" w="med" len="med"/>
+            <a:tailEnd type="arrow" w="med" len="med"/>
+          </a:ln>
+        </p:spPr>
+        <p:style>
+          <a:lnRef idx="0">
+            <a:scrgbClr r="0" g="0" b="0"/>
+          </a:lnRef>
+          <a:fillRef idx="0">
+            <a:scrgbClr r="0" g="0" b="0"/>
+          </a:fillRef>
+          <a:effectRef idx="0">
+            <a:scrgbClr r="0" g="0" b="0"/>
+          </a:effectRef>
+          <a:fontRef idx="minor">
+            <a:schemeClr val="dk1"/>
+          </a:fontRef>
+        </p:style>
+        <p:txBody>
+          <a:bodyPr rtlCol="0" anchor="ctr"/>
+          <a:lstStyle/>
+          <a:p>
+            <a:pPr algn="ctr"/>
+            <a:r>
+              <a:rPr lang="de-DE" altLang="de-DE" sz="2000" dirty="0">
+                <a:cs typeface="Arial" charset="0"/>
+              </a:rPr>
+              <a:t>«</a:t>
+            </a:r>
+            <a:r>
+              <a:rPr lang="de-DE" altLang="de-DE" sz="1800" dirty="0" err="1">
+                <a:cs typeface="Arial" charset="0"/>
+              </a:rPr>
+              <a:t>Metaclass</a:t>
+            </a:r>
+            <a:r>
+              <a:rPr lang="de-DE" altLang="de-DE" sz="1800" dirty="0">
+                <a:cs typeface="Arial" charset="0"/>
+              </a:rPr>
+              <a:t>»</a:t>
+            </a:r>
+            <a:r>
+              <a:rPr lang="de-DE" altLang="de-DE" sz="1800" i="1" dirty="0"/>
+              <a:t> </a:t>
+            </a:r>
+            <a:endParaRPr lang="de-AT" b="1" dirty="0">
+              <a:latin typeface="Arial" panose="020B0604020202020204" pitchFamily="34" charset="0"/>
+              <a:cs typeface="Arial" panose="020B0604020202020204" pitchFamily="34" charset="0"/>
+            </a:endParaRPr>
+          </a:p>
+          <a:p>
+            <a:pPr algn="ctr"/>
+            <a:r>
+              <a:rPr lang="de-AT" b="1" dirty="0">
+                <a:latin typeface="Arial" panose="020B0604020202020204" pitchFamily="34" charset="0"/>
+                <a:cs typeface="Arial" panose="020B0604020202020204" pitchFamily="34" charset="0"/>
+              </a:rPr>
+              <a:t>Operation</a:t>
+            </a:r>
+          </a:p>
+        </p:txBody>
+      </p:sp>
+      <p:sp>
+        <p:nvSpPr>
+          <p:cNvPr id="16" name="Rechteck 15">
+            <a:extLst>
+              <a:ext uri="{FF2B5EF4-FFF2-40B4-BE49-F238E27FC236}">
+                <a16:creationId xmlns:a16="http://schemas.microsoft.com/office/drawing/2014/main" id="{FB3AA1AC-EDB7-461E-A900-BEDB5E7E69E0}"/>
+              </a:ext>
+            </a:extLst>
+          </p:cNvPr>
+          <p:cNvSpPr/>
+          <p:nvPr/>
+        </p:nvSpPr>
+        <p:spPr>
+          <a:xfrm>
+            <a:off x="8655152" y="3567556"/>
+            <a:ext cx="2692624" cy="644699"/>
+          </a:xfrm>
+          <a:prstGeom prst="rect">
+            <a:avLst/>
+          </a:prstGeom>
+          <a:noFill/>
+          <a:ln w="9525" cap="flat" cmpd="sng" algn="ctr">
+            <a:solidFill>
+              <a:schemeClr val="dk1"/>
+            </a:solidFill>
+            <a:prstDash val="solid"/>
+            <a:round/>
+            <a:headEnd type="none" w="med" len="med"/>
+            <a:tailEnd type="arrow" w="med" len="med"/>
+          </a:ln>
+        </p:spPr>
+        <p:style>
+          <a:lnRef idx="0">
+            <a:scrgbClr r="0" g="0" b="0"/>
+          </a:lnRef>
+          <a:fillRef idx="0">
+            <a:scrgbClr r="0" g="0" b="0"/>
+          </a:fillRef>
+          <a:effectRef idx="0">
+            <a:scrgbClr r="0" g="0" b="0"/>
+          </a:effectRef>
+          <a:fontRef idx="minor">
+            <a:schemeClr val="dk1"/>
+          </a:fontRef>
+        </p:style>
+        <p:txBody>
+          <a:bodyPr rtlCol="0" anchor="ctr"/>
+          <a:lstStyle/>
+          <a:p>
+            <a:pPr algn="ctr"/>
+            <a:r>
+              <a:rPr lang="de-DE" altLang="de-DE" sz="2000" dirty="0">
+                <a:cs typeface="Arial" charset="0"/>
+              </a:rPr>
+              <a:t>«</a:t>
+            </a:r>
+            <a:r>
+              <a:rPr lang="de-DE" altLang="de-DE" sz="1800" dirty="0" err="1">
+                <a:cs typeface="Arial" charset="0"/>
+              </a:rPr>
+              <a:t>Metaclass</a:t>
+            </a:r>
+            <a:r>
+              <a:rPr lang="de-DE" altLang="de-DE" sz="1800" dirty="0">
+                <a:cs typeface="Arial" charset="0"/>
+              </a:rPr>
+              <a:t>»</a:t>
+            </a:r>
+            <a:r>
+              <a:rPr lang="de-DE" altLang="de-DE" sz="1800" i="1" dirty="0"/>
+              <a:t> </a:t>
+            </a:r>
+            <a:endParaRPr lang="de-AT" b="1" dirty="0">
+              <a:latin typeface="Arial" panose="020B0604020202020204" pitchFamily="34" charset="0"/>
+              <a:cs typeface="Arial" panose="020B0604020202020204" pitchFamily="34" charset="0"/>
+            </a:endParaRPr>
+          </a:p>
+          <a:p>
+            <a:pPr algn="ctr"/>
+            <a:r>
+              <a:rPr lang="de-AT" b="1" dirty="0">
+                <a:latin typeface="Arial" panose="020B0604020202020204" pitchFamily="34" charset="0"/>
+                <a:cs typeface="Arial" panose="020B0604020202020204" pitchFamily="34" charset="0"/>
+              </a:rPr>
+              <a:t>Property</a:t>
+            </a:r>
+          </a:p>
+        </p:txBody>
+      </p:sp>
+      <p:sp>
+        <p:nvSpPr>
+          <p:cNvPr id="17" name="Rechteck 16">
+            <a:extLst>
+              <a:ext uri="{FF2B5EF4-FFF2-40B4-BE49-F238E27FC236}">
+                <a16:creationId xmlns:a16="http://schemas.microsoft.com/office/drawing/2014/main" id="{A939C987-F01F-4AEC-9C46-5E903EB3C383}"/>
+              </a:ext>
+            </a:extLst>
+          </p:cNvPr>
+          <p:cNvSpPr/>
+          <p:nvPr/>
+        </p:nvSpPr>
+        <p:spPr>
+          <a:xfrm>
+            <a:off x="5831736" y="3587550"/>
+            <a:ext cx="2584943" cy="644699"/>
+          </a:xfrm>
+          <a:prstGeom prst="rect">
+            <a:avLst/>
+          </a:prstGeom>
+          <a:noFill/>
+          <a:ln w="9525" cap="flat" cmpd="sng" algn="ctr">
+            <a:solidFill>
+              <a:schemeClr val="dk1"/>
+            </a:solidFill>
+            <a:prstDash val="solid"/>
+            <a:round/>
+            <a:headEnd type="none" w="med" len="med"/>
+            <a:tailEnd type="arrow" w="med" len="med"/>
+          </a:ln>
+        </p:spPr>
+        <p:style>
+          <a:lnRef idx="0">
+            <a:scrgbClr r="0" g="0" b="0"/>
+          </a:lnRef>
+          <a:fillRef idx="0">
+            <a:scrgbClr r="0" g="0" b="0"/>
+          </a:fillRef>
+          <a:effectRef idx="0">
+            <a:scrgbClr r="0" g="0" b="0"/>
+          </a:effectRef>
+          <a:fontRef idx="minor">
+            <a:schemeClr val="dk1"/>
+          </a:fontRef>
+        </p:style>
+        <p:txBody>
+          <a:bodyPr rtlCol="0" anchor="ctr"/>
+          <a:lstStyle/>
+          <a:p>
+            <a:pPr algn="ctr"/>
+            <a:r>
+              <a:rPr lang="de-DE" altLang="de-DE" sz="2000" dirty="0">
+                <a:cs typeface="Arial" charset="0"/>
+              </a:rPr>
+              <a:t>«</a:t>
+            </a:r>
+            <a:r>
+              <a:rPr lang="de-DE" altLang="de-DE" sz="1800" dirty="0" err="1">
+                <a:cs typeface="Arial" charset="0"/>
+              </a:rPr>
+              <a:t>Metaclass</a:t>
+            </a:r>
+            <a:r>
+              <a:rPr lang="de-DE" altLang="de-DE" sz="1800" dirty="0">
+                <a:cs typeface="Arial" charset="0"/>
+              </a:rPr>
+              <a:t>»</a:t>
+            </a:r>
+            <a:r>
+              <a:rPr lang="de-DE" altLang="de-DE" sz="1800" i="1" dirty="0"/>
+              <a:t> </a:t>
+            </a:r>
+            <a:endParaRPr lang="de-AT" b="1" dirty="0">
+              <a:latin typeface="Arial" panose="020B0604020202020204" pitchFamily="34" charset="0"/>
+              <a:cs typeface="Arial" panose="020B0604020202020204" pitchFamily="34" charset="0"/>
+            </a:endParaRPr>
+          </a:p>
+          <a:p>
+            <a:pPr algn="ctr"/>
+            <a:r>
+              <a:rPr lang="de-AT" b="1" dirty="0" err="1">
+                <a:latin typeface="Arial" panose="020B0604020202020204" pitchFamily="34" charset="0"/>
+                <a:cs typeface="Arial" panose="020B0604020202020204" pitchFamily="34" charset="0"/>
+              </a:rPr>
+              <a:t>Association</a:t>
+            </a:r>
+            <a:endParaRPr lang="de-AT" b="1" dirty="0">
+              <a:latin typeface="Arial" panose="020B0604020202020204" pitchFamily="34" charset="0"/>
+              <a:cs typeface="Arial" panose="020B0604020202020204" pitchFamily="34" charset="0"/>
+            </a:endParaRPr>
+          </a:p>
+        </p:txBody>
+      </p:sp>
       <p:cxnSp>
         <p:nvCxnSpPr>
-          <p:cNvPr id="23" name="Gerade Verbindung mit Pfeil 22">
-            <a:extLst>
-              <a:ext uri="{FF2B5EF4-FFF2-40B4-BE49-F238E27FC236}">
-                <a16:creationId xmlns:a16="http://schemas.microsoft.com/office/drawing/2014/main" id="{78A7C73F-B2A3-4B9C-99E0-330C2B90219F}"/>
+          <p:cNvPr id="19" name="Gerade Verbindung mit Pfeil 18">
+            <a:extLst>
+              <a:ext uri="{FF2B5EF4-FFF2-40B4-BE49-F238E27FC236}">
+                <a16:creationId xmlns:a16="http://schemas.microsoft.com/office/drawing/2014/main" id="{205E955F-148D-47E3-87B2-B52309360909}"/>
               </a:ext>
             </a:extLst>
           </p:cNvPr>
           <p:cNvCxnSpPr>
             <a:cxnSpLocks/>
+            <a:stCxn id="30" idx="2"/>
+            <a:endCxn id="14" idx="0"/>
           </p:cNvCxnSpPr>
           <p:nvPr/>
         </p:nvCxnSpPr>
         <p:spPr>
-          <a:xfrm>
-            <a:off x="7860791" y="3541806"/>
-            <a:ext cx="0" cy="966016"/>
+          <a:xfrm flipH="1">
+            <a:off x="1561438" y="2191933"/>
+            <a:ext cx="2" cy="1395617"/>
           </a:xfrm>
           <a:prstGeom prst="straightConnector1">
             <a:avLst/>
@@ -42345,22 +42036,24 @@
       </p:cxnSp>
       <p:cxnSp>
         <p:nvCxnSpPr>
-          <p:cNvPr id="27" name="Gerade Verbindung mit Pfeil 26">
-            <a:extLst>
-              <a:ext uri="{FF2B5EF4-FFF2-40B4-BE49-F238E27FC236}">
-                <a16:creationId xmlns:a16="http://schemas.microsoft.com/office/drawing/2014/main" id="{46CAB06C-F153-445D-85EE-5D5D42AE2D27}"/>
+          <p:cNvPr id="20" name="Gerade Verbindung mit Pfeil 19">
+            <a:extLst>
+              <a:ext uri="{FF2B5EF4-FFF2-40B4-BE49-F238E27FC236}">
+                <a16:creationId xmlns:a16="http://schemas.microsoft.com/office/drawing/2014/main" id="{72AC6761-603A-4099-94E7-5DE93C394C65}"/>
               </a:ext>
             </a:extLst>
           </p:cNvPr>
           <p:cNvCxnSpPr>
             <a:cxnSpLocks/>
+            <a:stCxn id="6" idx="0"/>
+            <a:endCxn id="15" idx="2"/>
           </p:cNvCxnSpPr>
           <p:nvPr/>
         </p:nvCxnSpPr>
         <p:spPr>
-          <a:xfrm>
-            <a:off x="5486986" y="3560856"/>
-            <a:ext cx="2373805" cy="0"/>
+          <a:xfrm flipH="1" flipV="1">
+            <a:off x="4261585" y="4212254"/>
+            <a:ext cx="1685917" cy="488902"/>
           </a:xfrm>
           <a:prstGeom prst="straightConnector1">
             <a:avLst/>
@@ -42369,8 +42062,53 @@
             <a:solidFill>
               <a:schemeClr val="tx1"/>
             </a:solidFill>
-            <a:headEnd type="none" w="med" len="med"/>
-            <a:tailEnd type="none" w="med" len="med"/>
+            <a:tailEnd type="triangle"/>
+          </a:ln>
+        </p:spPr>
+        <p:style>
+          <a:lnRef idx="1">
+            <a:schemeClr val="accent1"/>
+          </a:lnRef>
+          <a:fillRef idx="0">
+            <a:schemeClr val="accent1"/>
+          </a:fillRef>
+          <a:effectRef idx="0">
+            <a:schemeClr val="accent1"/>
+          </a:effectRef>
+          <a:fontRef idx="minor">
+            <a:schemeClr val="tx1"/>
+          </a:fontRef>
+        </p:style>
+      </p:cxnSp>
+      <p:cxnSp>
+        <p:nvCxnSpPr>
+          <p:cNvPr id="31" name="Gerade Verbindung mit Pfeil 30">
+            <a:extLst>
+              <a:ext uri="{FF2B5EF4-FFF2-40B4-BE49-F238E27FC236}">
+                <a16:creationId xmlns:a16="http://schemas.microsoft.com/office/drawing/2014/main" id="{92F03C21-0A2F-4DE9-8FE7-85C35E10A622}"/>
+              </a:ext>
+            </a:extLst>
+          </p:cNvPr>
+          <p:cNvCxnSpPr>
+            <a:cxnSpLocks/>
+            <a:stCxn id="25" idx="2"/>
+            <a:endCxn id="16" idx="0"/>
+          </p:cNvCxnSpPr>
+          <p:nvPr/>
+        </p:nvCxnSpPr>
+        <p:spPr>
+          <a:xfrm flipH="1">
+            <a:off x="10001464" y="3019012"/>
+            <a:ext cx="4588" cy="548544"/>
+          </a:xfrm>
+          <a:prstGeom prst="straightConnector1">
+            <a:avLst/>
+          </a:prstGeom>
+          <a:ln w="38100">
+            <a:solidFill>
+              <a:schemeClr val="tx1"/>
+            </a:solidFill>
+            <a:tailEnd type="triangle"/>
           </a:ln>
         </p:spPr>
         <p:style>
@@ -42390,10 +42128,10 @@
       </p:cxnSp>
       <p:sp>
         <p:nvSpPr>
-          <p:cNvPr id="21" name="Rechteck 20">
-            <a:extLst>
-              <a:ext uri="{FF2B5EF4-FFF2-40B4-BE49-F238E27FC236}">
-                <a16:creationId xmlns:a16="http://schemas.microsoft.com/office/drawing/2014/main" id="{1B3B2550-EAAB-403B-8A4A-F5066B8B3DA8}"/>
+          <p:cNvPr id="41" name="Rechteck 40">
+            <a:extLst>
+              <a:ext uri="{FF2B5EF4-FFF2-40B4-BE49-F238E27FC236}">
+                <a16:creationId xmlns:a16="http://schemas.microsoft.com/office/drawing/2014/main" id="{62286CE6-89CB-42CB-9DE7-FA43B229429E}"/>
               </a:ext>
             </a:extLst>
           </p:cNvPr>
@@ -42402,8 +42140,60 @@
         </p:nvSpPr>
         <p:spPr>
           <a:xfrm>
-            <a:off x="6096000" y="2063583"/>
-            <a:ext cx="2373805" cy="644699"/>
+            <a:off x="242888" y="792160"/>
+            <a:ext cx="11258551" cy="6034503"/>
+          </a:xfrm>
+          <a:prstGeom prst="rect">
+            <a:avLst/>
+          </a:prstGeom>
+          <a:noFill/>
+          <a:ln w="9525">
+            <a:solidFill>
+              <a:schemeClr val="tx1"/>
+            </a:solidFill>
+          </a:ln>
+        </p:spPr>
+        <p:style>
+          <a:lnRef idx="2">
+            <a:schemeClr val="accent1">
+              <a:shade val="50000"/>
+            </a:schemeClr>
+          </a:lnRef>
+          <a:fillRef idx="1">
+            <a:schemeClr val="accent1"/>
+          </a:fillRef>
+          <a:effectRef idx="0">
+            <a:schemeClr val="accent1"/>
+          </a:effectRef>
+          <a:fontRef idx="minor">
+            <a:schemeClr val="lt1"/>
+          </a:fontRef>
+        </p:style>
+        <p:txBody>
+          <a:bodyPr rtlCol="0" anchor="ctr"/>
+          <a:lstStyle/>
+          <a:p>
+            <a:pPr algn="ctr"/>
+            <a:endParaRPr lang="en-US"/>
+          </a:p>
+        </p:txBody>
+      </p:sp>
+      <p:sp>
+        <p:nvSpPr>
+          <p:cNvPr id="42" name="Rechteck 41">
+            <a:extLst>
+              <a:ext uri="{FF2B5EF4-FFF2-40B4-BE49-F238E27FC236}">
+                <a16:creationId xmlns:a16="http://schemas.microsoft.com/office/drawing/2014/main" id="{F8922935-032B-4F30-879C-CFAB05EB075C}"/>
+              </a:ext>
+            </a:extLst>
+          </p:cNvPr>
+          <p:cNvSpPr/>
+          <p:nvPr/>
+        </p:nvSpPr>
+        <p:spPr>
+          <a:xfrm>
+            <a:off x="242888" y="485975"/>
+            <a:ext cx="1816717" cy="300934"/>
           </a:xfrm>
           <a:prstGeom prst="rect">
             <a:avLst/>
@@ -42439,6 +42229,66 @@
           <a:p>
             <a:pPr algn="ctr"/>
             <a:r>
+              <a:rPr lang="de-AT" sz="1400" dirty="0">
+                <a:latin typeface="Arial" panose="020B0604020202020204" pitchFamily="34" charset="0"/>
+                <a:cs typeface="Arial" panose="020B0604020202020204" pitchFamily="34" charset="0"/>
+              </a:rPr>
+              <a:t>Profile UML_DTDL</a:t>
+            </a:r>
+          </a:p>
+        </p:txBody>
+      </p:sp>
+      <p:sp>
+        <p:nvSpPr>
+          <p:cNvPr id="21" name="Rechteck 20">
+            <a:extLst>
+              <a:ext uri="{FF2B5EF4-FFF2-40B4-BE49-F238E27FC236}">
+                <a16:creationId xmlns:a16="http://schemas.microsoft.com/office/drawing/2014/main" id="{1B3B2550-EAAB-403B-8A4A-F5066B8B3DA8}"/>
+              </a:ext>
+            </a:extLst>
+          </p:cNvPr>
+          <p:cNvSpPr/>
+          <p:nvPr/>
+        </p:nvSpPr>
+        <p:spPr>
+          <a:xfrm>
+            <a:off x="5831738" y="958373"/>
+            <a:ext cx="2584941" cy="644699"/>
+          </a:xfrm>
+          <a:prstGeom prst="rect">
+            <a:avLst/>
+          </a:prstGeom>
+          <a:noFill/>
+          <a:ln w="9525" cap="flat" cmpd="sng" algn="ctr">
+            <a:solidFill>
+              <a:schemeClr val="dk1"/>
+            </a:solidFill>
+            <a:prstDash val="solid"/>
+            <a:round/>
+            <a:headEnd type="none" w="med" len="med"/>
+            <a:tailEnd type="arrow" w="med" len="med"/>
+          </a:ln>
+        </p:spPr>
+        <p:style>
+          <a:lnRef idx="0">
+            <a:scrgbClr r="0" g="0" b="0"/>
+          </a:lnRef>
+          <a:fillRef idx="0">
+            <a:scrgbClr r="0" g="0" b="0"/>
+          </a:fillRef>
+          <a:effectRef idx="0">
+            <a:scrgbClr r="0" g="0" b="0"/>
+          </a:effectRef>
+          <a:fontRef idx="minor">
+            <a:schemeClr val="dk1"/>
+          </a:fontRef>
+        </p:style>
+        <p:txBody>
+          <a:bodyPr rtlCol="0" anchor="ctr"/>
+          <a:lstStyle/>
+          <a:p>
+            <a:pPr algn="ctr"/>
+            <a:r>
               <a:rPr lang="de-DE" altLang="de-DE" sz="2000" dirty="0">
                 <a:cs typeface="Arial" charset="0"/>
               </a:rPr>
@@ -42466,7 +42316,7 @@
                 <a:latin typeface="Arial" panose="020B0604020202020204" pitchFamily="34" charset="0"/>
                 <a:cs typeface="Arial" panose="020B0604020202020204" pitchFamily="34" charset="0"/>
               </a:rPr>
-              <a:t>MeasuredProperty</a:t>
+              <a:t>DTAssociation</a:t>
             </a:r>
             <a:endParaRPr lang="de-AT" b="1" dirty="0">
               <a:latin typeface="Arial" panose="020B0604020202020204" pitchFamily="34" charset="0"/>
@@ -42475,27 +42325,622 @@
           </a:p>
         </p:txBody>
       </p:sp>
+      <p:sp>
+        <p:nvSpPr>
+          <p:cNvPr id="33" name="Rechteck 32">
+            <a:extLst>
+              <a:ext uri="{FF2B5EF4-FFF2-40B4-BE49-F238E27FC236}">
+                <a16:creationId xmlns:a16="http://schemas.microsoft.com/office/drawing/2014/main" id="{3ABFAB57-86B1-4F68-BC6E-3019FC391BA7}"/>
+              </a:ext>
+            </a:extLst>
+          </p:cNvPr>
+          <p:cNvSpPr/>
+          <p:nvPr/>
+        </p:nvSpPr>
+        <p:spPr>
+          <a:xfrm>
+            <a:off x="5831738" y="1602239"/>
+            <a:ext cx="2584942" cy="589697"/>
+          </a:xfrm>
+          <a:prstGeom prst="rect">
+            <a:avLst/>
+          </a:prstGeom>
+          <a:noFill/>
+          <a:ln w="9525" cap="flat" cmpd="sng" algn="ctr">
+            <a:solidFill>
+              <a:schemeClr val="dk1"/>
+            </a:solidFill>
+            <a:prstDash val="solid"/>
+            <a:round/>
+            <a:headEnd type="none" w="med" len="med"/>
+            <a:tailEnd type="arrow" w="med" len="med"/>
+          </a:ln>
+        </p:spPr>
+        <p:style>
+          <a:lnRef idx="0">
+            <a:scrgbClr r="0" g="0" b="0"/>
+          </a:lnRef>
+          <a:fillRef idx="0">
+            <a:scrgbClr r="0" g="0" b="0"/>
+          </a:fillRef>
+          <a:effectRef idx="0">
+            <a:scrgbClr r="0" g="0" b="0"/>
+          </a:effectRef>
+          <a:fontRef idx="minor">
+            <a:schemeClr val="dk1"/>
+          </a:fontRef>
+        </p:style>
+        <p:txBody>
+          <a:bodyPr rtlCol="0" anchor="ctr"/>
+          <a:lstStyle/>
+          <a:p>
+            <a:r>
+              <a:rPr lang="de-AT" dirty="0">
+                <a:latin typeface="Arial" panose="020B0604020202020204" pitchFamily="34" charset="0"/>
+                <a:cs typeface="Arial" panose="020B0604020202020204" pitchFamily="34" charset="0"/>
+              </a:rPr>
+              <a:t>Boolean </a:t>
+            </a:r>
+            <a:r>
+              <a:rPr lang="de-AT" dirty="0" err="1">
+                <a:latin typeface="Arial" panose="020B0604020202020204" pitchFamily="34" charset="0"/>
+                <a:cs typeface="Arial" panose="020B0604020202020204" pitchFamily="34" charset="0"/>
+              </a:rPr>
+              <a:t>isWritable</a:t>
+            </a:r>
+            <a:endParaRPr lang="de-AT" dirty="0">
+              <a:latin typeface="Arial" panose="020B0604020202020204" pitchFamily="34" charset="0"/>
+              <a:cs typeface="Arial" panose="020B0604020202020204" pitchFamily="34" charset="0"/>
+            </a:endParaRPr>
+          </a:p>
+          <a:p>
+            <a:r>
+              <a:rPr lang="de-AT" dirty="0">
+                <a:latin typeface="Arial" panose="020B0604020202020204" pitchFamily="34" charset="0"/>
+                <a:cs typeface="Arial" panose="020B0604020202020204" pitchFamily="34" charset="0"/>
+              </a:rPr>
+              <a:t>String </a:t>
+            </a:r>
+            <a:r>
+              <a:rPr lang="de-AT" dirty="0" err="1">
+                <a:latin typeface="Arial" panose="020B0604020202020204" pitchFamily="34" charset="0"/>
+                <a:cs typeface="Arial" panose="020B0604020202020204" pitchFamily="34" charset="0"/>
+              </a:rPr>
+              <a:t>relationshipType</a:t>
+            </a:r>
+            <a:endParaRPr lang="de-AT" dirty="0">
+              <a:latin typeface="Arial" panose="020B0604020202020204" pitchFamily="34" charset="0"/>
+              <a:cs typeface="Arial" panose="020B0604020202020204" pitchFamily="34" charset="0"/>
+            </a:endParaRPr>
+          </a:p>
+        </p:txBody>
+      </p:sp>
+      <p:sp>
+        <p:nvSpPr>
+          <p:cNvPr id="25" name="Rechteck 24">
+            <a:extLst>
+              <a:ext uri="{FF2B5EF4-FFF2-40B4-BE49-F238E27FC236}">
+                <a16:creationId xmlns:a16="http://schemas.microsoft.com/office/drawing/2014/main" id="{6AE40FD5-3090-4F5C-B8A8-8A58C0F8283B}"/>
+              </a:ext>
+            </a:extLst>
+          </p:cNvPr>
+          <p:cNvSpPr/>
+          <p:nvPr/>
+        </p:nvSpPr>
+        <p:spPr>
+          <a:xfrm>
+            <a:off x="8655153" y="1600659"/>
+            <a:ext cx="2701798" cy="1418353"/>
+          </a:xfrm>
+          <a:prstGeom prst="rect">
+            <a:avLst/>
+          </a:prstGeom>
+          <a:noFill/>
+          <a:ln w="9525" cap="flat" cmpd="sng" algn="ctr">
+            <a:solidFill>
+              <a:schemeClr val="dk1"/>
+            </a:solidFill>
+            <a:prstDash val="solid"/>
+            <a:round/>
+            <a:headEnd type="none" w="med" len="med"/>
+            <a:tailEnd type="arrow" w="med" len="med"/>
+          </a:ln>
+        </p:spPr>
+        <p:style>
+          <a:lnRef idx="0">
+            <a:scrgbClr r="0" g="0" b="0"/>
+          </a:lnRef>
+          <a:fillRef idx="0">
+            <a:scrgbClr r="0" g="0" b="0"/>
+          </a:fillRef>
+          <a:effectRef idx="0">
+            <a:scrgbClr r="0" g="0" b="0"/>
+          </a:effectRef>
+          <a:fontRef idx="minor">
+            <a:schemeClr val="dk1"/>
+          </a:fontRef>
+        </p:style>
+        <p:txBody>
+          <a:bodyPr rtlCol="0" anchor="ctr"/>
+          <a:lstStyle/>
+          <a:p>
+            <a:r>
+              <a:rPr lang="de-AT" dirty="0">
+                <a:latin typeface="Arial" panose="020B0604020202020204" pitchFamily="34" charset="0"/>
+                <a:cs typeface="Arial" panose="020B0604020202020204" pitchFamily="34" charset="0"/>
+              </a:rPr>
+              <a:t>Boolean </a:t>
+            </a:r>
+            <a:r>
+              <a:rPr lang="de-AT" dirty="0" err="1">
+                <a:latin typeface="Arial" panose="020B0604020202020204" pitchFamily="34" charset="0"/>
+                <a:cs typeface="Arial" panose="020B0604020202020204" pitchFamily="34" charset="0"/>
+              </a:rPr>
+              <a:t>isTimeSeries</a:t>
+            </a:r>
+            <a:endParaRPr lang="de-AT" dirty="0">
+              <a:latin typeface="Arial" panose="020B0604020202020204" pitchFamily="34" charset="0"/>
+              <a:cs typeface="Arial" panose="020B0604020202020204" pitchFamily="34" charset="0"/>
+            </a:endParaRPr>
+          </a:p>
+          <a:p>
+            <a:r>
+              <a:rPr lang="de-AT" dirty="0">
+                <a:latin typeface="Arial" panose="020B0604020202020204" pitchFamily="34" charset="0"/>
+                <a:cs typeface="Arial" panose="020B0604020202020204" pitchFamily="34" charset="0"/>
+              </a:rPr>
+              <a:t>Boolean </a:t>
+            </a:r>
+            <a:r>
+              <a:rPr lang="de-AT" dirty="0" err="1">
+                <a:latin typeface="Arial" panose="020B0604020202020204" pitchFamily="34" charset="0"/>
+                <a:cs typeface="Arial" panose="020B0604020202020204" pitchFamily="34" charset="0"/>
+              </a:rPr>
+              <a:t>isFault</a:t>
+            </a:r>
+            <a:endParaRPr lang="de-AT" dirty="0">
+              <a:latin typeface="Arial" panose="020B0604020202020204" pitchFamily="34" charset="0"/>
+              <a:cs typeface="Arial" panose="020B0604020202020204" pitchFamily="34" charset="0"/>
+            </a:endParaRPr>
+          </a:p>
+          <a:p>
+            <a:r>
+              <a:rPr lang="de-AT" dirty="0">
+                <a:latin typeface="Arial" panose="020B0604020202020204" pitchFamily="34" charset="0"/>
+                <a:cs typeface="Arial" panose="020B0604020202020204" pitchFamily="34" charset="0"/>
+              </a:rPr>
+              <a:t>Boolean </a:t>
+            </a:r>
+            <a:r>
+              <a:rPr lang="de-AT" dirty="0" err="1">
+                <a:latin typeface="Arial" panose="020B0604020202020204" pitchFamily="34" charset="0"/>
+                <a:cs typeface="Arial" panose="020B0604020202020204" pitchFamily="34" charset="0"/>
+              </a:rPr>
+              <a:t>isExternalId</a:t>
+            </a:r>
+            <a:endParaRPr lang="de-AT" dirty="0">
+              <a:latin typeface="Arial" panose="020B0604020202020204" pitchFamily="34" charset="0"/>
+              <a:cs typeface="Arial" panose="020B0604020202020204" pitchFamily="34" charset="0"/>
+            </a:endParaRPr>
+          </a:p>
+          <a:p>
+            <a:r>
+              <a:rPr lang="de-AT" dirty="0">
+                <a:latin typeface="Arial" panose="020B0604020202020204" pitchFamily="34" charset="0"/>
+                <a:cs typeface="Arial" panose="020B0604020202020204" pitchFamily="34" charset="0"/>
+              </a:rPr>
+              <a:t>Boolean </a:t>
+            </a:r>
+            <a:r>
+              <a:rPr lang="de-AT" dirty="0" err="1">
+                <a:latin typeface="Arial" panose="020B0604020202020204" pitchFamily="34" charset="0"/>
+                <a:cs typeface="Arial" panose="020B0604020202020204" pitchFamily="34" charset="0"/>
+              </a:rPr>
+              <a:t>isStoredLocally</a:t>
+            </a:r>
+            <a:endParaRPr lang="de-AT" dirty="0">
+              <a:latin typeface="Arial" panose="020B0604020202020204" pitchFamily="34" charset="0"/>
+              <a:cs typeface="Arial" panose="020B0604020202020204" pitchFamily="34" charset="0"/>
+            </a:endParaRPr>
+          </a:p>
+          <a:p>
+            <a:r>
+              <a:rPr lang="de-AT" dirty="0">
+                <a:latin typeface="Arial" panose="020B0604020202020204" pitchFamily="34" charset="0"/>
+                <a:cs typeface="Arial" panose="020B0604020202020204" pitchFamily="34" charset="0"/>
+              </a:rPr>
+              <a:t>String </a:t>
+            </a:r>
+            <a:r>
+              <a:rPr lang="de-AT" dirty="0" err="1">
+                <a:latin typeface="Arial" panose="020B0604020202020204" pitchFamily="34" charset="0"/>
+                <a:cs typeface="Arial" panose="020B0604020202020204" pitchFamily="34" charset="0"/>
+              </a:rPr>
+              <a:t>MeasurementUnit</a:t>
+            </a:r>
+            <a:endParaRPr lang="de-AT" dirty="0">
+              <a:latin typeface="Arial" panose="020B0604020202020204" pitchFamily="34" charset="0"/>
+              <a:cs typeface="Arial" panose="020B0604020202020204" pitchFamily="34" charset="0"/>
+            </a:endParaRPr>
+          </a:p>
+        </p:txBody>
+      </p:sp>
+      <p:sp>
+        <p:nvSpPr>
+          <p:cNvPr id="26" name="Rechteck 25">
+            <a:extLst>
+              <a:ext uri="{FF2B5EF4-FFF2-40B4-BE49-F238E27FC236}">
+                <a16:creationId xmlns:a16="http://schemas.microsoft.com/office/drawing/2014/main" id="{E42C25DF-7A77-4B2A-8DCC-7B349B23F1B2}"/>
+              </a:ext>
+            </a:extLst>
+          </p:cNvPr>
+          <p:cNvSpPr/>
+          <p:nvPr/>
+        </p:nvSpPr>
+        <p:spPr>
+          <a:xfrm>
+            <a:off x="2910687" y="954992"/>
+            <a:ext cx="2701797" cy="644699"/>
+          </a:xfrm>
+          <a:prstGeom prst="rect">
+            <a:avLst/>
+          </a:prstGeom>
+          <a:noFill/>
+          <a:ln w="9525" cap="flat" cmpd="sng" algn="ctr">
+            <a:solidFill>
+              <a:schemeClr val="dk1"/>
+            </a:solidFill>
+            <a:prstDash val="solid"/>
+            <a:round/>
+            <a:headEnd type="none" w="med" len="med"/>
+            <a:tailEnd type="arrow" w="med" len="med"/>
+          </a:ln>
+        </p:spPr>
+        <p:style>
+          <a:lnRef idx="0">
+            <a:scrgbClr r="0" g="0" b="0"/>
+          </a:lnRef>
+          <a:fillRef idx="0">
+            <a:scrgbClr r="0" g="0" b="0"/>
+          </a:fillRef>
+          <a:effectRef idx="0">
+            <a:scrgbClr r="0" g="0" b="0"/>
+          </a:effectRef>
+          <a:fontRef idx="minor">
+            <a:schemeClr val="dk1"/>
+          </a:fontRef>
+        </p:style>
+        <p:txBody>
+          <a:bodyPr rtlCol="0" anchor="ctr"/>
+          <a:lstStyle/>
+          <a:p>
+            <a:pPr algn="ctr"/>
+            <a:r>
+              <a:rPr lang="de-DE" altLang="de-DE" sz="2000" dirty="0">
+                <a:cs typeface="Arial" charset="0"/>
+              </a:rPr>
+              <a:t>«</a:t>
+            </a:r>
+            <a:r>
+              <a:rPr lang="de-DE" altLang="de-DE" sz="1800" dirty="0">
+                <a:cs typeface="Arial" charset="0"/>
+              </a:rPr>
+              <a:t>Stereotype»</a:t>
+            </a:r>
+            <a:r>
+              <a:rPr lang="de-DE" altLang="de-DE" sz="1800" i="1" dirty="0"/>
+              <a:t> </a:t>
+            </a:r>
+            <a:endParaRPr lang="de-AT" b="1" dirty="0">
+              <a:latin typeface="Arial" panose="020B0604020202020204" pitchFamily="34" charset="0"/>
+              <a:cs typeface="Arial" panose="020B0604020202020204" pitchFamily="34" charset="0"/>
+            </a:endParaRPr>
+          </a:p>
+          <a:p>
+            <a:pPr algn="ctr"/>
+            <a:r>
+              <a:rPr lang="de-AT" b="1" dirty="0" err="1">
+                <a:latin typeface="Arial" panose="020B0604020202020204" pitchFamily="34" charset="0"/>
+                <a:cs typeface="Arial" panose="020B0604020202020204" pitchFamily="34" charset="0"/>
+              </a:rPr>
+              <a:t>DTOperation</a:t>
+            </a:r>
+            <a:endParaRPr lang="de-AT" b="1" dirty="0">
+              <a:latin typeface="Arial" panose="020B0604020202020204" pitchFamily="34" charset="0"/>
+              <a:cs typeface="Arial" panose="020B0604020202020204" pitchFamily="34" charset="0"/>
+            </a:endParaRPr>
+          </a:p>
+        </p:txBody>
+      </p:sp>
+      <p:sp>
+        <p:nvSpPr>
+          <p:cNvPr id="28" name="Rechteck 27">
+            <a:extLst>
+              <a:ext uri="{FF2B5EF4-FFF2-40B4-BE49-F238E27FC236}">
+                <a16:creationId xmlns:a16="http://schemas.microsoft.com/office/drawing/2014/main" id="{38FE63FB-BD5D-4B3C-8B5A-82B852EBB170}"/>
+              </a:ext>
+            </a:extLst>
+          </p:cNvPr>
+          <p:cNvSpPr/>
+          <p:nvPr/>
+        </p:nvSpPr>
+        <p:spPr>
+          <a:xfrm>
+            <a:off x="2910687" y="1598855"/>
+            <a:ext cx="2701798" cy="589697"/>
+          </a:xfrm>
+          <a:prstGeom prst="rect">
+            <a:avLst/>
+          </a:prstGeom>
+          <a:noFill/>
+          <a:ln w="9525" cap="flat" cmpd="sng" algn="ctr">
+            <a:solidFill>
+              <a:schemeClr val="dk1"/>
+            </a:solidFill>
+            <a:prstDash val="solid"/>
+            <a:round/>
+            <a:headEnd type="none" w="med" len="med"/>
+            <a:tailEnd type="arrow" w="med" len="med"/>
+          </a:ln>
+        </p:spPr>
+        <p:style>
+          <a:lnRef idx="0">
+            <a:scrgbClr r="0" g="0" b="0"/>
+          </a:lnRef>
+          <a:fillRef idx="0">
+            <a:scrgbClr r="0" g="0" b="0"/>
+          </a:fillRef>
+          <a:effectRef idx="0">
+            <a:scrgbClr r="0" g="0" b="0"/>
+          </a:effectRef>
+          <a:fontRef idx="minor">
+            <a:schemeClr val="dk1"/>
+          </a:fontRef>
+        </p:style>
+        <p:txBody>
+          <a:bodyPr rtlCol="0" anchor="ctr"/>
+          <a:lstStyle/>
+          <a:p>
+            <a:r>
+              <a:rPr lang="de-AT" dirty="0">
+                <a:latin typeface="Arial" panose="020B0604020202020204" pitchFamily="34" charset="0"/>
+                <a:cs typeface="Arial" panose="020B0604020202020204" pitchFamily="34" charset="0"/>
+              </a:rPr>
+              <a:t>String </a:t>
+            </a:r>
+            <a:r>
+              <a:rPr lang="de-AT" dirty="0" err="1">
+                <a:latin typeface="Arial" panose="020B0604020202020204" pitchFamily="34" charset="0"/>
+                <a:cs typeface="Arial" panose="020B0604020202020204" pitchFamily="34" charset="0"/>
+              </a:rPr>
+              <a:t>isImplementedBy</a:t>
+            </a:r>
+            <a:endParaRPr lang="de-AT" dirty="0">
+              <a:latin typeface="Arial" panose="020B0604020202020204" pitchFamily="34" charset="0"/>
+              <a:cs typeface="Arial" panose="020B0604020202020204" pitchFamily="34" charset="0"/>
+            </a:endParaRPr>
+          </a:p>
+          <a:p>
+            <a:r>
+              <a:rPr lang="de-AT" dirty="0">
+                <a:latin typeface="Arial" panose="020B0604020202020204" pitchFamily="34" charset="0"/>
+                <a:cs typeface="Arial" panose="020B0604020202020204" pitchFamily="34" charset="0"/>
+              </a:rPr>
+              <a:t>Boolean </a:t>
+            </a:r>
+            <a:r>
+              <a:rPr lang="de-AT" dirty="0" err="1">
+                <a:latin typeface="Arial" panose="020B0604020202020204" pitchFamily="34" charset="0"/>
+                <a:cs typeface="Arial" panose="020B0604020202020204" pitchFamily="34" charset="0"/>
+              </a:rPr>
+              <a:t>isBreakable</a:t>
+            </a:r>
+            <a:endParaRPr lang="de-AT" dirty="0">
+              <a:latin typeface="Arial" panose="020B0604020202020204" pitchFamily="34" charset="0"/>
+              <a:cs typeface="Arial" panose="020B0604020202020204" pitchFamily="34" charset="0"/>
+            </a:endParaRPr>
+          </a:p>
+        </p:txBody>
+      </p:sp>
+      <p:sp>
+        <p:nvSpPr>
+          <p:cNvPr id="29" name="Rechteck 28">
+            <a:extLst>
+              <a:ext uri="{FF2B5EF4-FFF2-40B4-BE49-F238E27FC236}">
+                <a16:creationId xmlns:a16="http://schemas.microsoft.com/office/drawing/2014/main" id="{8D204DCC-A2E4-4C03-A1CD-10DAE727E417}"/>
+              </a:ext>
+            </a:extLst>
+          </p:cNvPr>
+          <p:cNvSpPr/>
+          <p:nvPr/>
+        </p:nvSpPr>
+        <p:spPr>
+          <a:xfrm>
+            <a:off x="394432" y="958373"/>
+            <a:ext cx="2334015" cy="644699"/>
+          </a:xfrm>
+          <a:prstGeom prst="rect">
+            <a:avLst/>
+          </a:prstGeom>
+          <a:noFill/>
+          <a:ln w="9525" cap="flat" cmpd="sng" algn="ctr">
+            <a:solidFill>
+              <a:schemeClr val="dk1"/>
+            </a:solidFill>
+            <a:prstDash val="solid"/>
+            <a:round/>
+            <a:headEnd type="none" w="med" len="med"/>
+            <a:tailEnd type="arrow" w="med" len="med"/>
+          </a:ln>
+        </p:spPr>
+        <p:style>
+          <a:lnRef idx="0">
+            <a:scrgbClr r="0" g="0" b="0"/>
+          </a:lnRef>
+          <a:fillRef idx="0">
+            <a:scrgbClr r="0" g="0" b="0"/>
+          </a:fillRef>
+          <a:effectRef idx="0">
+            <a:scrgbClr r="0" g="0" b="0"/>
+          </a:effectRef>
+          <a:fontRef idx="minor">
+            <a:schemeClr val="dk1"/>
+          </a:fontRef>
+        </p:style>
+        <p:txBody>
+          <a:bodyPr rtlCol="0" anchor="ctr"/>
+          <a:lstStyle/>
+          <a:p>
+            <a:pPr algn="ctr"/>
+            <a:r>
+              <a:rPr lang="de-DE" altLang="de-DE" sz="2000" dirty="0">
+                <a:cs typeface="Arial" charset="0"/>
+              </a:rPr>
+              <a:t>«</a:t>
+            </a:r>
+            <a:r>
+              <a:rPr lang="de-DE" altLang="de-DE" sz="1800" dirty="0">
+                <a:cs typeface="Arial" charset="0"/>
+              </a:rPr>
+              <a:t>Stereotype»</a:t>
+            </a:r>
+            <a:r>
+              <a:rPr lang="de-DE" altLang="de-DE" sz="1800" i="1" dirty="0"/>
+              <a:t> </a:t>
+            </a:r>
+            <a:endParaRPr lang="de-AT" b="1" dirty="0">
+              <a:latin typeface="Arial" panose="020B0604020202020204" pitchFamily="34" charset="0"/>
+              <a:cs typeface="Arial" panose="020B0604020202020204" pitchFamily="34" charset="0"/>
+            </a:endParaRPr>
+          </a:p>
+          <a:p>
+            <a:pPr algn="ctr"/>
+            <a:r>
+              <a:rPr lang="de-AT" b="1" dirty="0" err="1">
+                <a:latin typeface="Arial" panose="020B0604020202020204" pitchFamily="34" charset="0"/>
+                <a:cs typeface="Arial" panose="020B0604020202020204" pitchFamily="34" charset="0"/>
+              </a:rPr>
+              <a:t>DTClass</a:t>
+            </a:r>
+            <a:endParaRPr lang="de-AT" b="1" dirty="0">
+              <a:latin typeface="Arial" panose="020B0604020202020204" pitchFamily="34" charset="0"/>
+              <a:cs typeface="Arial" panose="020B0604020202020204" pitchFamily="34" charset="0"/>
+            </a:endParaRPr>
+          </a:p>
+        </p:txBody>
+      </p:sp>
+      <p:sp>
+        <p:nvSpPr>
+          <p:cNvPr id="30" name="Rechteck 29">
+            <a:extLst>
+              <a:ext uri="{FF2B5EF4-FFF2-40B4-BE49-F238E27FC236}">
+                <a16:creationId xmlns:a16="http://schemas.microsoft.com/office/drawing/2014/main" id="{3D856E09-07D7-49AE-BF5C-04DC70AF49F2}"/>
+              </a:ext>
+            </a:extLst>
+          </p:cNvPr>
+          <p:cNvSpPr/>
+          <p:nvPr/>
+        </p:nvSpPr>
+        <p:spPr>
+          <a:xfrm>
+            <a:off x="394432" y="1602236"/>
+            <a:ext cx="2334016" cy="589697"/>
+          </a:xfrm>
+          <a:prstGeom prst="rect">
+            <a:avLst/>
+          </a:prstGeom>
+          <a:noFill/>
+          <a:ln w="9525" cap="flat" cmpd="sng" algn="ctr">
+            <a:solidFill>
+              <a:schemeClr val="dk1"/>
+            </a:solidFill>
+            <a:prstDash val="solid"/>
+            <a:round/>
+            <a:headEnd type="none" w="med" len="med"/>
+            <a:tailEnd type="arrow" w="med" len="med"/>
+          </a:ln>
+        </p:spPr>
+        <p:style>
+          <a:lnRef idx="0">
+            <a:scrgbClr r="0" g="0" b="0"/>
+          </a:lnRef>
+          <a:fillRef idx="0">
+            <a:scrgbClr r="0" g="0" b="0"/>
+          </a:fillRef>
+          <a:effectRef idx="0">
+            <a:scrgbClr r="0" g="0" b="0"/>
+          </a:effectRef>
+          <a:fontRef idx="minor">
+            <a:schemeClr val="dk1"/>
+          </a:fontRef>
+        </p:style>
+        <p:txBody>
+          <a:bodyPr rtlCol="0" anchor="ctr"/>
+          <a:lstStyle/>
+          <a:p>
+            <a:r>
+              <a:rPr lang="de-AT" dirty="0">
+                <a:latin typeface="Arial" panose="020B0604020202020204" pitchFamily="34" charset="0"/>
+                <a:cs typeface="Arial" panose="020B0604020202020204" pitchFamily="34" charset="0"/>
+              </a:rPr>
+              <a:t>String </a:t>
+            </a:r>
+            <a:r>
+              <a:rPr lang="de-AT" dirty="0" err="1">
+                <a:latin typeface="Arial" panose="020B0604020202020204" pitchFamily="34" charset="0"/>
+                <a:cs typeface="Arial" panose="020B0604020202020204" pitchFamily="34" charset="0"/>
+              </a:rPr>
+              <a:t>category</a:t>
+            </a:r>
+            <a:endParaRPr lang="de-AT" dirty="0">
+              <a:latin typeface="Arial" panose="020B0604020202020204" pitchFamily="34" charset="0"/>
+              <a:cs typeface="Arial" panose="020B0604020202020204" pitchFamily="34" charset="0"/>
+            </a:endParaRPr>
+          </a:p>
+          <a:p>
+            <a:r>
+              <a:rPr lang="de-AT" dirty="0">
+                <a:latin typeface="Arial" panose="020B0604020202020204" pitchFamily="34" charset="0"/>
+                <a:cs typeface="Arial" panose="020B0604020202020204" pitchFamily="34" charset="0"/>
+              </a:rPr>
+              <a:t>Boolean </a:t>
+            </a:r>
+            <a:r>
+              <a:rPr lang="de-AT" dirty="0" err="1">
+                <a:latin typeface="Arial" panose="020B0604020202020204" pitchFamily="34" charset="0"/>
+                <a:cs typeface="Arial" panose="020B0604020202020204" pitchFamily="34" charset="0"/>
+              </a:rPr>
+              <a:t>isSingleton</a:t>
+            </a:r>
+            <a:endParaRPr lang="de-AT" dirty="0">
+              <a:latin typeface="Arial" panose="020B0604020202020204" pitchFamily="34" charset="0"/>
+              <a:cs typeface="Arial" panose="020B0604020202020204" pitchFamily="34" charset="0"/>
+            </a:endParaRPr>
+          </a:p>
+        </p:txBody>
+      </p:sp>
       <p:cxnSp>
         <p:nvCxnSpPr>
-          <p:cNvPr id="22" name="Gerade Verbindung mit Pfeil 21">
-            <a:extLst>
-              <a:ext uri="{FF2B5EF4-FFF2-40B4-BE49-F238E27FC236}">
-                <a16:creationId xmlns:a16="http://schemas.microsoft.com/office/drawing/2014/main" id="{555955C4-F14B-4E72-A38E-F2DBF957E37C}"/>
+          <p:cNvPr id="13" name="Verbinder: gewinkelt 12">
+            <a:extLst>
+              <a:ext uri="{FF2B5EF4-FFF2-40B4-BE49-F238E27FC236}">
+                <a16:creationId xmlns:a16="http://schemas.microsoft.com/office/drawing/2014/main" id="{00A64312-8B09-41F5-AFB2-124A81B7948C}"/>
               </a:ext>
             </a:extLst>
           </p:cNvPr>
           <p:cNvCxnSpPr>
             <a:cxnSpLocks/>
-            <a:endCxn id="16" idx="3"/>
+            <a:stCxn id="7" idx="3"/>
+            <a:endCxn id="16" idx="2"/>
           </p:cNvCxnSpPr>
           <p:nvPr/>
         </p:nvCxnSpPr>
         <p:spPr>
-          <a:xfrm flipH="1">
-            <a:off x="9015112" y="4855572"/>
-            <a:ext cx="847756" cy="0"/>
-          </a:xfrm>
-          <a:prstGeom prst="straightConnector1">
+          <a:xfrm flipV="1">
+            <a:off x="7681442" y="4212255"/>
+            <a:ext cx="2320022" cy="1853585"/>
+          </a:xfrm>
+          <a:prstGeom prst="bentConnector2">
             <a:avLst/>
           </a:prstGeom>
           <a:ln w="38100">
@@ -42522,23 +42967,24 @@
       </p:cxnSp>
       <p:cxnSp>
         <p:nvCxnSpPr>
-          <p:cNvPr id="24" name="Gerade Verbindung mit Pfeil 23">
-            <a:extLst>
-              <a:ext uri="{FF2B5EF4-FFF2-40B4-BE49-F238E27FC236}">
-                <a16:creationId xmlns:a16="http://schemas.microsoft.com/office/drawing/2014/main" id="{1576544A-D7B2-4521-AE34-CC87CE2D4B4C}"/>
+          <p:cNvPr id="60" name="Gerade Verbindung mit Pfeil 59">
+            <a:extLst>
+              <a:ext uri="{FF2B5EF4-FFF2-40B4-BE49-F238E27FC236}">
+                <a16:creationId xmlns:a16="http://schemas.microsoft.com/office/drawing/2014/main" id="{70250643-C63F-4662-BDBC-60CF1CF39766}"/>
               </a:ext>
             </a:extLst>
           </p:cNvPr>
           <p:cNvCxnSpPr>
             <a:cxnSpLocks/>
-            <a:stCxn id="9" idx="2"/>
+            <a:stCxn id="6" idx="0"/>
+            <a:endCxn id="17" idx="2"/>
           </p:cNvCxnSpPr>
           <p:nvPr/>
         </p:nvCxnSpPr>
         <p:spPr>
-          <a:xfrm>
-            <a:off x="9846578" y="2709016"/>
-            <a:ext cx="13702" cy="2144924"/>
+          <a:xfrm flipV="1">
+            <a:off x="5947502" y="4232249"/>
+            <a:ext cx="1176706" cy="468907"/>
           </a:xfrm>
           <a:prstGeom prst="straightConnector1">
             <a:avLst/>
@@ -42547,8 +42993,7 @@
             <a:solidFill>
               <a:schemeClr val="tx1"/>
             </a:solidFill>
-            <a:headEnd type="none" w="med" len="med"/>
-            <a:tailEnd type="none" w="med" len="med"/>
+            <a:tailEnd type="triangle"/>
           </a:ln>
         </p:spPr>
         <p:style>
@@ -42566,76 +43011,52 @@
           </a:fontRef>
         </p:style>
       </p:cxnSp>
-      <p:sp>
-        <p:nvSpPr>
-          <p:cNvPr id="33" name="Rechteck 32">
-            <a:extLst>
-              <a:ext uri="{FF2B5EF4-FFF2-40B4-BE49-F238E27FC236}">
-                <a16:creationId xmlns:a16="http://schemas.microsoft.com/office/drawing/2014/main" id="{3ABFAB57-86B1-4F68-BC6E-3019FC391BA7}"/>
-              </a:ext>
-            </a:extLst>
-          </p:cNvPr>
-          <p:cNvSpPr/>
-          <p:nvPr/>
-        </p:nvSpPr>
-        <p:spPr>
-          <a:xfrm>
-            <a:off x="6100464" y="2707447"/>
-            <a:ext cx="2369341" cy="356436"/>
-          </a:xfrm>
-          <a:prstGeom prst="rect">
+      <p:cxnSp>
+        <p:nvCxnSpPr>
+          <p:cNvPr id="63" name="Verbinder: gewinkelt 62">
+            <a:extLst>
+              <a:ext uri="{FF2B5EF4-FFF2-40B4-BE49-F238E27FC236}">
+                <a16:creationId xmlns:a16="http://schemas.microsoft.com/office/drawing/2014/main" id="{FF6146FF-E126-4379-B143-064FDF5C353D}"/>
+              </a:ext>
+            </a:extLst>
+          </p:cNvPr>
+          <p:cNvCxnSpPr>
+            <a:cxnSpLocks/>
+            <a:stCxn id="7" idx="1"/>
+            <a:endCxn id="14" idx="2"/>
+          </p:cNvCxnSpPr>
+          <p:nvPr/>
+        </p:nvCxnSpPr>
+        <p:spPr>
+          <a:xfrm rot="10800000">
+            <a:off x="1561438" y="4232250"/>
+            <a:ext cx="2652124" cy="1833591"/>
+          </a:xfrm>
+          <a:prstGeom prst="bentConnector2">
             <a:avLst/>
           </a:prstGeom>
-          <a:noFill/>
-          <a:ln w="9525" cap="flat" cmpd="sng" algn="ctr">
+          <a:ln w="38100">
             <a:solidFill>
-              <a:schemeClr val="dk1"/>
+              <a:schemeClr val="tx1"/>
             </a:solidFill>
-            <a:prstDash val="solid"/>
-            <a:round/>
-            <a:headEnd type="none" w="med" len="med"/>
-            <a:tailEnd type="arrow" w="med" len="med"/>
+            <a:tailEnd type="triangle"/>
           </a:ln>
         </p:spPr>
         <p:style>
-          <a:lnRef idx="0">
-            <a:scrgbClr r="0" g="0" b="0"/>
+          <a:lnRef idx="1">
+            <a:schemeClr val="accent1"/>
           </a:lnRef>
           <a:fillRef idx="0">
-            <a:scrgbClr r="0" g="0" b="0"/>
+            <a:schemeClr val="accent1"/>
           </a:fillRef>
           <a:effectRef idx="0">
-            <a:scrgbClr r="0" g="0" b="0"/>
+            <a:schemeClr val="accent1"/>
           </a:effectRef>
           <a:fontRef idx="minor">
-            <a:schemeClr val="dk1"/>
+            <a:schemeClr val="tx1"/>
           </a:fontRef>
         </p:style>
-        <p:txBody>
-          <a:bodyPr rtlCol="0" anchor="ctr"/>
-          <a:lstStyle/>
-          <a:p>
-            <a:r>
-              <a:rPr lang="de-AT" dirty="0">
-                <a:latin typeface="Arial" panose="020B0604020202020204" pitchFamily="34" charset="0"/>
-                <a:cs typeface="Arial" panose="020B0604020202020204" pitchFamily="34" charset="0"/>
-              </a:rPr>
-              <a:t>String </a:t>
-            </a:r>
-            <a:r>
-              <a:rPr lang="de-AT" dirty="0" err="1">
-                <a:latin typeface="Arial" panose="020B0604020202020204" pitchFamily="34" charset="0"/>
-                <a:cs typeface="Arial" panose="020B0604020202020204" pitchFamily="34" charset="0"/>
-              </a:rPr>
-              <a:t>unit</a:t>
-            </a:r>
-            <a:endParaRPr lang="de-AT" dirty="0">
-              <a:latin typeface="Arial" panose="020B0604020202020204" pitchFamily="34" charset="0"/>
-              <a:cs typeface="Arial" panose="020B0604020202020204" pitchFamily="34" charset="0"/>
-            </a:endParaRPr>
-          </a:p>
-        </p:txBody>
-      </p:sp>
+      </p:cxnSp>
     </p:spTree>
     <p:extLst>
       <p:ext uri="{BB962C8B-B14F-4D97-AF65-F5344CB8AC3E}">

</xml_diff>

<commit_message>
added cardinalities to aws and dtdl metamodel
</commit_message>
<xml_diff>
--- a/Figures.pptx
+++ b/Figures.pptx
@@ -225,7 +225,7 @@
           <a:p>
             <a:fld id="{81844386-878F-4A39-854F-4F47558F0F3E}" type="datetimeFigureOut">
               <a:rPr lang="de-AT" smtClean="0"/>
-              <a:t>28.02.2022</a:t>
+              <a:t>10.05.2022</a:t>
             </a:fld>
             <a:endParaRPr lang="de-AT"/>
           </a:p>
@@ -1182,7 +1182,7 @@
           <a:p>
             <a:fld id="{221DF790-08EF-4309-8C7D-573F11C98FD5}" type="datetimeFigureOut">
               <a:rPr lang="de-AT" smtClean="0"/>
-              <a:t>28.02.2022</a:t>
+              <a:t>10.05.2022</a:t>
             </a:fld>
             <a:endParaRPr lang="de-AT"/>
           </a:p>
@@ -1382,7 +1382,7 @@
           <a:p>
             <a:fld id="{221DF790-08EF-4309-8C7D-573F11C98FD5}" type="datetimeFigureOut">
               <a:rPr lang="de-AT" smtClean="0"/>
-              <a:t>28.02.2022</a:t>
+              <a:t>10.05.2022</a:t>
             </a:fld>
             <a:endParaRPr lang="de-AT"/>
           </a:p>
@@ -1592,7 +1592,7 @@
           <a:p>
             <a:fld id="{221DF790-08EF-4309-8C7D-573F11C98FD5}" type="datetimeFigureOut">
               <a:rPr lang="de-AT" smtClean="0"/>
-              <a:t>28.02.2022</a:t>
+              <a:t>10.05.2022</a:t>
             </a:fld>
             <a:endParaRPr lang="de-AT"/>
           </a:p>
@@ -1792,7 +1792,7 @@
           <a:p>
             <a:fld id="{221DF790-08EF-4309-8C7D-573F11C98FD5}" type="datetimeFigureOut">
               <a:rPr lang="de-AT" smtClean="0"/>
-              <a:t>28.02.2022</a:t>
+              <a:t>10.05.2022</a:t>
             </a:fld>
             <a:endParaRPr lang="de-AT"/>
           </a:p>
@@ -2068,7 +2068,7 @@
           <a:p>
             <a:fld id="{221DF790-08EF-4309-8C7D-573F11C98FD5}" type="datetimeFigureOut">
               <a:rPr lang="de-AT" smtClean="0"/>
-              <a:t>28.02.2022</a:t>
+              <a:t>10.05.2022</a:t>
             </a:fld>
             <a:endParaRPr lang="de-AT"/>
           </a:p>
@@ -2336,7 +2336,7 @@
           <a:p>
             <a:fld id="{221DF790-08EF-4309-8C7D-573F11C98FD5}" type="datetimeFigureOut">
               <a:rPr lang="de-AT" smtClean="0"/>
-              <a:t>28.02.2022</a:t>
+              <a:t>10.05.2022</a:t>
             </a:fld>
             <a:endParaRPr lang="de-AT"/>
           </a:p>
@@ -2751,7 +2751,7 @@
           <a:p>
             <a:fld id="{221DF790-08EF-4309-8C7D-573F11C98FD5}" type="datetimeFigureOut">
               <a:rPr lang="de-AT" smtClean="0"/>
-              <a:t>28.02.2022</a:t>
+              <a:t>10.05.2022</a:t>
             </a:fld>
             <a:endParaRPr lang="de-AT"/>
           </a:p>
@@ -2893,7 +2893,7 @@
           <a:p>
             <a:fld id="{221DF790-08EF-4309-8C7D-573F11C98FD5}" type="datetimeFigureOut">
               <a:rPr lang="de-AT" smtClean="0"/>
-              <a:t>28.02.2022</a:t>
+              <a:t>10.05.2022</a:t>
             </a:fld>
             <a:endParaRPr lang="de-AT"/>
           </a:p>
@@ -3006,7 +3006,7 @@
           <a:p>
             <a:fld id="{221DF790-08EF-4309-8C7D-573F11C98FD5}" type="datetimeFigureOut">
               <a:rPr lang="de-AT" smtClean="0"/>
-              <a:t>28.02.2022</a:t>
+              <a:t>10.05.2022</a:t>
             </a:fld>
             <a:endParaRPr lang="de-AT"/>
           </a:p>
@@ -3319,7 +3319,7 @@
           <a:p>
             <a:fld id="{221DF790-08EF-4309-8C7D-573F11C98FD5}" type="datetimeFigureOut">
               <a:rPr lang="de-AT" smtClean="0"/>
-              <a:t>28.02.2022</a:t>
+              <a:t>10.05.2022</a:t>
             </a:fld>
             <a:endParaRPr lang="de-AT"/>
           </a:p>
@@ -3608,7 +3608,7 @@
           <a:p>
             <a:fld id="{221DF790-08EF-4309-8C7D-573F11C98FD5}" type="datetimeFigureOut">
               <a:rPr lang="de-AT" smtClean="0"/>
-              <a:t>28.02.2022</a:t>
+              <a:t>10.05.2022</a:t>
             </a:fld>
             <a:endParaRPr lang="de-AT"/>
           </a:p>
@@ -3851,7 +3851,7 @@
           <a:p>
             <a:fld id="{221DF790-08EF-4309-8C7D-573F11C98FD5}" type="datetimeFigureOut">
               <a:rPr lang="de-AT" smtClean="0"/>
-              <a:t>28.02.2022</a:t>
+              <a:t>10.05.2022</a:t>
             </a:fld>
             <a:endParaRPr lang="de-AT"/>
           </a:p>
@@ -4602,7 +4602,7 @@
                   <a:cs typeface="Arial"/>
                   <a:sym typeface="Arial"/>
                 </a:rPr>
-                <a:t> name</a:t>
+                <a:t> name [1]</a:t>
               </a:r>
               <a:endParaRPr sz="2000" b="0" i="0" u="none" strike="noStrike" cap="none" dirty="0">
                 <a:solidFill>
@@ -4668,6 +4668,18 @@
                 </a:rPr>
                 <a:t>isExternalId</a:t>
               </a:r>
+              <a:r>
+                <a:rPr lang="en-US" sz="1600" b="0" i="0" u="none" strike="noStrike" cap="none" dirty="0">
+                  <a:solidFill>
+                    <a:schemeClr val="dk1"/>
+                  </a:solidFill>
+                  <a:latin typeface="Arial"/>
+                  <a:ea typeface="Arial"/>
+                  <a:cs typeface="Arial"/>
+                  <a:sym typeface="Arial"/>
+                </a:rPr>
+                <a:t> [0..1]</a:t>
+              </a:r>
               <a:endParaRPr sz="1600" b="0" i="0" u="none" strike="noStrike" cap="none" dirty="0">
                 <a:solidFill>
                   <a:schemeClr val="dk1"/>
@@ -4731,6 +4743,18 @@
                   <a:sym typeface="Arial"/>
                 </a:rPr>
                 <a:t>isStoredExternally</a:t>
+              </a:r>
+              <a:r>
+                <a:rPr lang="en-US" sz="1600" b="0" i="0" u="none" strike="noStrike" cap="none" dirty="0">
+                  <a:solidFill>
+                    <a:schemeClr val="dk1"/>
+                  </a:solidFill>
+                  <a:latin typeface="Arial"/>
+                  <a:ea typeface="Arial"/>
+                  <a:cs typeface="Arial"/>
+                  <a:sym typeface="Arial"/>
+                </a:rPr>
+                <a:t> [0..1]</a:t>
               </a:r>
               <a:endParaRPr sz="1600" b="0" i="0" u="none" strike="noStrike" cap="none" dirty="0">
                 <a:solidFill>
@@ -4796,6 +4820,18 @@
                 </a:rPr>
                 <a:t>isTimeSeries</a:t>
               </a:r>
+              <a:r>
+                <a:rPr lang="en-US" sz="1600" b="0" i="0" u="none" strike="noStrike" cap="none" dirty="0">
+                  <a:solidFill>
+                    <a:schemeClr val="dk1"/>
+                  </a:solidFill>
+                  <a:latin typeface="Arial"/>
+                  <a:ea typeface="Arial"/>
+                  <a:cs typeface="Arial"/>
+                  <a:sym typeface="Arial"/>
+                </a:rPr>
+                <a:t> [0..1]</a:t>
+              </a:r>
               <a:endParaRPr sz="1600" b="0" i="0" u="none" strike="noStrike" cap="none" dirty="0">
                 <a:solidFill>
                   <a:schemeClr val="dk1"/>
@@ -4860,6 +4896,18 @@
                 </a:rPr>
                 <a:t>isRequiredInEntity</a:t>
               </a:r>
+              <a:r>
+                <a:rPr lang="en-US" sz="1600" b="0" i="0" u="none" strike="noStrike" cap="none" dirty="0">
+                  <a:solidFill>
+                    <a:schemeClr val="dk1"/>
+                  </a:solidFill>
+                  <a:latin typeface="Arial"/>
+                  <a:ea typeface="Arial"/>
+                  <a:cs typeface="Arial"/>
+                  <a:sym typeface="Arial"/>
+                </a:rPr>
+                <a:t> [0..1]</a:t>
+              </a:r>
               <a:endParaRPr sz="1600" b="0" i="0" u="none" strike="noStrike" cap="none" dirty="0">
                 <a:solidFill>
                   <a:schemeClr val="dk1"/>
@@ -4923,6 +4971,18 @@
                   <a:sym typeface="Arial"/>
                 </a:rPr>
                 <a:t>defaultValue</a:t>
+              </a:r>
+              <a:r>
+                <a:rPr lang="en-US" sz="1600" b="0" i="0" u="none" strike="noStrike" cap="none" dirty="0">
+                  <a:solidFill>
+                    <a:schemeClr val="dk1"/>
+                  </a:solidFill>
+                  <a:latin typeface="Arial"/>
+                  <a:ea typeface="Arial"/>
+                  <a:cs typeface="Arial"/>
+                  <a:sym typeface="Arial"/>
+                </a:rPr>
+                <a:t> [0..1]</a:t>
               </a:r>
               <a:endParaRPr sz="1600" b="0" i="0" u="none" strike="noStrike" cap="none" dirty="0">
                 <a:solidFill>
@@ -5303,7 +5363,7 @@
                 <a:cs typeface="Arial"/>
                 <a:sym typeface="Arial"/>
               </a:rPr>
-              <a:t> name</a:t>
+              <a:t> name [1]</a:t>
             </a:r>
             <a:endParaRPr lang="en-US" sz="2000" b="0" i="0" u="none" strike="noStrike" cap="none" dirty="0">
               <a:solidFill>
@@ -5343,7 +5403,7 @@
                 <a:cs typeface="Arial"/>
                 <a:sym typeface="Arial"/>
               </a:rPr>
-              <a:t>String id</a:t>
+              <a:t>String id [1]</a:t>
             </a:r>
           </a:p>
           <a:p>
@@ -5395,6 +5455,18 @@
               </a:rPr>
               <a:t>isSingleton</a:t>
             </a:r>
+            <a:r>
+              <a:rPr lang="en-US" sz="1600" b="0" i="0" u="none" strike="noStrike" cap="none" dirty="0">
+                <a:solidFill>
+                  <a:schemeClr val="dk1"/>
+                </a:solidFill>
+                <a:latin typeface="Arial"/>
+                <a:ea typeface="Arial"/>
+                <a:cs typeface="Arial"/>
+                <a:sym typeface="Arial"/>
+              </a:rPr>
+              <a:t> [0..1]</a:t>
+            </a:r>
             <a:endParaRPr lang="en-US" sz="1600" dirty="0">
               <a:solidFill>
                 <a:schemeClr val="dk1"/>
@@ -5515,8 +5587,8 @@
         </p:nvGrpSpPr>
         <p:grpSpPr>
           <a:xfrm>
-            <a:off x="5934622" y="1019796"/>
-            <a:ext cx="3193568" cy="1468170"/>
+            <a:off x="5934621" y="1019796"/>
+            <a:ext cx="3683103" cy="1468170"/>
             <a:chOff x="4861160" y="3099243"/>
             <a:chExt cx="2886559" cy="910324"/>
           </a:xfrm>
@@ -5696,8 +5768,8 @@
           </p:nvSpPr>
           <p:spPr>
             <a:xfrm>
-              <a:off x="4946796" y="3429746"/>
-              <a:ext cx="2778910" cy="288134"/>
+              <a:off x="4946795" y="3429746"/>
+              <a:ext cx="2794088" cy="288134"/>
             </a:xfrm>
             <a:prstGeom prst="rect">
               <a:avLst/>
@@ -5766,6 +5838,18 @@
                 </a:rPr>
                 <a:t>implementedBy</a:t>
               </a:r>
+              <a:r>
+                <a:rPr lang="en-US" sz="1600" b="0" i="0" u="none" strike="noStrike" cap="none" dirty="0">
+                  <a:solidFill>
+                    <a:schemeClr val="dk1"/>
+                  </a:solidFill>
+                  <a:latin typeface="Arial"/>
+                  <a:ea typeface="Arial"/>
+                  <a:cs typeface="Arial"/>
+                  <a:sym typeface="Arial"/>
+                </a:rPr>
+                <a:t> [0..1]</a:t>
+              </a:r>
               <a:endParaRPr sz="1600" b="0" i="0" u="none" strike="noStrike" cap="none" dirty="0">
                 <a:solidFill>
                   <a:schemeClr val="dk1"/>
@@ -5829,6 +5913,18 @@
                   <a:sym typeface="Arial"/>
                 </a:rPr>
                 <a:t>scope</a:t>
+              </a:r>
+              <a:r>
+                <a:rPr lang="en-US" sz="1600" b="0" i="0" u="none" strike="noStrike" cap="none" dirty="0">
+                  <a:solidFill>
+                    <a:schemeClr val="dk1"/>
+                  </a:solidFill>
+                  <a:latin typeface="Arial"/>
+                  <a:ea typeface="Arial"/>
+                  <a:cs typeface="Arial"/>
+                  <a:sym typeface="Arial"/>
+                </a:rPr>
+                <a:t> [0..1]</a:t>
               </a:r>
               <a:endParaRPr sz="1600" b="0" i="0" u="none" strike="noStrike" cap="none" dirty="0">
                 <a:solidFill>
@@ -6186,7 +6282,7 @@
           <p:spPr>
             <a:xfrm>
               <a:off x="7296142" y="1673923"/>
-              <a:ext cx="1757230" cy="566751"/>
+              <a:ext cx="1757230" cy="475151"/>
             </a:xfrm>
             <a:prstGeom prst="rect">
               <a:avLst/>
@@ -6241,7 +6337,7 @@
                   <a:cs typeface="Arial"/>
                   <a:sym typeface="Arial"/>
                 </a:rPr>
-                <a:t> type</a:t>
+                <a:t> type [1]</a:t>
               </a:r>
               <a:endParaRPr sz="2000" b="0" i="0" u="none" strike="noStrike" cap="none" dirty="0">
                 <a:solidFill>
@@ -6307,15 +6403,18 @@
                 </a:rPr>
                 <a:t>unitOfMeasure</a:t>
               </a:r>
-              <a:endParaRPr lang="en-US" sz="1600" b="0" i="0" u="none" strike="noStrike" cap="none" dirty="0">
-                <a:solidFill>
-                  <a:schemeClr val="dk1"/>
-                </a:solidFill>
-                <a:latin typeface="Arial"/>
-                <a:ea typeface="Arial"/>
-                <a:cs typeface="Arial"/>
-                <a:sym typeface="Arial"/>
-              </a:endParaRPr>
+              <a:r>
+                <a:rPr lang="en-US" sz="1600" b="0" i="0" u="none" strike="noStrike" cap="none" dirty="0">
+                  <a:solidFill>
+                    <a:schemeClr val="dk1"/>
+                  </a:solidFill>
+                  <a:latin typeface="Arial"/>
+                  <a:ea typeface="Arial"/>
+                  <a:cs typeface="Arial"/>
+                  <a:sym typeface="Arial"/>
+                </a:rPr>
+                <a:t> [0..1]</a:t>
+              </a:r>
             </a:p>
             <a:p>
               <a:pPr>
@@ -7291,8 +7390,8 @@
         </p:nvCxnSpPr>
         <p:spPr>
           <a:xfrm rot="5400000">
-            <a:off x="6150847" y="1864211"/>
-            <a:ext cx="792000" cy="2039510"/>
+            <a:off x="6275928" y="1739131"/>
+            <a:ext cx="792000" cy="2289671"/>
           </a:xfrm>
           <a:prstGeom prst="bentConnector2">
             <a:avLst/>
@@ -7631,6 +7730,18 @@
                 </a:rPr>
                 <a:t>relationshipType</a:t>
               </a:r>
+              <a:r>
+                <a:rPr lang="en-US" sz="1600" b="0" i="0" u="none" strike="noStrike" cap="none" dirty="0">
+                  <a:solidFill>
+                    <a:schemeClr val="dk1"/>
+                  </a:solidFill>
+                  <a:latin typeface="Arial"/>
+                  <a:ea typeface="Arial"/>
+                  <a:cs typeface="Arial"/>
+                  <a:sym typeface="Arial"/>
+                </a:rPr>
+                <a:t> [0..1]</a:t>
+              </a:r>
               <a:endParaRPr sz="2000" b="0" i="0" u="none" strike="noStrike" cap="none" dirty="0">
                 <a:solidFill>
                   <a:srgbClr val="000000"/>
@@ -42218,144 +42329,66 @@
           <a:chExt cx="0" cy="0"/>
         </a:xfrm>
       </p:grpSpPr>
-      <p:grpSp>
-        <p:nvGrpSpPr>
-          <p:cNvPr id="8" name="Gruppieren 7">
-            <a:extLst>
-              <a:ext uri="{FF2B5EF4-FFF2-40B4-BE49-F238E27FC236}">
-                <a16:creationId xmlns:a16="http://schemas.microsoft.com/office/drawing/2014/main" id="{F7F731B2-C32E-4C89-9385-5098068227C6}"/>
-              </a:ext>
-            </a:extLst>
-          </p:cNvPr>
-          <p:cNvGrpSpPr/>
-          <p:nvPr/>
-        </p:nvGrpSpPr>
-        <p:grpSpPr>
-          <a:xfrm>
-            <a:off x="5641368" y="652545"/>
-            <a:ext cx="1264922" cy="536438"/>
-            <a:chOff x="3484880" y="609600"/>
-            <a:chExt cx="2529840" cy="560727"/>
-          </a:xfrm>
-        </p:grpSpPr>
-        <p:sp>
-          <p:nvSpPr>
-            <p:cNvPr id="9" name="Rechteck 8">
-              <a:extLst>
-                <a:ext uri="{FF2B5EF4-FFF2-40B4-BE49-F238E27FC236}">
-                  <a16:creationId xmlns:a16="http://schemas.microsoft.com/office/drawing/2014/main" id="{E3051664-F034-4C0E-8A7D-910BF8D8C10D}"/>
-                </a:ext>
-              </a:extLst>
-            </p:cNvPr>
-            <p:cNvSpPr/>
-            <p:nvPr/>
-          </p:nvSpPr>
-          <p:spPr>
-            <a:xfrm>
-              <a:off x="3484880" y="609600"/>
-              <a:ext cx="2529840" cy="428786"/>
-            </a:xfrm>
-            <a:prstGeom prst="rect">
-              <a:avLst/>
-            </a:prstGeom>
-            <a:noFill/>
-            <a:ln w="9525" cap="flat" cmpd="sng" algn="ctr">
-              <a:solidFill>
-                <a:schemeClr val="dk1"/>
-              </a:solidFill>
-              <a:prstDash val="solid"/>
-              <a:round/>
-              <a:headEnd type="none" w="med" len="med"/>
-              <a:tailEnd type="arrow" w="med" len="med"/>
-            </a:ln>
-          </p:spPr>
-          <p:style>
-            <a:lnRef idx="0">
-              <a:scrgbClr r="0" g="0" b="0"/>
-            </a:lnRef>
-            <a:fillRef idx="0">
-              <a:scrgbClr r="0" g="0" b="0"/>
-            </a:fillRef>
-            <a:effectRef idx="0">
-              <a:scrgbClr r="0" g="0" b="0"/>
-            </a:effectRef>
-            <a:fontRef idx="minor">
+      <p:sp>
+        <p:nvSpPr>
+          <p:cNvPr id="9" name="Rechteck 8">
+            <a:extLst>
+              <a:ext uri="{FF2B5EF4-FFF2-40B4-BE49-F238E27FC236}">
+                <a16:creationId xmlns:a16="http://schemas.microsoft.com/office/drawing/2014/main" id="{E3051664-F034-4C0E-8A7D-910BF8D8C10D}"/>
+              </a:ext>
+            </a:extLst>
+          </p:cNvPr>
+          <p:cNvSpPr/>
+          <p:nvPr/>
+        </p:nvSpPr>
+        <p:spPr>
+          <a:xfrm>
+            <a:off x="5688993" y="652544"/>
+            <a:ext cx="1264922" cy="562373"/>
+          </a:xfrm>
+          <a:prstGeom prst="rect">
+            <a:avLst/>
+          </a:prstGeom>
+          <a:noFill/>
+          <a:ln w="9525" cap="flat" cmpd="sng" algn="ctr">
+            <a:solidFill>
               <a:schemeClr val="dk1"/>
-            </a:fontRef>
-          </p:style>
-          <p:txBody>
-            <a:bodyPr rtlCol="0" anchor="ctr"/>
-            <a:lstStyle/>
-            <a:p>
-              <a:pPr algn="ctr"/>
-              <a:r>
-                <a:rPr lang="de-AT" b="1" dirty="0">
-                  <a:latin typeface="Arial" panose="020B0604020202020204" pitchFamily="34" charset="0"/>
-                  <a:cs typeface="Arial" panose="020B0604020202020204" pitchFamily="34" charset="0"/>
-                </a:rPr>
-                <a:t>Interface</a:t>
-              </a:r>
-            </a:p>
-          </p:txBody>
-        </p:sp>
-        <p:sp>
-          <p:nvSpPr>
-            <p:cNvPr id="10" name="Rechteck 9">
-              <a:extLst>
-                <a:ext uri="{FF2B5EF4-FFF2-40B4-BE49-F238E27FC236}">
-                  <a16:creationId xmlns:a16="http://schemas.microsoft.com/office/drawing/2014/main" id="{82B7E356-DF17-4979-A139-02CD4F78022B}"/>
-                </a:ext>
-              </a:extLst>
-            </p:cNvPr>
-            <p:cNvSpPr/>
-            <p:nvPr/>
-          </p:nvSpPr>
-          <p:spPr>
-            <a:xfrm>
-              <a:off x="3484880" y="1038386"/>
-              <a:ext cx="2529840" cy="131941"/>
-            </a:xfrm>
-            <a:prstGeom prst="rect">
-              <a:avLst/>
-            </a:prstGeom>
-            <a:noFill/>
-            <a:ln w="9525" cap="flat" cmpd="sng" algn="ctr">
-              <a:solidFill>
-                <a:schemeClr val="dk1"/>
-              </a:solidFill>
-              <a:prstDash val="solid"/>
-              <a:round/>
-              <a:headEnd type="none" w="med" len="med"/>
-              <a:tailEnd type="arrow" w="med" len="med"/>
-            </a:ln>
-          </p:spPr>
-          <p:style>
-            <a:lnRef idx="0">
-              <a:scrgbClr r="0" g="0" b="0"/>
-            </a:lnRef>
-            <a:fillRef idx="0">
-              <a:scrgbClr r="0" g="0" b="0"/>
-            </a:fillRef>
-            <a:effectRef idx="0">
-              <a:scrgbClr r="0" g="0" b="0"/>
-            </a:effectRef>
-            <a:fontRef idx="minor">
-              <a:schemeClr val="dk1"/>
-            </a:fontRef>
-          </p:style>
-          <p:txBody>
-            <a:bodyPr rtlCol="0" anchor="ctr"/>
-            <a:lstStyle/>
-            <a:p>
-              <a:pPr algn="ctr"/>
-              <a:endParaRPr lang="de-AT" dirty="0">
-                <a:latin typeface="Arial" panose="020B0604020202020204" pitchFamily="34" charset="0"/>
-                <a:cs typeface="Arial" panose="020B0604020202020204" pitchFamily="34" charset="0"/>
-              </a:endParaRPr>
-            </a:p>
-          </p:txBody>
-        </p:sp>
-      </p:grpSp>
+            </a:solidFill>
+            <a:prstDash val="solid"/>
+            <a:round/>
+            <a:headEnd type="none" w="med" len="med"/>
+            <a:tailEnd type="arrow" w="med" len="med"/>
+          </a:ln>
+        </p:spPr>
+        <p:style>
+          <a:lnRef idx="0">
+            <a:scrgbClr r="0" g="0" b="0"/>
+          </a:lnRef>
+          <a:fillRef idx="0">
+            <a:scrgbClr r="0" g="0" b="0"/>
+          </a:fillRef>
+          <a:effectRef idx="0">
+            <a:scrgbClr r="0" g="0" b="0"/>
+          </a:effectRef>
+          <a:fontRef idx="minor">
+            <a:schemeClr val="dk1"/>
+          </a:fontRef>
+        </p:style>
+        <p:txBody>
+          <a:bodyPr rtlCol="0" anchor="ctr"/>
+          <a:lstStyle/>
+          <a:p>
+            <a:pPr algn="ctr"/>
+            <a:r>
+              <a:rPr lang="de-AT" b="1" dirty="0">
+                <a:latin typeface="Arial" panose="020B0604020202020204" pitchFamily="34" charset="0"/>
+                <a:cs typeface="Arial" panose="020B0604020202020204" pitchFamily="34" charset="0"/>
+              </a:rPr>
+              <a:t>Interface</a:t>
+            </a:r>
+          </a:p>
+        </p:txBody>
+      </p:sp>
       <p:grpSp>
         <p:nvGrpSpPr>
           <p:cNvPr id="17" name="Gruppieren 16">
@@ -42370,8 +42403,8 @@
         </p:nvGrpSpPr>
         <p:grpSpPr>
           <a:xfrm>
-            <a:off x="5000353" y="3268800"/>
-            <a:ext cx="2056755" cy="1456847"/>
+            <a:off x="5099506" y="3268800"/>
+            <a:ext cx="2394844" cy="1456847"/>
             <a:chOff x="3484880" y="613815"/>
             <a:chExt cx="2879997" cy="1181704"/>
           </a:xfrm>
@@ -42391,7 +42424,7 @@
           <p:spPr>
             <a:xfrm>
               <a:off x="3484880" y="613815"/>
-              <a:ext cx="2879997" cy="321145"/>
+              <a:ext cx="2879997" cy="326408"/>
             </a:xfrm>
             <a:prstGeom prst="rect">
               <a:avLst/>
@@ -42454,8 +42487,8 @@
           </p:nvSpPr>
           <p:spPr>
             <a:xfrm>
-              <a:off x="3484880" y="929264"/>
-              <a:ext cx="2879997" cy="866255"/>
+              <a:off x="3484880" y="940224"/>
+              <a:ext cx="2879997" cy="855295"/>
             </a:xfrm>
             <a:prstGeom prst="rect">
               <a:avLst/>
@@ -42486,7 +42519,7 @@
             </a:fontRef>
           </p:style>
           <p:txBody>
-            <a:bodyPr rtlCol="0" anchor="ctr"/>
+            <a:bodyPr lIns="36000" rIns="36000" rtlCol="0" anchor="ctr"/>
             <a:lstStyle/>
             <a:p>
               <a:r>
@@ -42503,10 +42536,13 @@
                 </a:rPr>
                 <a:t>name</a:t>
               </a:r>
-              <a:endParaRPr lang="de-AT" sz="1600" dirty="0">
-                <a:latin typeface="Arial" panose="020B0604020202020204" pitchFamily="34" charset="0"/>
-                <a:cs typeface="Arial" panose="020B0604020202020204" pitchFamily="34" charset="0"/>
-              </a:endParaRPr>
+              <a:r>
+                <a:rPr lang="de-AT" sz="1600" dirty="0">
+                  <a:latin typeface="Arial" panose="020B0604020202020204" pitchFamily="34" charset="0"/>
+                  <a:cs typeface="Arial" panose="020B0604020202020204" pitchFamily="34" charset="0"/>
+                </a:rPr>
+                <a:t> [1]</a:t>
+              </a:r>
             </a:p>
             <a:p>
               <a:r>
@@ -42523,10 +42559,13 @@
                 </a:rPr>
                 <a:t>isWritable</a:t>
               </a:r>
-              <a:endParaRPr lang="de-AT" sz="1600" dirty="0">
-                <a:latin typeface="Arial" panose="020B0604020202020204" pitchFamily="34" charset="0"/>
-                <a:cs typeface="Arial" panose="020B0604020202020204" pitchFamily="34" charset="0"/>
-              </a:endParaRPr>
+              <a:r>
+                <a:rPr lang="de-AT" sz="1600" dirty="0">
+                  <a:latin typeface="Arial" panose="020B0604020202020204" pitchFamily="34" charset="0"/>
+                  <a:cs typeface="Arial" panose="020B0604020202020204" pitchFamily="34" charset="0"/>
+                </a:rPr>
+                <a:t> [0..1]</a:t>
+              </a:r>
             </a:p>
             <a:p>
               <a:r>
@@ -42541,7 +42580,7 @@
                   <a:latin typeface="Arial" panose="020B0604020202020204" pitchFamily="34" charset="0"/>
                   <a:cs typeface="Arial" panose="020B0604020202020204" pitchFamily="34" charset="0"/>
                 </a:rPr>
-                <a:t> type </a:t>
+                <a:t> type [0..1]</a:t>
               </a:r>
             </a:p>
             <a:p>
@@ -42559,10 +42598,13 @@
                 </a:rPr>
                 <a:t>unit</a:t>
               </a:r>
-              <a:endParaRPr lang="de-AT" sz="1600" dirty="0">
-                <a:latin typeface="Arial" panose="020B0604020202020204" pitchFamily="34" charset="0"/>
-                <a:cs typeface="Arial" panose="020B0604020202020204" pitchFamily="34" charset="0"/>
-              </a:endParaRPr>
+              <a:r>
+                <a:rPr lang="de-AT" sz="1600" dirty="0">
+                  <a:latin typeface="Arial" panose="020B0604020202020204" pitchFamily="34" charset="0"/>
+                  <a:cs typeface="Arial" panose="020B0604020202020204" pitchFamily="34" charset="0"/>
+                </a:rPr>
+                <a:t> [0..1]</a:t>
+              </a:r>
             </a:p>
           </p:txBody>
         </p:sp>
@@ -42581,10 +42623,10 @@
         </p:nvGrpSpPr>
         <p:grpSpPr>
           <a:xfrm>
-            <a:off x="8123271" y="3261776"/>
-            <a:ext cx="2056755" cy="1214118"/>
+            <a:off x="8145306" y="3261776"/>
+            <a:ext cx="2280597" cy="1470909"/>
             <a:chOff x="3484881" y="609599"/>
-            <a:chExt cx="2529840" cy="827954"/>
+            <a:chExt cx="2529840" cy="1003070"/>
           </a:xfrm>
         </p:grpSpPr>
         <p:sp>
@@ -42665,8 +42707,8 @@
           </p:nvSpPr>
           <p:spPr>
             <a:xfrm>
-              <a:off x="3484881" y="884393"/>
-              <a:ext cx="2529840" cy="553160"/>
+              <a:off x="3484881" y="879592"/>
+              <a:ext cx="2529840" cy="733077"/>
             </a:xfrm>
             <a:prstGeom prst="rect">
               <a:avLst/>
@@ -42697,8 +42739,31 @@
             </a:fontRef>
           </p:style>
           <p:txBody>
-            <a:bodyPr rtlCol="0" anchor="ctr"/>
+            <a:bodyPr lIns="36000" rIns="36000" rtlCol="0" anchor="ctr"/>
             <a:lstStyle/>
+            <a:p>
+              <a:r>
+                <a:rPr lang="de-AT" sz="1600" dirty="0">
+                  <a:latin typeface="Arial" panose="020B0604020202020204" pitchFamily="34" charset="0"/>
+                  <a:cs typeface="Arial" panose="020B0604020202020204" pitchFamily="34" charset="0"/>
+                </a:rPr>
+                <a:t>String </a:t>
+              </a:r>
+              <a:r>
+                <a:rPr lang="de-AT" sz="1600" dirty="0" err="1">
+                  <a:latin typeface="Arial" panose="020B0604020202020204" pitchFamily="34" charset="0"/>
+                  <a:cs typeface="Arial" panose="020B0604020202020204" pitchFamily="34" charset="0"/>
+                </a:rPr>
+                <a:t>name</a:t>
+              </a:r>
+              <a:r>
+                <a:rPr lang="de-AT" sz="1600" dirty="0">
+                  <a:latin typeface="Arial" panose="020B0604020202020204" pitchFamily="34" charset="0"/>
+                  <a:cs typeface="Arial" panose="020B0604020202020204" pitchFamily="34" charset="0"/>
+                </a:rPr>
+                <a:t> [1]</a:t>
+              </a:r>
+            </a:p>
             <a:p>
               <a:r>
                 <a:rPr lang="de-AT" sz="1600" dirty="0" err="1">
@@ -42721,10 +42786,13 @@
                 </a:rPr>
                 <a:t>minOccur</a:t>
               </a:r>
-              <a:endParaRPr lang="de-AT" sz="1600" dirty="0">
-                <a:latin typeface="Arial" panose="020B0604020202020204" pitchFamily="34" charset="0"/>
-                <a:cs typeface="Arial" panose="020B0604020202020204" pitchFamily="34" charset="0"/>
-              </a:endParaRPr>
+              <a:r>
+                <a:rPr lang="de-AT" sz="1600" dirty="0">
+                  <a:latin typeface="Arial" panose="020B0604020202020204" pitchFamily="34" charset="0"/>
+                  <a:cs typeface="Arial" panose="020B0604020202020204" pitchFamily="34" charset="0"/>
+                </a:rPr>
+                <a:t> [0..1]</a:t>
+              </a:r>
             </a:p>
             <a:p>
               <a:r>
@@ -42748,10 +42816,13 @@
                 </a:rPr>
                 <a:t>maxOccur</a:t>
               </a:r>
-              <a:endParaRPr lang="de-AT" sz="1600" dirty="0">
-                <a:latin typeface="Arial" panose="020B0604020202020204" pitchFamily="34" charset="0"/>
-                <a:cs typeface="Arial" panose="020B0604020202020204" pitchFamily="34" charset="0"/>
-              </a:endParaRPr>
+              <a:r>
+                <a:rPr lang="de-AT" sz="1600" dirty="0">
+                  <a:latin typeface="Arial" panose="020B0604020202020204" pitchFamily="34" charset="0"/>
+                  <a:cs typeface="Arial" panose="020B0604020202020204" pitchFamily="34" charset="0"/>
+                </a:rPr>
+                <a:t> [0..1]</a:t>
+              </a:r>
             </a:p>
             <a:p>
               <a:r>
@@ -42768,10 +42839,13 @@
                 </a:rPr>
                 <a:t>isWritable</a:t>
               </a:r>
-              <a:endParaRPr lang="de-AT" sz="1600" dirty="0">
-                <a:latin typeface="Arial" panose="020B0604020202020204" pitchFamily="34" charset="0"/>
-                <a:cs typeface="Arial" panose="020B0604020202020204" pitchFamily="34" charset="0"/>
-              </a:endParaRPr>
+              <a:r>
+                <a:rPr lang="de-AT" sz="1600" dirty="0">
+                  <a:latin typeface="Arial" panose="020B0604020202020204" pitchFamily="34" charset="0"/>
+                  <a:cs typeface="Arial" panose="020B0604020202020204" pitchFamily="34" charset="0"/>
+                </a:rPr>
+                <a:t> [0..1]</a:t>
+              </a:r>
             </a:p>
           </p:txBody>
         </p:sp>
@@ -42790,7 +42864,7 @@
         </p:nvSpPr>
         <p:spPr>
           <a:xfrm>
-            <a:off x="7067869" y="848012"/>
+            <a:off x="7115494" y="848012"/>
             <a:ext cx="790601" cy="307777"/>
           </a:xfrm>
           <a:prstGeom prst="rect">
@@ -42841,9 +42915,9 @@
         <p:grpSpPr>
           <a:xfrm>
             <a:off x="2882618" y="3263605"/>
-            <a:ext cx="2003429" cy="1289845"/>
+            <a:ext cx="2117734" cy="1458153"/>
             <a:chOff x="3484880" y="609600"/>
-            <a:chExt cx="2529840" cy="1348248"/>
+            <a:chExt cx="2529840" cy="1524177"/>
           </a:xfrm>
         </p:grpSpPr>
         <p:sp>
@@ -42925,7 +42999,7 @@
           <p:spPr>
             <a:xfrm>
               <a:off x="3484880" y="1038386"/>
-              <a:ext cx="2529840" cy="919462"/>
+              <a:ext cx="2529840" cy="1095391"/>
             </a:xfrm>
             <a:prstGeom prst="rect">
               <a:avLst/>
@@ -42956,7 +43030,7 @@
             </a:fontRef>
           </p:style>
           <p:txBody>
-            <a:bodyPr rtlCol="0" anchor="ctr"/>
+            <a:bodyPr lIns="36000" rIns="36000" rtlCol="0" anchor="t"/>
             <a:lstStyle/>
             <a:p>
               <a:r>
@@ -42973,10 +43047,13 @@
                 </a:rPr>
                 <a:t>name</a:t>
               </a:r>
-              <a:endParaRPr lang="de-AT" sz="1600" dirty="0">
-                <a:latin typeface="Arial" panose="020B0604020202020204" pitchFamily="34" charset="0"/>
-                <a:cs typeface="Arial" panose="020B0604020202020204" pitchFamily="34" charset="0"/>
-              </a:endParaRPr>
+              <a:r>
+                <a:rPr lang="de-AT" sz="1600" dirty="0">
+                  <a:latin typeface="Arial" panose="020B0604020202020204" pitchFamily="34" charset="0"/>
+                  <a:cs typeface="Arial" panose="020B0604020202020204" pitchFamily="34" charset="0"/>
+                </a:rPr>
+                <a:t> [1]</a:t>
+              </a:r>
             </a:p>
             <a:p>
               <a:r>
@@ -42991,7 +43068,7 @@
                   <a:latin typeface="Arial" panose="020B0604020202020204" pitchFamily="34" charset="0"/>
                   <a:cs typeface="Arial" panose="020B0604020202020204" pitchFamily="34" charset="0"/>
                 </a:rPr>
-                <a:t> type</a:t>
+                <a:t> type [1]</a:t>
               </a:r>
             </a:p>
             <a:p>
@@ -43009,10 +43086,13 @@
                 </a:rPr>
                 <a:t>unit</a:t>
               </a:r>
-              <a:endParaRPr lang="de-AT" sz="1600" dirty="0">
-                <a:latin typeface="Arial" panose="020B0604020202020204" pitchFamily="34" charset="0"/>
-                <a:cs typeface="Arial" panose="020B0604020202020204" pitchFamily="34" charset="0"/>
-              </a:endParaRPr>
+              <a:r>
+                <a:rPr lang="de-AT" sz="1600" dirty="0">
+                  <a:latin typeface="Arial" panose="020B0604020202020204" pitchFamily="34" charset="0"/>
+                  <a:cs typeface="Arial" panose="020B0604020202020204" pitchFamily="34" charset="0"/>
+                </a:rPr>
+                <a:t> [0..1]</a:t>
+              </a:r>
             </a:p>
           </p:txBody>
         </p:sp>
@@ -43031,10 +43111,10 @@
         </p:nvGrpSpPr>
         <p:grpSpPr>
           <a:xfrm>
-            <a:off x="108911" y="3243484"/>
-            <a:ext cx="2677152" cy="1661043"/>
-            <a:chOff x="3484880" y="551603"/>
-            <a:chExt cx="2529840" cy="1736253"/>
+            <a:off x="108911" y="3261776"/>
+            <a:ext cx="2677152" cy="1459983"/>
+            <a:chOff x="3484880" y="570723"/>
+            <a:chExt cx="2529840" cy="1526089"/>
           </a:xfrm>
         </p:grpSpPr>
         <p:sp>
@@ -43051,8 +43131,8 @@
           </p:nvSpPr>
           <p:spPr>
             <a:xfrm>
-              <a:off x="3484880" y="551603"/>
-              <a:ext cx="2529840" cy="464753"/>
+              <a:off x="3484880" y="570723"/>
+              <a:ext cx="2529840" cy="445633"/>
             </a:xfrm>
             <a:prstGeom prst="rect">
               <a:avLst/>
@@ -43111,8 +43191,8 @@
           </p:nvSpPr>
           <p:spPr>
             <a:xfrm>
-              <a:off x="3484880" y="1023450"/>
-              <a:ext cx="2529840" cy="1264406"/>
+              <a:off x="3484880" y="1016356"/>
+              <a:ext cx="2529840" cy="1080456"/>
             </a:xfrm>
             <a:prstGeom prst="rect">
               <a:avLst/>
@@ -43143,7 +43223,7 @@
             </a:fontRef>
           </p:style>
           <p:txBody>
-            <a:bodyPr rtlCol="0" anchor="ctr"/>
+            <a:bodyPr lIns="36000" rIns="36000" rtlCol="0" anchor="ctr"/>
             <a:lstStyle/>
             <a:p>
               <a:r>
@@ -43160,10 +43240,13 @@
                 </a:rPr>
                 <a:t>name</a:t>
               </a:r>
-              <a:endParaRPr lang="de-AT" sz="1600" dirty="0">
-                <a:latin typeface="Arial" panose="020B0604020202020204" pitchFamily="34" charset="0"/>
-                <a:cs typeface="Arial" panose="020B0604020202020204" pitchFamily="34" charset="0"/>
-              </a:endParaRPr>
+              <a:r>
+                <a:rPr lang="de-AT" sz="1600" dirty="0">
+                  <a:latin typeface="Arial" panose="020B0604020202020204" pitchFamily="34" charset="0"/>
+                  <a:cs typeface="Arial" panose="020B0604020202020204" pitchFamily="34" charset="0"/>
+                </a:rPr>
+                <a:t> [1]</a:t>
+              </a:r>
             </a:p>
             <a:p>
               <a:r>
@@ -43178,19 +43261,28 @@
                   <a:latin typeface="Arial" panose="020B0604020202020204" pitchFamily="34" charset="0"/>
                   <a:cs typeface="Arial" panose="020B0604020202020204" pitchFamily="34" charset="0"/>
                 </a:rPr>
-                <a:t> [0..*] </a:t>
+                <a:t> </a:t>
               </a:r>
+              <a:br>
+                <a:rPr lang="de-AT" sz="1600" dirty="0">
+                  <a:latin typeface="Arial" panose="020B0604020202020204" pitchFamily="34" charset="0"/>
+                  <a:cs typeface="Arial" panose="020B0604020202020204" pitchFamily="34" charset="0"/>
+                </a:rPr>
+              </a:br>
               <a:r>
                 <a:rPr lang="de-AT" sz="1600" dirty="0" err="1">
                   <a:latin typeface="Arial" panose="020B0604020202020204" pitchFamily="34" charset="0"/>
                   <a:cs typeface="Arial" panose="020B0604020202020204" pitchFamily="34" charset="0"/>
                 </a:rPr>
-                <a:t>request</a:t>
+                <a:t>req</a:t>
               </a:r>
-              <a:endParaRPr lang="de-AT" sz="1600" dirty="0">
-                <a:latin typeface="Arial" panose="020B0604020202020204" pitchFamily="34" charset="0"/>
-                <a:cs typeface="Arial" panose="020B0604020202020204" pitchFamily="34" charset="0"/>
-              </a:endParaRPr>
+              <a:r>
+                <a:rPr lang="de-AT" sz="1600" dirty="0">
+                  <a:latin typeface="Arial" panose="020B0604020202020204" pitchFamily="34" charset="0"/>
+                  <a:cs typeface="Arial" panose="020B0604020202020204" pitchFamily="34" charset="0"/>
+                </a:rPr>
+                <a:t> [0..*] </a:t>
+              </a:r>
             </a:p>
             <a:p>
               <a:r>
@@ -43205,19 +43297,22 @@
                   <a:latin typeface="Arial" panose="020B0604020202020204" pitchFamily="34" charset="0"/>
                   <a:cs typeface="Arial" panose="020B0604020202020204" pitchFamily="34" charset="0"/>
                 </a:rPr>
-                <a:t> [0..*] </a:t>
+                <a:t> </a:t>
               </a:r>
               <a:r>
                 <a:rPr lang="de-AT" sz="1600" dirty="0" err="1">
                   <a:latin typeface="Arial" panose="020B0604020202020204" pitchFamily="34" charset="0"/>
                   <a:cs typeface="Arial" panose="020B0604020202020204" pitchFamily="34" charset="0"/>
                 </a:rPr>
-                <a:t>response</a:t>
+                <a:t>resp</a:t>
               </a:r>
-              <a:endParaRPr lang="de-AT" sz="1600" dirty="0">
-                <a:latin typeface="Arial" panose="020B0604020202020204" pitchFamily="34" charset="0"/>
-                <a:cs typeface="Arial" panose="020B0604020202020204" pitchFamily="34" charset="0"/>
-              </a:endParaRPr>
+              <a:r>
+                <a:rPr lang="de-AT" sz="1600" dirty="0">
+                  <a:latin typeface="Arial" panose="020B0604020202020204" pitchFamily="34" charset="0"/>
+                  <a:cs typeface="Arial" panose="020B0604020202020204" pitchFamily="34" charset="0"/>
+                </a:rPr>
+                <a:t> [0..*] </a:t>
+              </a:r>
             </a:p>
           </p:txBody>
         </p:sp>
@@ -43236,7 +43331,7 @@
         </p:nvSpPr>
         <p:spPr>
           <a:xfrm flipH="1">
-            <a:off x="6155095" y="1194486"/>
+            <a:off x="6202720" y="1223584"/>
             <a:ext cx="180000" cy="252000"/>
           </a:xfrm>
           <a:prstGeom prst="diamond">
@@ -43275,224 +43370,70 @@
           </a:p>
         </p:txBody>
       </p:sp>
-      <p:cxnSp>
-        <p:nvCxnSpPr>
-          <p:cNvPr id="86" name="Verbinder: gewinkelt 171">
-            <a:extLst>
-              <a:ext uri="{FF2B5EF4-FFF2-40B4-BE49-F238E27FC236}">
-                <a16:creationId xmlns:a16="http://schemas.microsoft.com/office/drawing/2014/main" id="{F722153F-0738-4C73-A978-D3E6F75BE852}"/>
-              </a:ext>
-            </a:extLst>
-          </p:cNvPr>
-          <p:cNvCxnSpPr>
-            <a:cxnSpLocks/>
-            <a:stCxn id="18" idx="0"/>
-            <a:endCxn id="42" idx="2"/>
-          </p:cNvCxnSpPr>
-          <p:nvPr/>
-        </p:nvCxnSpPr>
-        <p:spPr>
-          <a:xfrm rot="5400000" flipH="1" flipV="1">
-            <a:off x="5700986" y="2716913"/>
-            <a:ext cx="879633" cy="224142"/>
-          </a:xfrm>
-          <a:prstGeom prst="bentConnector3">
-            <a:avLst>
-              <a:gd name="adj1" fmla="val 50000"/>
-            </a:avLst>
+      <p:sp>
+        <p:nvSpPr>
+          <p:cNvPr id="40" name="Rechteck 39">
+            <a:extLst>
+              <a:ext uri="{FF2B5EF4-FFF2-40B4-BE49-F238E27FC236}">
+                <a16:creationId xmlns:a16="http://schemas.microsoft.com/office/drawing/2014/main" id="{7F7FD008-B025-4E12-BAB9-8E858F50F386}"/>
+              </a:ext>
+            </a:extLst>
+          </p:cNvPr>
+          <p:cNvSpPr/>
+          <p:nvPr/>
+        </p:nvSpPr>
+        <p:spPr>
+          <a:xfrm>
+            <a:off x="5160931" y="1845538"/>
+            <a:ext cx="2259037" cy="562372"/>
+          </a:xfrm>
+          <a:prstGeom prst="rect">
+            <a:avLst/>
           </a:prstGeom>
           <a:noFill/>
-          <a:ln w="12700" cap="flat" cmpd="sng">
+          <a:ln w="9525" cap="flat" cmpd="sng" algn="ctr">
             <a:solidFill>
               <a:schemeClr val="dk1"/>
             </a:solidFill>
             <a:prstDash val="solid"/>
-            <a:miter lim="800000"/>
-            <a:headEnd type="none" w="sm" len="sm"/>
-            <a:tailEnd type="triangle" w="lg" len="lg"/>
+            <a:round/>
+            <a:headEnd type="none" w="med" len="med"/>
+            <a:tailEnd type="arrow" w="med" len="med"/>
           </a:ln>
         </p:spPr>
-      </p:cxnSp>
-      <p:cxnSp>
-        <p:nvCxnSpPr>
-          <p:cNvPr id="96" name="Verbinder: gewinkelt 171">
-            <a:extLst>
-              <a:ext uri="{FF2B5EF4-FFF2-40B4-BE49-F238E27FC236}">
-                <a16:creationId xmlns:a16="http://schemas.microsoft.com/office/drawing/2014/main" id="{0F9CA7FC-4649-4906-8B82-E8E1AAD426B5}"/>
-              </a:ext>
-            </a:extLst>
-          </p:cNvPr>
-          <p:cNvCxnSpPr>
-            <a:cxnSpLocks/>
-            <a:stCxn id="85" idx="2"/>
-            <a:endCxn id="40" idx="0"/>
-          </p:cNvCxnSpPr>
-          <p:nvPr/>
-        </p:nvCxnSpPr>
-        <p:spPr>
-          <a:xfrm rot="16200000" flipH="1">
-            <a:off x="6039410" y="1652171"/>
-            <a:ext cx="419148" cy="7778"/>
-          </a:xfrm>
-          <a:prstGeom prst="bentConnector3">
-            <a:avLst>
-              <a:gd name="adj1" fmla="val 50000"/>
-            </a:avLst>
-          </a:prstGeom>
-          <a:noFill/>
-          <a:ln w="12700" cap="flat" cmpd="sng">
-            <a:solidFill>
-              <a:schemeClr val="dk1"/>
-            </a:solidFill>
-            <a:prstDash val="solid"/>
-            <a:miter lim="800000"/>
-            <a:headEnd type="none" w="sm" len="sm"/>
-            <a:tailEnd type="triangle" w="lg" len="lg"/>
-          </a:ln>
-        </p:spPr>
-      </p:cxnSp>
-      <p:grpSp>
-        <p:nvGrpSpPr>
-          <p:cNvPr id="39" name="Gruppieren 38">
-            <a:extLst>
-              <a:ext uri="{FF2B5EF4-FFF2-40B4-BE49-F238E27FC236}">
-                <a16:creationId xmlns:a16="http://schemas.microsoft.com/office/drawing/2014/main" id="{57E9D1E6-2163-4C46-A307-A2C677B2440E}"/>
-              </a:ext>
-            </a:extLst>
-          </p:cNvPr>
-          <p:cNvGrpSpPr/>
-          <p:nvPr/>
-        </p:nvGrpSpPr>
-        <p:grpSpPr>
-          <a:xfrm>
-            <a:off x="5123354" y="1865634"/>
-            <a:ext cx="2259037" cy="523533"/>
-            <a:chOff x="3484880" y="609600"/>
-            <a:chExt cx="2529840" cy="547238"/>
-          </a:xfrm>
-        </p:grpSpPr>
-        <p:sp>
-          <p:nvSpPr>
-            <p:cNvPr id="40" name="Rechteck 39">
-              <a:extLst>
-                <a:ext uri="{FF2B5EF4-FFF2-40B4-BE49-F238E27FC236}">
-                  <a16:creationId xmlns:a16="http://schemas.microsoft.com/office/drawing/2014/main" id="{7F7FD008-B025-4E12-BAB9-8E858F50F386}"/>
-                </a:ext>
-              </a:extLst>
-            </p:cNvPr>
-            <p:cNvSpPr/>
-            <p:nvPr/>
-          </p:nvSpPr>
-          <p:spPr>
-            <a:xfrm>
-              <a:off x="3484880" y="609600"/>
-              <a:ext cx="2529840" cy="428786"/>
-            </a:xfrm>
-            <a:prstGeom prst="rect">
-              <a:avLst/>
-            </a:prstGeom>
-            <a:noFill/>
-            <a:ln w="9525" cap="flat" cmpd="sng" algn="ctr">
-              <a:solidFill>
-                <a:schemeClr val="dk1"/>
-              </a:solidFill>
-              <a:prstDash val="solid"/>
-              <a:round/>
-              <a:headEnd type="none" w="med" len="med"/>
-              <a:tailEnd type="arrow" w="med" len="med"/>
-            </a:ln>
-          </p:spPr>
-          <p:style>
-            <a:lnRef idx="0">
-              <a:scrgbClr r="0" g="0" b="0"/>
-            </a:lnRef>
-            <a:fillRef idx="0">
-              <a:scrgbClr r="0" g="0" b="0"/>
-            </a:fillRef>
-            <a:effectRef idx="0">
-              <a:scrgbClr r="0" g="0" b="0"/>
-            </a:effectRef>
-            <a:fontRef idx="minor">
-              <a:schemeClr val="dk1"/>
-            </a:fontRef>
-          </p:style>
-          <p:txBody>
-            <a:bodyPr rtlCol="0" anchor="ctr"/>
-            <a:lstStyle/>
-            <a:p>
-              <a:pPr algn="ctr"/>
-              <a:r>
-                <a:rPr lang="de-AT" b="1" dirty="0" err="1">
-                  <a:latin typeface="Arial" panose="020B0604020202020204" pitchFamily="34" charset="0"/>
-                  <a:cs typeface="Arial" panose="020B0604020202020204" pitchFamily="34" charset="0"/>
-                </a:rPr>
-                <a:t>InterfaceContent</a:t>
-              </a:r>
-              <a:endParaRPr lang="de-AT" b="1" dirty="0">
-                <a:latin typeface="Arial" panose="020B0604020202020204" pitchFamily="34" charset="0"/>
-                <a:cs typeface="Arial" panose="020B0604020202020204" pitchFamily="34" charset="0"/>
-              </a:endParaRPr>
-            </a:p>
-          </p:txBody>
-        </p:sp>
-        <p:sp>
-          <p:nvSpPr>
-            <p:cNvPr id="42" name="Rechteck 41">
-              <a:extLst>
-                <a:ext uri="{FF2B5EF4-FFF2-40B4-BE49-F238E27FC236}">
-                  <a16:creationId xmlns:a16="http://schemas.microsoft.com/office/drawing/2014/main" id="{92A0D814-D841-4DD4-B61E-DC16B2EB45C9}"/>
-                </a:ext>
-              </a:extLst>
-            </p:cNvPr>
-            <p:cNvSpPr/>
-            <p:nvPr/>
-          </p:nvSpPr>
-          <p:spPr>
-            <a:xfrm>
-              <a:off x="3484880" y="1038386"/>
-              <a:ext cx="2529840" cy="118452"/>
-            </a:xfrm>
-            <a:prstGeom prst="rect">
-              <a:avLst/>
-            </a:prstGeom>
-            <a:noFill/>
-            <a:ln w="9525" cap="flat" cmpd="sng" algn="ctr">
-              <a:solidFill>
-                <a:schemeClr val="dk1"/>
-              </a:solidFill>
-              <a:prstDash val="solid"/>
-              <a:round/>
-              <a:headEnd type="none" w="med" len="med"/>
-              <a:tailEnd type="arrow" w="med" len="med"/>
-            </a:ln>
-          </p:spPr>
-          <p:style>
-            <a:lnRef idx="0">
-              <a:scrgbClr r="0" g="0" b="0"/>
-            </a:lnRef>
-            <a:fillRef idx="0">
-              <a:scrgbClr r="0" g="0" b="0"/>
-            </a:fillRef>
-            <a:effectRef idx="0">
-              <a:scrgbClr r="0" g="0" b="0"/>
-            </a:effectRef>
-            <a:fontRef idx="minor">
-              <a:schemeClr val="dk1"/>
-            </a:fontRef>
-          </p:style>
-          <p:txBody>
-            <a:bodyPr rtlCol="0" anchor="ctr"/>
-            <a:lstStyle/>
-            <a:p>
-              <a:pPr algn="ctr"/>
-              <a:endParaRPr lang="de-AT" dirty="0">
-                <a:latin typeface="Arial" panose="020B0604020202020204" pitchFamily="34" charset="0"/>
-                <a:cs typeface="Arial" panose="020B0604020202020204" pitchFamily="34" charset="0"/>
-              </a:endParaRPr>
-            </a:p>
-          </p:txBody>
-        </p:sp>
-      </p:grpSp>
+        <p:style>
+          <a:lnRef idx="0">
+            <a:scrgbClr r="0" g="0" b="0"/>
+          </a:lnRef>
+          <a:fillRef idx="0">
+            <a:scrgbClr r="0" g="0" b="0"/>
+          </a:fillRef>
+          <a:effectRef idx="0">
+            <a:scrgbClr r="0" g="0" b="0"/>
+          </a:effectRef>
+          <a:fontRef idx="minor">
+            <a:schemeClr val="dk1"/>
+          </a:fontRef>
+        </p:style>
+        <p:txBody>
+          <a:bodyPr rtlCol="0" anchor="ctr"/>
+          <a:lstStyle/>
+          <a:p>
+            <a:pPr algn="ctr"/>
+            <a:r>
+              <a:rPr lang="de-AT" b="1" dirty="0" err="1">
+                <a:latin typeface="Arial" panose="020B0604020202020204" pitchFamily="34" charset="0"/>
+                <a:cs typeface="Arial" panose="020B0604020202020204" pitchFamily="34" charset="0"/>
+              </a:rPr>
+              <a:t>InterfaceContent</a:t>
+            </a:r>
+            <a:endParaRPr lang="de-AT" b="1" dirty="0">
+              <a:latin typeface="Arial" panose="020B0604020202020204" pitchFamily="34" charset="0"/>
+              <a:cs typeface="Arial" panose="020B0604020202020204" pitchFamily="34" charset="0"/>
+            </a:endParaRPr>
+          </a:p>
+        </p:txBody>
+      </p:sp>
       <p:grpSp>
         <p:nvGrpSpPr>
           <p:cNvPr id="44" name="Gruppieren 43">
@@ -43507,8 +43448,8 @@
         </p:nvGrpSpPr>
         <p:grpSpPr>
           <a:xfrm>
-            <a:off x="2551634" y="57150"/>
-            <a:ext cx="1950801" cy="1151839"/>
+            <a:off x="2551633" y="579657"/>
+            <a:ext cx="2482761" cy="1151839"/>
             <a:chOff x="3484880" y="609600"/>
             <a:chExt cx="2529840" cy="1203994"/>
           </a:xfrm>
@@ -43640,10 +43581,13 @@
                 </a:rPr>
                 <a:t>displayName</a:t>
               </a:r>
-              <a:endParaRPr lang="de-AT" sz="1600" dirty="0">
-                <a:latin typeface="Arial" panose="020B0604020202020204" pitchFamily="34" charset="0"/>
-                <a:cs typeface="Arial" panose="020B0604020202020204" pitchFamily="34" charset="0"/>
-              </a:endParaRPr>
+              <a:r>
+                <a:rPr lang="de-AT" sz="1600" dirty="0">
+                  <a:latin typeface="Arial" panose="020B0604020202020204" pitchFamily="34" charset="0"/>
+                  <a:cs typeface="Arial" panose="020B0604020202020204" pitchFamily="34" charset="0"/>
+                </a:rPr>
+                <a:t> [0..1]</a:t>
+              </a:r>
             </a:p>
             <a:p>
               <a:r>
@@ -43660,10 +43604,13 @@
                 </a:rPr>
                 <a:t>description</a:t>
               </a:r>
-              <a:endParaRPr lang="de-AT" sz="1600" dirty="0">
-                <a:latin typeface="Arial" panose="020B0604020202020204" pitchFamily="34" charset="0"/>
-                <a:cs typeface="Arial" panose="020B0604020202020204" pitchFamily="34" charset="0"/>
-              </a:endParaRPr>
+              <a:r>
+                <a:rPr lang="de-AT" sz="1600" dirty="0">
+                  <a:latin typeface="Arial" panose="020B0604020202020204" pitchFamily="34" charset="0"/>
+                  <a:cs typeface="Arial" panose="020B0604020202020204" pitchFamily="34" charset="0"/>
+                </a:rPr>
+                <a:t> [0..1]</a:t>
+              </a:r>
             </a:p>
             <a:p>
               <a:r>
@@ -43680,10 +43627,13 @@
                 </a:rPr>
                 <a:t>comment</a:t>
               </a:r>
-              <a:endParaRPr lang="de-AT" sz="1600" dirty="0">
-                <a:latin typeface="Arial" panose="020B0604020202020204" pitchFamily="34" charset="0"/>
-                <a:cs typeface="Arial" panose="020B0604020202020204" pitchFamily="34" charset="0"/>
-              </a:endParaRPr>
+              <a:r>
+                <a:rPr lang="de-AT" sz="1600" dirty="0">
+                  <a:latin typeface="Arial" panose="020B0604020202020204" pitchFamily="34" charset="0"/>
+                  <a:cs typeface="Arial" panose="020B0604020202020204" pitchFamily="34" charset="0"/>
+                </a:rPr>
+                <a:t> [0..1]</a:t>
+              </a:r>
             </a:p>
           </p:txBody>
         </p:sp>
@@ -43702,8 +43652,8 @@
         </p:nvGrpSpPr>
         <p:grpSpPr>
           <a:xfrm>
-            <a:off x="48339" y="104212"/>
-            <a:ext cx="1578362" cy="1106707"/>
+            <a:off x="48338" y="626719"/>
+            <a:ext cx="1863315" cy="1106707"/>
             <a:chOff x="3484880" y="609600"/>
             <a:chExt cx="2529840" cy="713082"/>
           </a:xfrm>
@@ -43782,8 +43732,8 @@
           </p:nvSpPr>
           <p:spPr>
             <a:xfrm>
-              <a:off x="3484880" y="835625"/>
-              <a:ext cx="2529840" cy="487057"/>
+              <a:off x="3484880" y="841558"/>
+              <a:ext cx="2529840" cy="481124"/>
             </a:xfrm>
             <a:prstGeom prst="rect">
               <a:avLst/>
@@ -43831,10 +43781,13 @@
                 </a:rPr>
                 <a:t>scheme</a:t>
               </a:r>
-              <a:endParaRPr lang="de-AT" sz="1600" dirty="0">
-                <a:latin typeface="Arial" panose="020B0604020202020204" pitchFamily="34" charset="0"/>
-                <a:cs typeface="Arial" panose="020B0604020202020204" pitchFamily="34" charset="0"/>
-              </a:endParaRPr>
+              <a:r>
+                <a:rPr lang="de-AT" sz="1600" dirty="0">
+                  <a:latin typeface="Arial" panose="020B0604020202020204" pitchFamily="34" charset="0"/>
+                  <a:cs typeface="Arial" panose="020B0604020202020204" pitchFamily="34" charset="0"/>
+                </a:rPr>
+                <a:t> [1]</a:t>
+              </a:r>
             </a:p>
             <a:p>
               <a:r>
@@ -43851,10 +43804,13 @@
                 </a:rPr>
                 <a:t>path</a:t>
               </a:r>
-              <a:endParaRPr lang="de-AT" sz="1600" dirty="0">
-                <a:latin typeface="Arial" panose="020B0604020202020204" pitchFamily="34" charset="0"/>
-                <a:cs typeface="Arial" panose="020B0604020202020204" pitchFamily="34" charset="0"/>
-              </a:endParaRPr>
+              <a:r>
+                <a:rPr lang="de-AT" sz="1600" dirty="0">
+                  <a:latin typeface="Arial" panose="020B0604020202020204" pitchFamily="34" charset="0"/>
+                  <a:cs typeface="Arial" panose="020B0604020202020204" pitchFamily="34" charset="0"/>
+                </a:rPr>
+                <a:t> [1]</a:t>
+              </a:r>
             </a:p>
             <a:p>
               <a:r>
@@ -43878,10 +43834,13 @@
                 </a:rPr>
                 <a:t>version</a:t>
               </a:r>
-              <a:endParaRPr lang="de-AT" sz="1600" dirty="0">
-                <a:latin typeface="Arial" panose="020B0604020202020204" pitchFamily="34" charset="0"/>
-                <a:cs typeface="Arial" panose="020B0604020202020204" pitchFamily="34" charset="0"/>
-              </a:endParaRPr>
+              <a:r>
+                <a:rPr lang="de-AT" sz="1600" dirty="0">
+                  <a:latin typeface="Arial" panose="020B0604020202020204" pitchFamily="34" charset="0"/>
+                  <a:cs typeface="Arial" panose="020B0604020202020204" pitchFamily="34" charset="0"/>
+                </a:rPr>
+                <a:t> [1]</a:t>
+              </a:r>
             </a:p>
           </p:txBody>
         </p:sp>
@@ -43904,12 +43863,12 @@
         </p:nvCxnSpPr>
         <p:spPr>
           <a:xfrm rot="16200000" flipH="1" flipV="1">
-            <a:off x="5855046" y="438867"/>
-            <a:ext cx="205106" cy="632461"/>
+            <a:off x="5864630" y="476906"/>
+            <a:ext cx="281187" cy="632461"/>
           </a:xfrm>
           <a:prstGeom prst="bentConnector4">
             <a:avLst>
-              <a:gd name="adj1" fmla="val -111455"/>
+              <a:gd name="adj1" fmla="val -101622"/>
               <a:gd name="adj2" fmla="val 136145"/>
             </a:avLst>
           </a:prstGeom>
@@ -43939,8 +43898,8 @@
         </p:nvGrpSpPr>
         <p:grpSpPr>
           <a:xfrm>
-            <a:off x="10442615" y="3261625"/>
-            <a:ext cx="1640474" cy="809285"/>
+            <a:off x="10553213" y="3261776"/>
+            <a:ext cx="1499669" cy="809285"/>
             <a:chOff x="3484880" y="615373"/>
             <a:chExt cx="2879997" cy="656441"/>
           </a:xfrm>
@@ -44023,8 +43982,8 @@
           </p:nvSpPr>
           <p:spPr>
             <a:xfrm>
-              <a:off x="3484880" y="955562"/>
-              <a:ext cx="2879997" cy="316252"/>
+              <a:off x="3484880" y="947478"/>
+              <a:ext cx="2879997" cy="324336"/>
             </a:xfrm>
             <a:prstGeom prst="rect">
               <a:avLst/>
@@ -44055,7 +44014,7 @@
             </a:fontRef>
           </p:style>
           <p:txBody>
-            <a:bodyPr rtlCol="0" anchor="ctr"/>
+            <a:bodyPr lIns="36000" rIns="36000" rtlCol="0" anchor="ctr"/>
             <a:lstStyle/>
             <a:p>
               <a:r>
@@ -44072,10 +44031,13 @@
                 </a:rPr>
                 <a:t>name</a:t>
               </a:r>
-              <a:endParaRPr lang="de-AT" sz="1600" dirty="0">
-                <a:latin typeface="Arial" panose="020B0604020202020204" pitchFamily="34" charset="0"/>
-                <a:cs typeface="Arial" panose="020B0604020202020204" pitchFamily="34" charset="0"/>
-              </a:endParaRPr>
+              <a:r>
+                <a:rPr lang="de-AT" sz="1600" dirty="0">
+                  <a:latin typeface="Arial" panose="020B0604020202020204" pitchFamily="34" charset="0"/>
+                  <a:cs typeface="Arial" panose="020B0604020202020204" pitchFamily="34" charset="0"/>
+                </a:rPr>
+                <a:t> [1]</a:t>
+              </a:r>
             </a:p>
           </p:txBody>
         </p:sp>
@@ -44094,8 +44056,8 @@
         </p:nvSpPr>
         <p:spPr>
           <a:xfrm>
-            <a:off x="5409111" y="154354"/>
-            <a:ext cx="1159292" cy="307777"/>
+            <a:off x="5020961" y="325815"/>
+            <a:ext cx="1208985" cy="307777"/>
           </a:xfrm>
           <a:prstGeom prst="rect">
             <a:avLst/>
@@ -44120,7 +44082,7 @@
           <a:p>
             <a:r>
               <a:rPr lang="de-AT" dirty="0"/>
-              <a:t>0..2 </a:t>
+              <a:t>0..2  </a:t>
             </a:r>
             <a:r>
               <a:rPr lang="de-AT" dirty="0" err="1"/>
@@ -44142,14 +44104,13 @@
           <p:cNvCxnSpPr>
             <a:cxnSpLocks/>
             <a:stCxn id="58" idx="0"/>
-            <a:endCxn id="9" idx="3"/>
           </p:cNvCxnSpPr>
           <p:nvPr/>
         </p:nvCxnSpPr>
         <p:spPr>
           <a:xfrm rot="16200000" flipV="1">
-            <a:off x="7882584" y="-118643"/>
-            <a:ext cx="2403974" cy="4356562"/>
+            <a:off x="7994387" y="-233753"/>
+            <a:ext cx="2455057" cy="4536000"/>
           </a:xfrm>
           <a:prstGeom prst="bentConnector2">
             <a:avLst/>
@@ -44222,31 +44183,81 @@
           </a:p>
         </p:txBody>
       </p:sp>
+      <p:sp>
+        <p:nvSpPr>
+          <p:cNvPr id="75" name="Textfeld 74">
+            <a:extLst>
+              <a:ext uri="{FF2B5EF4-FFF2-40B4-BE49-F238E27FC236}">
+                <a16:creationId xmlns:a16="http://schemas.microsoft.com/office/drawing/2014/main" id="{4548FF3D-AD0D-4073-9ED5-09FF47FA0C8F}"/>
+              </a:ext>
+            </a:extLst>
+          </p:cNvPr>
+          <p:cNvSpPr txBox="1"/>
+          <p:nvPr/>
+        </p:nvSpPr>
+        <p:spPr>
+          <a:xfrm>
+            <a:off x="7466612" y="4600663"/>
+            <a:ext cx="979755" cy="523220"/>
+          </a:xfrm>
+          <a:prstGeom prst="rect">
+            <a:avLst/>
+          </a:prstGeom>
+          <a:noFill/>
+        </p:spPr>
+        <p:txBody>
+          <a:bodyPr wrap="none" rtlCol="0">
+            <a:spAutoFit/>
+          </a:bodyPr>
+          <a:lstStyle>
+            <a:defPPr>
+              <a:defRPr lang="de-DE"/>
+            </a:defPPr>
+            <a:lvl1pPr>
+              <a:defRPr sz="1400">
+                <a:latin typeface="Arial" panose="020B0604020202020204" pitchFamily="34" charset="0"/>
+                <a:cs typeface="Arial" panose="020B0604020202020204" pitchFamily="34" charset="0"/>
+              </a:defRPr>
+            </a:lvl1pPr>
+          </a:lstStyle>
+          <a:p>
+            <a:r>
+              <a:rPr lang="de-AT" dirty="0"/>
+              <a:t>0..300 </a:t>
+            </a:r>
+            <a:br>
+              <a:rPr lang="de-AT" dirty="0"/>
+            </a:br>
+            <a:r>
+              <a:rPr lang="de-AT" dirty="0" err="1"/>
+              <a:t>properties</a:t>
+            </a:r>
+            <a:endParaRPr lang="de-AT" dirty="0"/>
+          </a:p>
+        </p:txBody>
+      </p:sp>
       <p:cxnSp>
         <p:nvCxnSpPr>
-          <p:cNvPr id="69" name="Verbinder: gewinkelt 171">
-            <a:extLst>
-              <a:ext uri="{FF2B5EF4-FFF2-40B4-BE49-F238E27FC236}">
-                <a16:creationId xmlns:a16="http://schemas.microsoft.com/office/drawing/2014/main" id="{1475F4F0-BFC7-4C17-80DD-DC7B8FA84539}"/>
+          <p:cNvPr id="77" name="Verbinder: gewinkelt 171">
+            <a:extLst>
+              <a:ext uri="{FF2B5EF4-FFF2-40B4-BE49-F238E27FC236}">
+                <a16:creationId xmlns:a16="http://schemas.microsoft.com/office/drawing/2014/main" id="{6E9F8B5E-BDA9-4CA5-AA27-750D0E3A3C02}"/>
               </a:ext>
             </a:extLst>
           </p:cNvPr>
           <p:cNvCxnSpPr>
             <a:cxnSpLocks/>
-            <a:stCxn id="76" idx="2"/>
-            <a:endCxn id="19" idx="3"/>
+            <a:stCxn id="21" idx="0"/>
           </p:cNvCxnSpPr>
           <p:nvPr/>
         </p:nvCxnSpPr>
         <p:spPr>
-          <a:xfrm rot="10800000" flipV="1">
-            <a:off x="7057108" y="4189486"/>
-            <a:ext cx="814162" cy="2186"/>
-          </a:xfrm>
-          <a:prstGeom prst="bentConnector3">
-            <a:avLst>
-              <a:gd name="adj1" fmla="val 50000"/>
-            </a:avLst>
+          <a:xfrm rot="16200000" flipV="1">
+            <a:off x="7222079" y="831776"/>
+            <a:ext cx="2160000" cy="2700000"/>
+          </a:xfrm>
+          <a:prstGeom prst="bentConnector2">
+            <a:avLst/>
           </a:prstGeom>
           <a:noFill/>
           <a:ln w="12700" cap="flat" cmpd="sng">
@@ -44262,10 +44273,10 @@
       </p:cxnSp>
       <p:sp>
         <p:nvSpPr>
-          <p:cNvPr id="75" name="Textfeld 74">
-            <a:extLst>
-              <a:ext uri="{FF2B5EF4-FFF2-40B4-BE49-F238E27FC236}">
-                <a16:creationId xmlns:a16="http://schemas.microsoft.com/office/drawing/2014/main" id="{4548FF3D-AD0D-4073-9ED5-09FF47FA0C8F}"/>
+          <p:cNvPr id="84" name="Textfeld 83">
+            <a:extLst>
+              <a:ext uri="{FF2B5EF4-FFF2-40B4-BE49-F238E27FC236}">
+                <a16:creationId xmlns:a16="http://schemas.microsoft.com/office/drawing/2014/main" id="{7A2B20B6-EEC4-4B37-AC92-1D5CAFB528B6}"/>
               </a:ext>
             </a:extLst>
           </p:cNvPr>
@@ -44274,8 +44285,8 @@
         </p:nvSpPr>
         <p:spPr>
           <a:xfrm>
-            <a:off x="7054187" y="3632756"/>
-            <a:ext cx="979755" cy="523220"/>
+            <a:off x="6284286" y="1438803"/>
+            <a:ext cx="1810837" cy="307777"/>
           </a:xfrm>
           <a:prstGeom prst="rect">
             <a:avLst/>
@@ -44300,95 +44311,6 @@
           <a:p>
             <a:r>
               <a:rPr lang="de-AT" dirty="0"/>
-              <a:t>0..300 </a:t>
-            </a:r>
-            <a:br>
-              <a:rPr lang="de-AT" dirty="0"/>
-            </a:br>
-            <a:r>
-              <a:rPr lang="de-AT" dirty="0" err="1"/>
-              <a:t>properties</a:t>
-            </a:r>
-            <a:endParaRPr lang="de-AT" dirty="0"/>
-          </a:p>
-        </p:txBody>
-      </p:sp>
-      <p:cxnSp>
-        <p:nvCxnSpPr>
-          <p:cNvPr id="77" name="Verbinder: gewinkelt 171">
-            <a:extLst>
-              <a:ext uri="{FF2B5EF4-FFF2-40B4-BE49-F238E27FC236}">
-                <a16:creationId xmlns:a16="http://schemas.microsoft.com/office/drawing/2014/main" id="{6E9F8B5E-BDA9-4CA5-AA27-750D0E3A3C02}"/>
-              </a:ext>
-            </a:extLst>
-          </p:cNvPr>
-          <p:cNvCxnSpPr>
-            <a:cxnSpLocks/>
-            <a:stCxn id="21" idx="0"/>
-            <a:endCxn id="10" idx="3"/>
-          </p:cNvCxnSpPr>
-          <p:nvPr/>
-        </p:nvCxnSpPr>
-        <p:spPr>
-          <a:xfrm rot="16200000" flipV="1">
-            <a:off x="6961017" y="1071143"/>
-            <a:ext cx="2135906" cy="2245359"/>
-          </a:xfrm>
-          <a:prstGeom prst="bentConnector2">
-            <a:avLst/>
-          </a:prstGeom>
-          <a:noFill/>
-          <a:ln w="12700" cap="flat" cmpd="sng">
-            <a:solidFill>
-              <a:schemeClr val="dk1"/>
-            </a:solidFill>
-            <a:prstDash val="solid"/>
-            <a:miter lim="800000"/>
-            <a:headEnd type="none" w="sm" len="sm"/>
-            <a:tailEnd type="triangle" w="lg" len="lg"/>
-          </a:ln>
-        </p:spPr>
-      </p:cxnSp>
-      <p:sp>
-        <p:nvSpPr>
-          <p:cNvPr id="84" name="Textfeld 83">
-            <a:extLst>
-              <a:ext uri="{FF2B5EF4-FFF2-40B4-BE49-F238E27FC236}">
-                <a16:creationId xmlns:a16="http://schemas.microsoft.com/office/drawing/2014/main" id="{7A2B20B6-EEC4-4B37-AC92-1D5CAFB528B6}"/>
-              </a:ext>
-            </a:extLst>
-          </p:cNvPr>
-          <p:cNvSpPr txBox="1"/>
-          <p:nvPr/>
-        </p:nvSpPr>
-        <p:spPr>
-          <a:xfrm>
-            <a:off x="6284286" y="1438803"/>
-            <a:ext cx="1810837" cy="307777"/>
-          </a:xfrm>
-          <a:prstGeom prst="rect">
-            <a:avLst/>
-          </a:prstGeom>
-          <a:noFill/>
-        </p:spPr>
-        <p:txBody>
-          <a:bodyPr wrap="none" rtlCol="0">
-            <a:spAutoFit/>
-          </a:bodyPr>
-          <a:lstStyle>
-            <a:defPPr>
-              <a:defRPr lang="de-DE"/>
-            </a:defPPr>
-            <a:lvl1pPr>
-              <a:defRPr sz="1400">
-                <a:latin typeface="Arial" panose="020B0604020202020204" pitchFamily="34" charset="0"/>
-                <a:cs typeface="Arial" panose="020B0604020202020204" pitchFamily="34" charset="0"/>
-              </a:defRPr>
-            </a:lvl1pPr>
-          </a:lstStyle>
-          <a:p>
-            <a:r>
-              <a:rPr lang="de-AT" dirty="0"/>
               <a:t>[0..*] </a:t>
             </a:r>
             <a:r>
@@ -44399,128 +44321,6 @@
           </a:p>
         </p:txBody>
       </p:sp>
-      <p:cxnSp>
-        <p:nvCxnSpPr>
-          <p:cNvPr id="87" name="Verbinder: gewinkelt 171">
-            <a:extLst>
-              <a:ext uri="{FF2B5EF4-FFF2-40B4-BE49-F238E27FC236}">
-                <a16:creationId xmlns:a16="http://schemas.microsoft.com/office/drawing/2014/main" id="{9AED0297-CF91-42E1-8095-A18F3366EA07}"/>
-              </a:ext>
-            </a:extLst>
-          </p:cNvPr>
-          <p:cNvCxnSpPr>
-            <a:cxnSpLocks/>
-            <a:stCxn id="21" idx="0"/>
-            <a:endCxn id="42" idx="2"/>
-          </p:cNvCxnSpPr>
-          <p:nvPr/>
-        </p:nvCxnSpPr>
-        <p:spPr>
-          <a:xfrm rot="16200000" flipV="1">
-            <a:off x="7265957" y="1376084"/>
-            <a:ext cx="872609" cy="2898776"/>
-          </a:xfrm>
-          <a:prstGeom prst="bentConnector3">
-            <a:avLst>
-              <a:gd name="adj1" fmla="val 50000"/>
-            </a:avLst>
-          </a:prstGeom>
-          <a:noFill/>
-          <a:ln w="12700" cap="flat" cmpd="sng">
-            <a:solidFill>
-              <a:schemeClr val="dk1"/>
-            </a:solidFill>
-            <a:prstDash val="solid"/>
-            <a:miter lim="800000"/>
-            <a:headEnd type="none" w="sm" len="sm"/>
-            <a:tailEnd type="triangle" w="lg" len="lg"/>
-          </a:ln>
-        </p:spPr>
-      </p:cxnSp>
-      <p:cxnSp>
-        <p:nvCxnSpPr>
-          <p:cNvPr id="90" name="Verbinder: gewinkelt 171">
-            <a:extLst>
-              <a:ext uri="{FF2B5EF4-FFF2-40B4-BE49-F238E27FC236}">
-                <a16:creationId xmlns:a16="http://schemas.microsoft.com/office/drawing/2014/main" id="{0FD7BDC1-BAA5-4A2F-AB93-C1ECFDA7B4D9}"/>
-              </a:ext>
-            </a:extLst>
-          </p:cNvPr>
-          <p:cNvCxnSpPr>
-            <a:cxnSpLocks/>
-            <a:stCxn id="73" idx="0"/>
-            <a:endCxn id="42" idx="2"/>
-          </p:cNvCxnSpPr>
-          <p:nvPr/>
-        </p:nvCxnSpPr>
-        <p:spPr>
-          <a:xfrm rot="5400000" flipH="1" flipV="1">
-            <a:off x="4631384" y="1642116"/>
-            <a:ext cx="874438" cy="2368540"/>
-          </a:xfrm>
-          <a:prstGeom prst="bentConnector3">
-            <a:avLst>
-              <a:gd name="adj1" fmla="val 50000"/>
-            </a:avLst>
-          </a:prstGeom>
-          <a:ln>
-            <a:headEnd type="none" w="med" len="med"/>
-            <a:tailEnd type="triangle" w="med" len="med"/>
-          </a:ln>
-        </p:spPr>
-        <p:style>
-          <a:lnRef idx="1">
-            <a:schemeClr val="dk1"/>
-          </a:lnRef>
-          <a:fillRef idx="0">
-            <a:schemeClr val="dk1"/>
-          </a:fillRef>
-          <a:effectRef idx="0">
-            <a:schemeClr val="dk1"/>
-          </a:effectRef>
-          <a:fontRef idx="minor">
-            <a:schemeClr val="tx1"/>
-          </a:fontRef>
-        </p:style>
-      </p:cxnSp>
-      <p:cxnSp>
-        <p:nvCxnSpPr>
-          <p:cNvPr id="95" name="Verbinder: gewinkelt 171">
-            <a:extLst>
-              <a:ext uri="{FF2B5EF4-FFF2-40B4-BE49-F238E27FC236}">
-                <a16:creationId xmlns:a16="http://schemas.microsoft.com/office/drawing/2014/main" id="{E804D7E0-C58A-4F4B-8AD5-19ABE26F4E15}"/>
-              </a:ext>
-            </a:extLst>
-          </p:cNvPr>
-          <p:cNvCxnSpPr>
-            <a:cxnSpLocks/>
-            <a:stCxn id="79" idx="0"/>
-            <a:endCxn id="42" idx="2"/>
-          </p:cNvCxnSpPr>
-          <p:nvPr/>
-        </p:nvCxnSpPr>
-        <p:spPr>
-          <a:xfrm rot="5400000" flipH="1" flipV="1">
-            <a:off x="3423022" y="413633"/>
-            <a:ext cx="854317" cy="4805386"/>
-          </a:xfrm>
-          <a:prstGeom prst="bentConnector3">
-            <a:avLst>
-              <a:gd name="adj1" fmla="val 50000"/>
-            </a:avLst>
-          </a:prstGeom>
-          <a:noFill/>
-          <a:ln w="12700" cap="flat" cmpd="sng">
-            <a:solidFill>
-              <a:schemeClr val="dk1"/>
-            </a:solidFill>
-            <a:prstDash val="solid"/>
-            <a:miter lim="800000"/>
-            <a:headEnd type="none" w="sm" len="sm"/>
-            <a:tailEnd type="triangle" w="lg" len="lg"/>
-          </a:ln>
-        </p:spPr>
-      </p:cxnSp>
       <p:sp>
         <p:nvSpPr>
           <p:cNvPr id="53" name="Raute 52">
@@ -44535,7 +44335,7 @@
         </p:nvSpPr>
         <p:spPr>
           <a:xfrm rot="5400000" flipH="1">
-            <a:off x="2322601" y="709145"/>
+            <a:off x="2322601" y="1231652"/>
             <a:ext cx="180000" cy="252000"/>
           </a:xfrm>
           <a:prstGeom prst="diamond">
@@ -44576,62 +44376,24 @@
       </p:sp>
       <p:cxnSp>
         <p:nvCxnSpPr>
-          <p:cNvPr id="54" name="Verbinder: gewinkelt 171">
-            <a:extLst>
-              <a:ext uri="{FF2B5EF4-FFF2-40B4-BE49-F238E27FC236}">
-                <a16:creationId xmlns:a16="http://schemas.microsoft.com/office/drawing/2014/main" id="{FBE19B39-244D-48C7-BBF6-1C57A00F3068}"/>
+          <p:cNvPr id="63" name="Verbinder: gewinkelt 171">
+            <a:extLst>
+              <a:ext uri="{FF2B5EF4-FFF2-40B4-BE49-F238E27FC236}">
+                <a16:creationId xmlns:a16="http://schemas.microsoft.com/office/drawing/2014/main" id="{3AFD393F-4C19-4720-91EC-9C06F1902793}"/>
               </a:ext>
             </a:extLst>
           </p:cNvPr>
           <p:cNvCxnSpPr>
             <a:cxnSpLocks/>
-            <a:stCxn id="53" idx="2"/>
-            <a:endCxn id="49" idx="3"/>
-          </p:cNvCxnSpPr>
-          <p:nvPr/>
-        </p:nvCxnSpPr>
-        <p:spPr>
-          <a:xfrm rot="10800000">
-            <a:off x="1626701" y="832963"/>
-            <a:ext cx="659900" cy="2183"/>
-          </a:xfrm>
-          <a:prstGeom prst="bentConnector3">
-            <a:avLst>
-              <a:gd name="adj1" fmla="val 50000"/>
-            </a:avLst>
-          </a:prstGeom>
-          <a:noFill/>
-          <a:ln w="12700" cap="flat" cmpd="sng">
-            <a:solidFill>
-              <a:schemeClr val="dk1"/>
-            </a:solidFill>
-            <a:prstDash val="solid"/>
-            <a:miter lim="800000"/>
-            <a:headEnd type="none" w="sm" len="sm"/>
-            <a:tailEnd type="triangle" w="lg" len="lg"/>
-          </a:ln>
-        </p:spPr>
-      </p:cxnSp>
-      <p:cxnSp>
-        <p:nvCxnSpPr>
-          <p:cNvPr id="63" name="Verbinder: gewinkelt 171">
-            <a:extLst>
-              <a:ext uri="{FF2B5EF4-FFF2-40B4-BE49-F238E27FC236}">
-                <a16:creationId xmlns:a16="http://schemas.microsoft.com/office/drawing/2014/main" id="{3AFD393F-4C19-4720-91EC-9C06F1902793}"/>
-              </a:ext>
-            </a:extLst>
-          </p:cNvPr>
-          <p:cNvCxnSpPr>
-            <a:cxnSpLocks/>
-            <a:stCxn id="42" idx="1"/>
+            <a:stCxn id="40" idx="1"/>
             <a:endCxn id="55" idx="3"/>
           </p:cNvCxnSpPr>
           <p:nvPr/>
         </p:nvCxnSpPr>
         <p:spPr>
           <a:xfrm rot="10800000">
-            <a:off x="3517504" y="1388989"/>
-            <a:ext cx="1605850" cy="943519"/>
+            <a:off x="3517505" y="1901454"/>
+            <a:ext cx="1643427" cy="225271"/>
           </a:xfrm>
           <a:prstGeom prst="bentConnector2">
             <a:avLst/>
@@ -44648,82 +44410,6 @@
           </a:ln>
         </p:spPr>
       </p:cxnSp>
-      <p:cxnSp>
-        <p:nvCxnSpPr>
-          <p:cNvPr id="64" name="Verbinder: gewinkelt 171">
-            <a:extLst>
-              <a:ext uri="{FF2B5EF4-FFF2-40B4-BE49-F238E27FC236}">
-                <a16:creationId xmlns:a16="http://schemas.microsoft.com/office/drawing/2014/main" id="{58D08E3C-D786-4A0D-8FCB-5EAFAD95B101}"/>
-              </a:ext>
-            </a:extLst>
-          </p:cNvPr>
-          <p:cNvCxnSpPr>
-            <a:cxnSpLocks/>
-            <a:stCxn id="10" idx="1"/>
-            <a:endCxn id="68" idx="3"/>
-          </p:cNvCxnSpPr>
-          <p:nvPr/>
-        </p:nvCxnSpPr>
-        <p:spPr>
-          <a:xfrm rot="10800000">
-            <a:off x="4692768" y="814900"/>
-            <a:ext cx="948600" cy="310971"/>
-          </a:xfrm>
-          <a:prstGeom prst="bentConnector3">
-            <a:avLst>
-              <a:gd name="adj1" fmla="val 50000"/>
-            </a:avLst>
-          </a:prstGeom>
-          <a:noFill/>
-          <a:ln w="12700" cap="flat" cmpd="sng">
-            <a:solidFill>
-              <a:schemeClr val="dk1"/>
-            </a:solidFill>
-            <a:prstDash val="solid"/>
-            <a:miter lim="800000"/>
-            <a:headEnd type="none" w="med" len="med"/>
-            <a:tailEnd type="none" w="med" len="med"/>
-          </a:ln>
-        </p:spPr>
-      </p:cxnSp>
-      <p:cxnSp>
-        <p:nvCxnSpPr>
-          <p:cNvPr id="65" name="Verbinder: gewinkelt 171">
-            <a:extLst>
-              <a:ext uri="{FF2B5EF4-FFF2-40B4-BE49-F238E27FC236}">
-                <a16:creationId xmlns:a16="http://schemas.microsoft.com/office/drawing/2014/main" id="{F0BD5E85-E169-4E2E-99EF-B1A735B4C7B6}"/>
-              </a:ext>
-            </a:extLst>
-          </p:cNvPr>
-          <p:cNvCxnSpPr>
-            <a:cxnSpLocks/>
-            <a:stCxn id="58" idx="0"/>
-            <a:endCxn id="42" idx="2"/>
-          </p:cNvCxnSpPr>
-          <p:nvPr/>
-        </p:nvCxnSpPr>
-        <p:spPr>
-          <a:xfrm rot="16200000" flipV="1">
-            <a:off x="8321634" y="320406"/>
-            <a:ext cx="872458" cy="5009979"/>
-          </a:xfrm>
-          <a:prstGeom prst="bentConnector3">
-            <a:avLst>
-              <a:gd name="adj1" fmla="val 50000"/>
-            </a:avLst>
-          </a:prstGeom>
-          <a:noFill/>
-          <a:ln w="12700" cap="flat" cmpd="sng">
-            <a:solidFill>
-              <a:schemeClr val="dk1"/>
-            </a:solidFill>
-            <a:prstDash val="solid"/>
-            <a:miter lim="800000"/>
-            <a:headEnd type="none" w="sm" len="sm"/>
-            <a:tailEnd type="triangle" w="lg" len="lg"/>
-          </a:ln>
-        </p:spPr>
-      </p:cxnSp>
       <p:sp>
         <p:nvSpPr>
           <p:cNvPr id="67" name="Google Shape;528;g10f8d9d020d_0_26">
@@ -44738,7 +44424,7 @@
         </p:nvSpPr>
         <p:spPr>
           <a:xfrm flipH="1">
-            <a:off x="6154140" y="2406315"/>
+            <a:off x="6201765" y="2406315"/>
             <a:ext cx="200700" cy="177300"/>
           </a:xfrm>
           <a:prstGeom prst="triangle">
@@ -44808,7 +44494,7 @@
         </p:nvSpPr>
         <p:spPr>
           <a:xfrm>
-            <a:off x="1700319" y="525014"/>
+            <a:off x="1860272" y="1049847"/>
             <a:ext cx="1058790" cy="307777"/>
           </a:xfrm>
           <a:prstGeom prst="rect">
@@ -44865,7 +44551,7 @@
         </p:nvSpPr>
         <p:spPr>
           <a:xfrm flipH="1">
-            <a:off x="3417154" y="1211688"/>
+            <a:off x="3417154" y="1724153"/>
             <a:ext cx="200700" cy="177300"/>
           </a:xfrm>
           <a:prstGeom prst="triangle">
@@ -44935,7 +44621,7 @@
         </p:nvSpPr>
         <p:spPr>
           <a:xfrm rot="16200000" flipH="1">
-            <a:off x="4503768" y="726249"/>
+            <a:off x="5080380" y="1041211"/>
             <a:ext cx="200700" cy="177300"/>
           </a:xfrm>
           <a:prstGeom prst="triangle">
@@ -45261,7 +44947,7 @@
         </p:nvSpPr>
         <p:spPr>
           <a:xfrm rot="5400000" flipH="1">
-            <a:off x="7907270" y="4063486"/>
+            <a:off x="7919114" y="4338911"/>
             <a:ext cx="180000" cy="252000"/>
           </a:xfrm>
           <a:prstGeom prst="diamond">
@@ -45378,8 +45064,8 @@
         </p:nvSpPr>
         <p:spPr>
           <a:xfrm>
-            <a:off x="1170336" y="6299562"/>
-            <a:ext cx="1199330" cy="523219"/>
+            <a:off x="108911" y="6299562"/>
+            <a:ext cx="2260755" cy="395919"/>
           </a:xfrm>
           <a:prstGeom prst="rect">
             <a:avLst/>
@@ -45442,8 +45128,8 @@
         </p:nvSpPr>
         <p:spPr>
           <a:xfrm>
-            <a:off x="7451256" y="6299562"/>
-            <a:ext cx="1634536" cy="523219"/>
+            <a:off x="7451255" y="6299562"/>
+            <a:ext cx="2356557" cy="395919"/>
           </a:xfrm>
           <a:prstGeom prst="rect">
             <a:avLst/>
@@ -45485,18 +45171,12 @@
               </a:rPr>
               <a:t>Geospacial</a:t>
             </a:r>
-            <a:br>
+            <a:r>
               <a:rPr lang="de-AT" b="1" dirty="0">
                 <a:latin typeface="Arial" panose="020B0604020202020204" pitchFamily="34" charset="0"/>
                 <a:cs typeface="Arial" panose="020B0604020202020204" pitchFamily="34" charset="0"/>
               </a:rPr>
-            </a:br>
-            <a:r>
-              <a:rPr lang="de-AT" b="1" dirty="0">
-                <a:latin typeface="Arial" panose="020B0604020202020204" pitchFamily="34" charset="0"/>
-                <a:cs typeface="Arial" panose="020B0604020202020204" pitchFamily="34" charset="0"/>
-              </a:rPr>
-              <a:t>Schema</a:t>
+              <a:t> Schema</a:t>
             </a:r>
             <a:endParaRPr lang="de-AT" sz="2000" b="1" dirty="0">
               <a:latin typeface="Arial" panose="020B0604020202020204" pitchFamily="34" charset="0"/>
@@ -45745,8 +45425,8 @@
         </p:nvCxnSpPr>
         <p:spPr>
           <a:xfrm rot="5400000" flipH="1" flipV="1">
-            <a:off x="3071296" y="4413983"/>
-            <a:ext cx="584285" cy="3186874"/>
+            <a:off x="2805940" y="4148627"/>
+            <a:ext cx="584285" cy="3717586"/>
           </a:xfrm>
           <a:prstGeom prst="bentConnector3">
             <a:avLst>
@@ -45783,8 +45463,8 @@
         </p:nvCxnSpPr>
         <p:spPr>
           <a:xfrm rot="16200000" flipV="1">
-            <a:off x="6320558" y="4351595"/>
-            <a:ext cx="584285" cy="3311649"/>
+            <a:off x="6501063" y="4171090"/>
+            <a:ext cx="584285" cy="3672659"/>
           </a:xfrm>
           <a:prstGeom prst="bentConnector3">
             <a:avLst>
@@ -45870,7 +45550,7 @@
         </p:nvSpPr>
         <p:spPr>
           <a:xfrm flipH="1">
-            <a:off x="3792588" y="4571549"/>
+            <a:off x="3792588" y="4714770"/>
             <a:ext cx="180000" cy="252000"/>
           </a:xfrm>
           <a:prstGeom prst="diamond">
@@ -45963,8 +45643,8 @@
         </p:nvCxnSpPr>
         <p:spPr>
           <a:xfrm rot="16200000" flipH="1">
-            <a:off x="3864340" y="4841797"/>
-            <a:ext cx="526501" cy="490004"/>
+            <a:off x="3935950" y="4913408"/>
+            <a:ext cx="383280" cy="490004"/>
           </a:xfrm>
           <a:prstGeom prst="bentConnector2">
             <a:avLst/>
@@ -46085,8 +45765,8 @@
         </p:nvSpPr>
         <p:spPr>
           <a:xfrm>
-            <a:off x="9457929" y="6299561"/>
-            <a:ext cx="1199330" cy="523219"/>
+            <a:off x="10057922" y="6289656"/>
+            <a:ext cx="2025166" cy="405825"/>
           </a:xfrm>
           <a:prstGeom prst="rect">
             <a:avLst/>
@@ -46153,8 +45833,8 @@
         </p:nvCxnSpPr>
         <p:spPr>
           <a:xfrm rot="16200000" flipV="1">
-            <a:off x="7215093" y="3457059"/>
-            <a:ext cx="584284" cy="5100719"/>
+            <a:off x="7726501" y="2945652"/>
+            <a:ext cx="574379" cy="6113630"/>
           </a:xfrm>
           <a:prstGeom prst="bentConnector3">
             <a:avLst>
@@ -46172,6 +45852,376 @@
             <a:tailEnd type="none" w="med" len="med"/>
           </a:ln>
         </p:spPr>
+      </p:cxnSp>
+      <p:cxnSp>
+        <p:nvCxnSpPr>
+          <p:cNvPr id="4" name="Gerader Verbinder 3">
+            <a:extLst>
+              <a:ext uri="{FF2B5EF4-FFF2-40B4-BE49-F238E27FC236}">
+                <a16:creationId xmlns:a16="http://schemas.microsoft.com/office/drawing/2014/main" id="{C6EE3B27-1840-4065-9379-6FD7EBBA8535}"/>
+              </a:ext>
+            </a:extLst>
+          </p:cNvPr>
+          <p:cNvCxnSpPr>
+            <a:cxnSpLocks/>
+            <a:stCxn id="68" idx="3"/>
+          </p:cNvCxnSpPr>
+          <p:nvPr/>
+        </p:nvCxnSpPr>
+        <p:spPr>
+          <a:xfrm flipV="1">
+            <a:off x="5269380" y="1125869"/>
+            <a:ext cx="419612" cy="3992"/>
+          </a:xfrm>
+          <a:prstGeom prst="line">
+            <a:avLst/>
+          </a:prstGeom>
+          <a:ln w="9525">
+            <a:solidFill>
+              <a:schemeClr val="tx1"/>
+            </a:solidFill>
+          </a:ln>
+        </p:spPr>
+        <p:style>
+          <a:lnRef idx="1">
+            <a:schemeClr val="accent1"/>
+          </a:lnRef>
+          <a:fillRef idx="0">
+            <a:schemeClr val="accent1"/>
+          </a:fillRef>
+          <a:effectRef idx="0">
+            <a:schemeClr val="accent1"/>
+          </a:effectRef>
+          <a:fontRef idx="minor">
+            <a:schemeClr val="tx1"/>
+          </a:fontRef>
+        </p:style>
+      </p:cxnSp>
+      <p:cxnSp>
+        <p:nvCxnSpPr>
+          <p:cNvPr id="15" name="Gerade Verbindung mit Pfeil 14">
+            <a:extLst>
+              <a:ext uri="{FF2B5EF4-FFF2-40B4-BE49-F238E27FC236}">
+                <a16:creationId xmlns:a16="http://schemas.microsoft.com/office/drawing/2014/main" id="{B865CA5B-B016-4E36-B4B6-75E4929FDF4B}"/>
+              </a:ext>
+            </a:extLst>
+          </p:cNvPr>
+          <p:cNvCxnSpPr>
+            <a:cxnSpLocks/>
+            <a:stCxn id="53" idx="2"/>
+            <a:endCxn id="49" idx="3"/>
+          </p:cNvCxnSpPr>
+          <p:nvPr/>
+        </p:nvCxnSpPr>
+        <p:spPr>
+          <a:xfrm flipH="1">
+            <a:off x="1911653" y="1357652"/>
+            <a:ext cx="374948" cy="2421"/>
+          </a:xfrm>
+          <a:prstGeom prst="straightConnector1">
+            <a:avLst/>
+          </a:prstGeom>
+          <a:noFill/>
+          <a:ln w="12700" cap="flat" cmpd="sng">
+            <a:solidFill>
+              <a:schemeClr val="dk1"/>
+            </a:solidFill>
+            <a:prstDash val="solid"/>
+            <a:miter lim="800000"/>
+            <a:headEnd type="none" w="sm" len="sm"/>
+            <a:tailEnd type="triangle" w="lg" len="lg"/>
+          </a:ln>
+        </p:spPr>
+      </p:cxnSp>
+      <p:cxnSp>
+        <p:nvCxnSpPr>
+          <p:cNvPr id="100" name="Gerade Verbindung mit Pfeil 99">
+            <a:extLst>
+              <a:ext uri="{FF2B5EF4-FFF2-40B4-BE49-F238E27FC236}">
+                <a16:creationId xmlns:a16="http://schemas.microsoft.com/office/drawing/2014/main" id="{52E03E66-5219-48E0-BD5F-7CEC05C83F9B}"/>
+              </a:ext>
+            </a:extLst>
+          </p:cNvPr>
+          <p:cNvCxnSpPr>
+            <a:cxnSpLocks/>
+            <a:stCxn id="85" idx="2"/>
+            <a:endCxn id="40" idx="0"/>
+          </p:cNvCxnSpPr>
+          <p:nvPr/>
+        </p:nvCxnSpPr>
+        <p:spPr>
+          <a:xfrm flipH="1">
+            <a:off x="6290450" y="1475584"/>
+            <a:ext cx="2270" cy="369954"/>
+          </a:xfrm>
+          <a:prstGeom prst="straightConnector1">
+            <a:avLst/>
+          </a:prstGeom>
+          <a:noFill/>
+          <a:ln w="12700" cap="flat" cmpd="sng">
+            <a:solidFill>
+              <a:schemeClr val="dk1"/>
+            </a:solidFill>
+            <a:prstDash val="solid"/>
+            <a:miter lim="800000"/>
+            <a:headEnd type="none" w="sm" len="sm"/>
+            <a:tailEnd type="triangle" w="lg" len="lg"/>
+          </a:ln>
+        </p:spPr>
+      </p:cxnSp>
+      <p:cxnSp>
+        <p:nvCxnSpPr>
+          <p:cNvPr id="101" name="Gerade Verbindung mit Pfeil 100">
+            <a:extLst>
+              <a:ext uri="{FF2B5EF4-FFF2-40B4-BE49-F238E27FC236}">
+                <a16:creationId xmlns:a16="http://schemas.microsoft.com/office/drawing/2014/main" id="{F862A858-2E9B-410C-B222-1567802BA8C0}"/>
+              </a:ext>
+            </a:extLst>
+          </p:cNvPr>
+          <p:cNvCxnSpPr>
+            <a:cxnSpLocks/>
+            <a:stCxn id="76" idx="2"/>
+          </p:cNvCxnSpPr>
+          <p:nvPr/>
+        </p:nvCxnSpPr>
+        <p:spPr>
+          <a:xfrm flipH="1">
+            <a:off x="7530095" y="4464911"/>
+            <a:ext cx="353019" cy="0"/>
+          </a:xfrm>
+          <a:prstGeom prst="straightConnector1">
+            <a:avLst/>
+          </a:prstGeom>
+          <a:noFill/>
+          <a:ln w="12700" cap="flat" cmpd="sng">
+            <a:solidFill>
+              <a:schemeClr val="dk1"/>
+            </a:solidFill>
+            <a:prstDash val="solid"/>
+            <a:miter lim="800000"/>
+            <a:headEnd type="none" w="sm" len="sm"/>
+            <a:tailEnd type="triangle" w="lg" len="lg"/>
+          </a:ln>
+        </p:spPr>
+      </p:cxnSp>
+      <p:cxnSp>
+        <p:nvCxnSpPr>
+          <p:cNvPr id="41" name="Verbinder: gewinkelt 40">
+            <a:extLst>
+              <a:ext uri="{FF2B5EF4-FFF2-40B4-BE49-F238E27FC236}">
+                <a16:creationId xmlns:a16="http://schemas.microsoft.com/office/drawing/2014/main" id="{1EE84E90-F65F-423C-B9A3-05260AF08517}"/>
+              </a:ext>
+            </a:extLst>
+          </p:cNvPr>
+          <p:cNvCxnSpPr>
+            <a:cxnSpLocks/>
+            <a:stCxn id="79" idx="0"/>
+          </p:cNvCxnSpPr>
+          <p:nvPr/>
+        </p:nvCxnSpPr>
+        <p:spPr>
+          <a:xfrm rot="5400000" flipH="1" flipV="1">
+            <a:off x="3699946" y="660601"/>
+            <a:ext cx="348717" cy="4853635"/>
+          </a:xfrm>
+          <a:prstGeom prst="bentConnector2">
+            <a:avLst/>
+          </a:prstGeom>
+          <a:ln w="9525">
+            <a:solidFill>
+              <a:schemeClr val="tx1"/>
+            </a:solidFill>
+          </a:ln>
+        </p:spPr>
+        <p:style>
+          <a:lnRef idx="1">
+            <a:schemeClr val="accent1"/>
+          </a:lnRef>
+          <a:fillRef idx="0">
+            <a:schemeClr val="accent1"/>
+          </a:fillRef>
+          <a:effectRef idx="0">
+            <a:schemeClr val="accent1"/>
+          </a:effectRef>
+          <a:fontRef idx="minor">
+            <a:schemeClr val="tx1"/>
+          </a:fontRef>
+        </p:style>
+      </p:cxnSp>
+      <p:cxnSp>
+        <p:nvCxnSpPr>
+          <p:cNvPr id="106" name="Gerader Verbinder 105">
+            <a:extLst>
+              <a:ext uri="{FF2B5EF4-FFF2-40B4-BE49-F238E27FC236}">
+                <a16:creationId xmlns:a16="http://schemas.microsoft.com/office/drawing/2014/main" id="{B5663393-7859-41F6-A68B-3E4DD307DF72}"/>
+              </a:ext>
+            </a:extLst>
+          </p:cNvPr>
+          <p:cNvCxnSpPr>
+            <a:cxnSpLocks/>
+            <a:stCxn id="73" idx="0"/>
+          </p:cNvCxnSpPr>
+          <p:nvPr/>
+        </p:nvCxnSpPr>
+        <p:spPr>
+          <a:xfrm flipV="1">
+            <a:off x="3941485" y="2922697"/>
+            <a:ext cx="0" cy="340908"/>
+          </a:xfrm>
+          <a:prstGeom prst="line">
+            <a:avLst/>
+          </a:prstGeom>
+          <a:ln w="9525">
+            <a:solidFill>
+              <a:schemeClr val="tx1"/>
+            </a:solidFill>
+          </a:ln>
+        </p:spPr>
+        <p:style>
+          <a:lnRef idx="1">
+            <a:schemeClr val="accent1"/>
+          </a:lnRef>
+          <a:fillRef idx="0">
+            <a:schemeClr val="accent1"/>
+          </a:fillRef>
+          <a:effectRef idx="0">
+            <a:schemeClr val="accent1"/>
+          </a:effectRef>
+          <a:fontRef idx="minor">
+            <a:schemeClr val="tx1"/>
+          </a:fontRef>
+        </p:style>
+      </p:cxnSp>
+      <p:cxnSp>
+        <p:nvCxnSpPr>
+          <p:cNvPr id="114" name="Gerader Verbinder 113">
+            <a:extLst>
+              <a:ext uri="{FF2B5EF4-FFF2-40B4-BE49-F238E27FC236}">
+                <a16:creationId xmlns:a16="http://schemas.microsoft.com/office/drawing/2014/main" id="{4A1394B0-5747-4414-BE86-7DBF096A4C58}"/>
+              </a:ext>
+            </a:extLst>
+          </p:cNvPr>
+          <p:cNvCxnSpPr>
+            <a:cxnSpLocks/>
+          </p:cNvCxnSpPr>
+          <p:nvPr/>
+        </p:nvCxnSpPr>
+        <p:spPr>
+          <a:xfrm flipV="1">
+            <a:off x="6301122" y="2583615"/>
+            <a:ext cx="993" cy="685186"/>
+          </a:xfrm>
+          <a:prstGeom prst="line">
+            <a:avLst/>
+          </a:prstGeom>
+          <a:ln w="9525">
+            <a:solidFill>
+              <a:schemeClr val="tx1"/>
+            </a:solidFill>
+          </a:ln>
+        </p:spPr>
+        <p:style>
+          <a:lnRef idx="1">
+            <a:schemeClr val="accent1"/>
+          </a:lnRef>
+          <a:fillRef idx="0">
+            <a:schemeClr val="accent1"/>
+          </a:fillRef>
+          <a:effectRef idx="0">
+            <a:schemeClr val="accent1"/>
+          </a:effectRef>
+          <a:fontRef idx="minor">
+            <a:schemeClr val="tx1"/>
+          </a:fontRef>
+        </p:style>
+      </p:cxnSp>
+      <p:cxnSp>
+        <p:nvCxnSpPr>
+          <p:cNvPr id="122" name="Verbinder: gewinkelt 121">
+            <a:extLst>
+              <a:ext uri="{FF2B5EF4-FFF2-40B4-BE49-F238E27FC236}">
+                <a16:creationId xmlns:a16="http://schemas.microsoft.com/office/drawing/2014/main" id="{1DD36799-6194-4E5B-99CF-206E6A3BEC18}"/>
+              </a:ext>
+            </a:extLst>
+          </p:cNvPr>
+          <p:cNvCxnSpPr>
+            <a:cxnSpLocks/>
+            <a:endCxn id="21" idx="0"/>
+          </p:cNvCxnSpPr>
+          <p:nvPr/>
+        </p:nvCxnSpPr>
+        <p:spPr>
+          <a:xfrm>
+            <a:off x="6284286" y="2913058"/>
+            <a:ext cx="3001319" cy="348718"/>
+          </a:xfrm>
+          <a:prstGeom prst="bentConnector2">
+            <a:avLst/>
+          </a:prstGeom>
+          <a:ln w="9525">
+            <a:solidFill>
+              <a:schemeClr val="tx1"/>
+            </a:solidFill>
+          </a:ln>
+        </p:spPr>
+        <p:style>
+          <a:lnRef idx="1">
+            <a:schemeClr val="accent1"/>
+          </a:lnRef>
+          <a:fillRef idx="0">
+            <a:schemeClr val="accent1"/>
+          </a:fillRef>
+          <a:effectRef idx="0">
+            <a:schemeClr val="accent1"/>
+          </a:effectRef>
+          <a:fontRef idx="minor">
+            <a:schemeClr val="tx1"/>
+          </a:fontRef>
+        </p:style>
+      </p:cxnSp>
+      <p:cxnSp>
+        <p:nvCxnSpPr>
+          <p:cNvPr id="125" name="Verbinder: gewinkelt 124">
+            <a:extLst>
+              <a:ext uri="{FF2B5EF4-FFF2-40B4-BE49-F238E27FC236}">
+                <a16:creationId xmlns:a16="http://schemas.microsoft.com/office/drawing/2014/main" id="{9A369EFA-D0DF-48A7-9231-14E9AC828C51}"/>
+              </a:ext>
+            </a:extLst>
+          </p:cNvPr>
+          <p:cNvCxnSpPr>
+            <a:cxnSpLocks/>
+            <a:endCxn id="58" idx="0"/>
+          </p:cNvCxnSpPr>
+          <p:nvPr/>
+        </p:nvCxnSpPr>
+        <p:spPr>
+          <a:xfrm>
+            <a:off x="9285604" y="2913058"/>
+            <a:ext cx="2017444" cy="348718"/>
+          </a:xfrm>
+          <a:prstGeom prst="bentConnector2">
+            <a:avLst/>
+          </a:prstGeom>
+          <a:ln w="9525">
+            <a:solidFill>
+              <a:schemeClr val="tx1"/>
+            </a:solidFill>
+          </a:ln>
+        </p:spPr>
+        <p:style>
+          <a:lnRef idx="1">
+            <a:schemeClr val="accent1"/>
+          </a:lnRef>
+          <a:fillRef idx="0">
+            <a:schemeClr val="accent1"/>
+          </a:fillRef>
+          <a:effectRef idx="0">
+            <a:schemeClr val="accent1"/>
+          </a:effectRef>
+          <a:fontRef idx="minor">
+            <a:schemeClr val="tx1"/>
+          </a:fontRef>
+        </p:style>
       </p:cxnSp>
     </p:spTree>
     <p:extLst>

</xml_diff>